<commit_message>
Travail sur le diaporama
</commit_message>
<xml_diff>
--- a/Etudiants/Joshua/PremièreRevueDeProjet.pptx
+++ b/Etudiants/Joshua/PremièreRevueDeProjet.pptx
@@ -7,6 +7,7 @@
   <p:sldIdLst>
     <p:sldId id="256" r:id="rId2"/>
     <p:sldId id="257" r:id="rId3"/>
+    <p:sldId id="258" r:id="rId4"/>
   </p:sldIdLst>
   <p:sldSz cx="12192000" cy="6858000"/>
   <p:notesSz cx="6858000" cy="9144000"/>
@@ -3921,32 +3922,1429 @@
         </p:nvSpPr>
         <p:spPr/>
         <p:txBody>
-          <a:bodyPr/>
+          <a:bodyPr>
+            <a:normAutofit/>
+          </a:bodyPr>
           <a:lstStyle/>
           <a:p>
             <a:pPr algn="ctr"/>
             <a:r>
-              <a:rPr lang="fr-FR" sz="5400" b="1" dirty="0">
-                <a:effectLst>
-                  <a:outerShdw blurRad="38100" dist="38100" dir="2700000" algn="tl">
-                    <a:srgbClr val="000000">
-                      <a:alpha val="43137"/>
-                    </a:srgbClr>
-                  </a:outerShdw>
-                </a:effectLst>
+              <a:rPr lang="fr-FR" b="1" dirty="0">
                 <a:latin typeface="+mn-lt"/>
               </a:rPr>
               <a:t>Introduction</a:t>
             </a:r>
-            <a:endParaRPr lang="fr-FR" b="1" dirty="0">
-              <a:effectLst>
-                <a:outerShdw blurRad="38100" dist="38100" dir="2700000" algn="tl">
-                  <a:srgbClr val="000000">
-                    <a:alpha val="43137"/>
-                  </a:srgbClr>
-                </a:outerShdw>
-              </a:effectLst>
+            <a:endParaRPr lang="fr-FR" sz="3600" b="1" dirty="0">
               <a:latin typeface="+mn-lt"/>
+            </a:endParaRPr>
+          </a:p>
+        </p:txBody>
+      </p:sp>
+      <p:pic>
+        <p:nvPicPr>
+          <p:cNvPr id="3" name="Image 2">
+            <a:extLst>
+              <a:ext uri="{FF2B5EF4-FFF2-40B4-BE49-F238E27FC236}">
+                <a16:creationId xmlns:a16="http://schemas.microsoft.com/office/drawing/2014/main" id="{F326434F-0C29-4B78-86B1-77260A8911E4}"/>
+              </a:ext>
+            </a:extLst>
+          </p:cNvPr>
+          <p:cNvPicPr/>
+          <p:nvPr/>
+        </p:nvPicPr>
+        <p:blipFill>
+          <a:blip r:embed="rId2">
+            <a:extLst>
+              <a:ext uri="{28A0092B-C50C-407E-A947-70E740481C1C}">
+                <a14:useLocalDpi xmlns:a14="http://schemas.microsoft.com/office/drawing/2010/main" val="0"/>
+              </a:ext>
+            </a:extLst>
+          </a:blip>
+          <a:stretch>
+            <a:fillRect/>
+          </a:stretch>
+        </p:blipFill>
+        <p:spPr>
+          <a:xfrm>
+            <a:off x="2315799" y="1268963"/>
+            <a:ext cx="7560401" cy="5589037"/>
+          </a:xfrm>
+          <a:prstGeom prst="rect">
+            <a:avLst/>
+          </a:prstGeom>
+        </p:spPr>
+      </p:pic>
+      <p:sp>
+        <p:nvSpPr>
+          <p:cNvPr id="5" name="Rectangle : coins arrondis 4">
+            <a:extLst>
+              <a:ext uri="{FF2B5EF4-FFF2-40B4-BE49-F238E27FC236}">
+                <a16:creationId xmlns:a16="http://schemas.microsoft.com/office/drawing/2014/main" id="{57DE185B-FF3F-4443-8DF5-F3C7D987AC94}"/>
+              </a:ext>
+            </a:extLst>
+          </p:cNvPr>
+          <p:cNvSpPr/>
+          <p:nvPr/>
+        </p:nvSpPr>
+        <p:spPr>
+          <a:xfrm>
+            <a:off x="2802730" y="1861457"/>
+            <a:ext cx="5127307" cy="831042"/>
+          </a:xfrm>
+          <a:prstGeom prst="roundRect">
+            <a:avLst/>
+          </a:prstGeom>
+          <a:noFill/>
+          <a:ln w="50800">
+            <a:solidFill>
+              <a:schemeClr val="accent1"/>
+            </a:solidFill>
+          </a:ln>
+        </p:spPr>
+        <p:style>
+          <a:lnRef idx="2">
+            <a:schemeClr val="accent1">
+              <a:shade val="50000"/>
+            </a:schemeClr>
+          </a:lnRef>
+          <a:fillRef idx="1">
+            <a:schemeClr val="accent1"/>
+          </a:fillRef>
+          <a:effectRef idx="0">
+            <a:schemeClr val="accent1"/>
+          </a:effectRef>
+          <a:fontRef idx="minor">
+            <a:schemeClr val="lt1"/>
+          </a:fontRef>
+        </p:style>
+        <p:txBody>
+          <a:bodyPr rot="0" spcFirstLastPara="0" vert="horz" wrap="square" lIns="91440" tIns="45720" rIns="91440" bIns="45720" numCol="1" spcCol="0" rtlCol="0" fromWordArt="0" anchor="ctr" anchorCtr="0" forceAA="0" compatLnSpc="1">
+            <a:prstTxWarp prst="textNoShape">
+              <a:avLst/>
+            </a:prstTxWarp>
+            <a:noAutofit/>
+          </a:bodyPr>
+          <a:lstStyle/>
+          <a:p>
+            <a:endParaRPr lang="fr-FR"/>
+          </a:p>
+        </p:txBody>
+      </p:sp>
+      <p:sp>
+        <p:nvSpPr>
+          <p:cNvPr id="6" name="Rectangle : coins arrondis 5">
+            <a:extLst>
+              <a:ext uri="{FF2B5EF4-FFF2-40B4-BE49-F238E27FC236}">
+                <a16:creationId xmlns:a16="http://schemas.microsoft.com/office/drawing/2014/main" id="{BF011F47-68B0-4826-B9CD-FD327075D3FD}"/>
+              </a:ext>
+            </a:extLst>
+          </p:cNvPr>
+          <p:cNvSpPr/>
+          <p:nvPr/>
+        </p:nvSpPr>
+        <p:spPr>
+          <a:xfrm>
+            <a:off x="4748121" y="4898571"/>
+            <a:ext cx="2382022" cy="1230085"/>
+          </a:xfrm>
+          <a:prstGeom prst="roundRect">
+            <a:avLst/>
+          </a:prstGeom>
+          <a:noFill/>
+          <a:ln w="50800">
+            <a:solidFill>
+              <a:schemeClr val="accent1"/>
+            </a:solidFill>
+          </a:ln>
+        </p:spPr>
+        <p:style>
+          <a:lnRef idx="2">
+            <a:schemeClr val="accent1">
+              <a:shade val="50000"/>
+            </a:schemeClr>
+          </a:lnRef>
+          <a:fillRef idx="1">
+            <a:schemeClr val="accent1"/>
+          </a:fillRef>
+          <a:effectRef idx="0">
+            <a:schemeClr val="accent1"/>
+          </a:effectRef>
+          <a:fontRef idx="minor">
+            <a:schemeClr val="lt1"/>
+          </a:fontRef>
+        </p:style>
+        <p:txBody>
+          <a:bodyPr rot="0" spcFirstLastPara="0" vert="horz" wrap="square" lIns="91440" tIns="45720" rIns="91440" bIns="45720" numCol="1" spcCol="0" rtlCol="0" fromWordArt="0" anchor="ctr" anchorCtr="0" forceAA="0" compatLnSpc="1">
+            <a:prstTxWarp prst="textNoShape">
+              <a:avLst/>
+            </a:prstTxWarp>
+            <a:noAutofit/>
+          </a:bodyPr>
+          <a:lstStyle/>
+          <a:p>
+            <a:endParaRPr lang="fr-FR"/>
+          </a:p>
+        </p:txBody>
+      </p:sp>
+      <p:sp>
+        <p:nvSpPr>
+          <p:cNvPr id="7" name="Rectangle : coins arrondis 6">
+            <a:extLst>
+              <a:ext uri="{FF2B5EF4-FFF2-40B4-BE49-F238E27FC236}">
+                <a16:creationId xmlns:a16="http://schemas.microsoft.com/office/drawing/2014/main" id="{A9B249F6-82C0-4E80-9688-A6C4AD58C921}"/>
+              </a:ext>
+            </a:extLst>
+          </p:cNvPr>
+          <p:cNvSpPr/>
+          <p:nvPr/>
+        </p:nvSpPr>
+        <p:spPr>
+          <a:xfrm>
+            <a:off x="7478485" y="5589037"/>
+            <a:ext cx="696685" cy="387220"/>
+          </a:xfrm>
+          <a:prstGeom prst="roundRect">
+            <a:avLst/>
+          </a:prstGeom>
+          <a:noFill/>
+          <a:ln w="50800">
+            <a:solidFill>
+              <a:schemeClr val="accent1"/>
+            </a:solidFill>
+          </a:ln>
+        </p:spPr>
+        <p:style>
+          <a:lnRef idx="2">
+            <a:schemeClr val="accent1">
+              <a:shade val="50000"/>
+            </a:schemeClr>
+          </a:lnRef>
+          <a:fillRef idx="1">
+            <a:schemeClr val="accent1"/>
+          </a:fillRef>
+          <a:effectRef idx="0">
+            <a:schemeClr val="accent1"/>
+          </a:effectRef>
+          <a:fontRef idx="minor">
+            <a:schemeClr val="lt1"/>
+          </a:fontRef>
+        </p:style>
+        <p:txBody>
+          <a:bodyPr rot="0" spcFirstLastPara="0" vert="horz" wrap="square" lIns="91440" tIns="45720" rIns="91440" bIns="45720" numCol="1" spcCol="0" rtlCol="0" fromWordArt="0" anchor="ctr" anchorCtr="0" forceAA="0" compatLnSpc="1">
+            <a:prstTxWarp prst="textNoShape">
+              <a:avLst/>
+            </a:prstTxWarp>
+            <a:noAutofit/>
+          </a:bodyPr>
+          <a:lstStyle/>
+          <a:p>
+            <a:endParaRPr lang="fr-FR"/>
+          </a:p>
+        </p:txBody>
+      </p:sp>
+      <p:sp>
+        <p:nvSpPr>
+          <p:cNvPr id="8" name="Rectangle : coins arrondis 7">
+            <a:extLst>
+              <a:ext uri="{FF2B5EF4-FFF2-40B4-BE49-F238E27FC236}">
+                <a16:creationId xmlns:a16="http://schemas.microsoft.com/office/drawing/2014/main" id="{29FB46DC-2AE1-4059-BDCC-EC19699998CA}"/>
+              </a:ext>
+            </a:extLst>
+          </p:cNvPr>
+          <p:cNvSpPr/>
+          <p:nvPr/>
+        </p:nvSpPr>
+        <p:spPr>
+          <a:xfrm>
+            <a:off x="4201886" y="5868952"/>
+            <a:ext cx="391885" cy="466533"/>
+          </a:xfrm>
+          <a:prstGeom prst="roundRect">
+            <a:avLst/>
+          </a:prstGeom>
+          <a:noFill/>
+          <a:ln w="50800">
+            <a:solidFill>
+              <a:schemeClr val="accent1"/>
+            </a:solidFill>
+          </a:ln>
+        </p:spPr>
+        <p:style>
+          <a:lnRef idx="2">
+            <a:schemeClr val="accent1">
+              <a:shade val="50000"/>
+            </a:schemeClr>
+          </a:lnRef>
+          <a:fillRef idx="1">
+            <a:schemeClr val="accent1"/>
+          </a:fillRef>
+          <a:effectRef idx="0">
+            <a:schemeClr val="accent1"/>
+          </a:effectRef>
+          <a:fontRef idx="minor">
+            <a:schemeClr val="lt1"/>
+          </a:fontRef>
+        </p:style>
+        <p:txBody>
+          <a:bodyPr rot="0" spcFirstLastPara="0" vert="horz" wrap="square" lIns="91440" tIns="45720" rIns="91440" bIns="45720" numCol="1" spcCol="0" rtlCol="0" fromWordArt="0" anchor="ctr" anchorCtr="0" forceAA="0" compatLnSpc="1">
+            <a:prstTxWarp prst="textNoShape">
+              <a:avLst/>
+            </a:prstTxWarp>
+            <a:noAutofit/>
+          </a:bodyPr>
+          <a:lstStyle/>
+          <a:p>
+            <a:endParaRPr lang="fr-FR"/>
+          </a:p>
+        </p:txBody>
+      </p:sp>
+      <p:sp>
+        <p:nvSpPr>
+          <p:cNvPr id="11" name="Rectangle : coins arrondis 10">
+            <a:extLst>
+              <a:ext uri="{FF2B5EF4-FFF2-40B4-BE49-F238E27FC236}">
+                <a16:creationId xmlns:a16="http://schemas.microsoft.com/office/drawing/2014/main" id="{C0299604-2787-4F62-8A20-BA48EE17A3F3}"/>
+              </a:ext>
+            </a:extLst>
+          </p:cNvPr>
+          <p:cNvSpPr/>
+          <p:nvPr/>
+        </p:nvSpPr>
+        <p:spPr>
+          <a:xfrm>
+            <a:off x="9907428" y="1861457"/>
+            <a:ext cx="707572" cy="45719"/>
+          </a:xfrm>
+          <a:prstGeom prst="roundRect">
+            <a:avLst/>
+          </a:prstGeom>
+          <a:noFill/>
+          <a:ln w="50800">
+            <a:solidFill>
+              <a:schemeClr val="accent1"/>
+            </a:solidFill>
+          </a:ln>
+        </p:spPr>
+        <p:style>
+          <a:lnRef idx="2">
+            <a:schemeClr val="accent1">
+              <a:shade val="50000"/>
+            </a:schemeClr>
+          </a:lnRef>
+          <a:fillRef idx="1">
+            <a:schemeClr val="accent1"/>
+          </a:fillRef>
+          <a:effectRef idx="0">
+            <a:schemeClr val="accent1"/>
+          </a:effectRef>
+          <a:fontRef idx="minor">
+            <a:schemeClr val="lt1"/>
+          </a:fontRef>
+        </p:style>
+        <p:txBody>
+          <a:bodyPr rot="0" spcFirstLastPara="0" vert="horz" wrap="square" lIns="91440" tIns="45720" rIns="91440" bIns="45720" numCol="1" spcCol="0" rtlCol="0" fromWordArt="0" anchor="ctr" anchorCtr="0" forceAA="0" compatLnSpc="1">
+            <a:prstTxWarp prst="textNoShape">
+              <a:avLst/>
+            </a:prstTxWarp>
+            <a:noAutofit/>
+          </a:bodyPr>
+          <a:lstStyle/>
+          <a:p>
+            <a:endParaRPr lang="fr-FR"/>
+          </a:p>
+        </p:txBody>
+      </p:sp>
+      <p:sp>
+        <p:nvSpPr>
+          <p:cNvPr id="12" name="ZoneTexte 11">
+            <a:extLst>
+              <a:ext uri="{FF2B5EF4-FFF2-40B4-BE49-F238E27FC236}">
+                <a16:creationId xmlns:a16="http://schemas.microsoft.com/office/drawing/2014/main" id="{CAF4F695-35FF-45A5-80B8-118450793612}"/>
+              </a:ext>
+            </a:extLst>
+          </p:cNvPr>
+          <p:cNvSpPr txBox="1"/>
+          <p:nvPr/>
+        </p:nvSpPr>
+        <p:spPr>
+          <a:xfrm>
+            <a:off x="10646228" y="1699650"/>
+            <a:ext cx="824265" cy="369332"/>
+          </a:xfrm>
+          <a:prstGeom prst="rect">
+            <a:avLst/>
+          </a:prstGeom>
+          <a:noFill/>
+        </p:spPr>
+        <p:txBody>
+          <a:bodyPr wrap="none" rtlCol="0">
+            <a:spAutoFit/>
+          </a:bodyPr>
+          <a:lstStyle/>
+          <a:p>
+            <a:r>
+              <a:rPr lang="fr-FR" dirty="0"/>
+              <a:t>Joshua</a:t>
+            </a:r>
+          </a:p>
+        </p:txBody>
+      </p:sp>
+      <p:sp>
+        <p:nvSpPr>
+          <p:cNvPr id="13" name="Rectangle : coins arrondis 12">
+            <a:extLst>
+              <a:ext uri="{FF2B5EF4-FFF2-40B4-BE49-F238E27FC236}">
+                <a16:creationId xmlns:a16="http://schemas.microsoft.com/office/drawing/2014/main" id="{2005236A-5D70-4933-9C03-53DAC7F068DD}"/>
+              </a:ext>
+            </a:extLst>
+          </p:cNvPr>
+          <p:cNvSpPr/>
+          <p:nvPr/>
+        </p:nvSpPr>
+        <p:spPr>
+          <a:xfrm>
+            <a:off x="9907428" y="2231259"/>
+            <a:ext cx="707572" cy="45719"/>
+          </a:xfrm>
+          <a:prstGeom prst="roundRect">
+            <a:avLst/>
+          </a:prstGeom>
+          <a:noFill/>
+          <a:ln w="50800">
+            <a:solidFill>
+              <a:srgbClr val="92D050"/>
+            </a:solidFill>
+          </a:ln>
+        </p:spPr>
+        <p:style>
+          <a:lnRef idx="2">
+            <a:schemeClr val="accent1">
+              <a:shade val="50000"/>
+            </a:schemeClr>
+          </a:lnRef>
+          <a:fillRef idx="1">
+            <a:schemeClr val="accent1"/>
+          </a:fillRef>
+          <a:effectRef idx="0">
+            <a:schemeClr val="accent1"/>
+          </a:effectRef>
+          <a:fontRef idx="minor">
+            <a:schemeClr val="lt1"/>
+          </a:fontRef>
+        </p:style>
+        <p:txBody>
+          <a:bodyPr rot="0" spcFirstLastPara="0" vert="horz" wrap="square" lIns="91440" tIns="45720" rIns="91440" bIns="45720" numCol="1" spcCol="0" rtlCol="0" fromWordArt="0" anchor="ctr" anchorCtr="0" forceAA="0" compatLnSpc="1">
+            <a:prstTxWarp prst="textNoShape">
+              <a:avLst/>
+            </a:prstTxWarp>
+            <a:noAutofit/>
+          </a:bodyPr>
+          <a:lstStyle/>
+          <a:p>
+            <a:endParaRPr lang="fr-FR"/>
+          </a:p>
+        </p:txBody>
+      </p:sp>
+      <p:sp>
+        <p:nvSpPr>
+          <p:cNvPr id="14" name="ZoneTexte 13">
+            <a:extLst>
+              <a:ext uri="{FF2B5EF4-FFF2-40B4-BE49-F238E27FC236}">
+                <a16:creationId xmlns:a16="http://schemas.microsoft.com/office/drawing/2014/main" id="{E0ACB98A-C89B-4929-A703-94259A65428B}"/>
+              </a:ext>
+            </a:extLst>
+          </p:cNvPr>
+          <p:cNvSpPr txBox="1"/>
+          <p:nvPr/>
+        </p:nvSpPr>
+        <p:spPr>
+          <a:xfrm>
+            <a:off x="10614999" y="2046593"/>
+            <a:ext cx="925253" cy="369332"/>
+          </a:xfrm>
+          <a:prstGeom prst="rect">
+            <a:avLst/>
+          </a:prstGeom>
+          <a:noFill/>
+        </p:spPr>
+        <p:txBody>
+          <a:bodyPr wrap="none" rtlCol="0">
+            <a:spAutoFit/>
+          </a:bodyPr>
+          <a:lstStyle/>
+          <a:p>
+            <a:r>
+              <a:rPr lang="fr-FR" dirty="0"/>
+              <a:t>Thomas</a:t>
+            </a:r>
+          </a:p>
+        </p:txBody>
+      </p:sp>
+      <p:sp>
+        <p:nvSpPr>
+          <p:cNvPr id="15" name="Rectangle : coins arrondis 14">
+            <a:extLst>
+              <a:ext uri="{FF2B5EF4-FFF2-40B4-BE49-F238E27FC236}">
+                <a16:creationId xmlns:a16="http://schemas.microsoft.com/office/drawing/2014/main" id="{C9B032DC-BEA4-4CA8-868C-B1DFB4E70287}"/>
+              </a:ext>
+            </a:extLst>
+          </p:cNvPr>
+          <p:cNvSpPr/>
+          <p:nvPr/>
+        </p:nvSpPr>
+        <p:spPr>
+          <a:xfrm>
+            <a:off x="9907427" y="2601061"/>
+            <a:ext cx="707572" cy="45719"/>
+          </a:xfrm>
+          <a:prstGeom prst="roundRect">
+            <a:avLst/>
+          </a:prstGeom>
+          <a:noFill/>
+          <a:ln w="50800">
+            <a:solidFill>
+              <a:srgbClr val="FF0000"/>
+            </a:solidFill>
+          </a:ln>
+        </p:spPr>
+        <p:style>
+          <a:lnRef idx="2">
+            <a:schemeClr val="accent1">
+              <a:shade val="50000"/>
+            </a:schemeClr>
+          </a:lnRef>
+          <a:fillRef idx="1">
+            <a:schemeClr val="accent1"/>
+          </a:fillRef>
+          <a:effectRef idx="0">
+            <a:schemeClr val="accent1"/>
+          </a:effectRef>
+          <a:fontRef idx="minor">
+            <a:schemeClr val="lt1"/>
+          </a:fontRef>
+        </p:style>
+        <p:txBody>
+          <a:bodyPr rot="0" spcFirstLastPara="0" vert="horz" wrap="square" lIns="91440" tIns="45720" rIns="91440" bIns="45720" numCol="1" spcCol="0" rtlCol="0" fromWordArt="0" anchor="ctr" anchorCtr="0" forceAA="0" compatLnSpc="1">
+            <a:prstTxWarp prst="textNoShape">
+              <a:avLst/>
+            </a:prstTxWarp>
+            <a:noAutofit/>
+          </a:bodyPr>
+          <a:lstStyle/>
+          <a:p>
+            <a:endParaRPr lang="fr-FR"/>
+          </a:p>
+        </p:txBody>
+      </p:sp>
+      <p:sp>
+        <p:nvSpPr>
+          <p:cNvPr id="16" name="ZoneTexte 15">
+            <a:extLst>
+              <a:ext uri="{FF2B5EF4-FFF2-40B4-BE49-F238E27FC236}">
+                <a16:creationId xmlns:a16="http://schemas.microsoft.com/office/drawing/2014/main" id="{48B41F13-2617-4D2B-8E9E-C48ADF79E878}"/>
+              </a:ext>
+            </a:extLst>
+          </p:cNvPr>
+          <p:cNvSpPr txBox="1"/>
+          <p:nvPr/>
+        </p:nvSpPr>
+        <p:spPr>
+          <a:xfrm>
+            <a:off x="10614999" y="2424887"/>
+            <a:ext cx="1195071" cy="369332"/>
+          </a:xfrm>
+          <a:prstGeom prst="rect">
+            <a:avLst/>
+          </a:prstGeom>
+          <a:noFill/>
+        </p:spPr>
+        <p:txBody>
+          <a:bodyPr wrap="none" rtlCol="0">
+            <a:spAutoFit/>
+          </a:bodyPr>
+          <a:lstStyle/>
+          <a:p>
+            <a:r>
+              <a:rPr lang="fr-FR" dirty="0"/>
+              <a:t>Constantin</a:t>
+            </a:r>
+          </a:p>
+        </p:txBody>
+      </p:sp>
+      <p:sp>
+        <p:nvSpPr>
+          <p:cNvPr id="17" name="Rectangle : coins arrondis 16">
+            <a:extLst>
+              <a:ext uri="{FF2B5EF4-FFF2-40B4-BE49-F238E27FC236}">
+                <a16:creationId xmlns:a16="http://schemas.microsoft.com/office/drawing/2014/main" id="{E8DD8EB4-5799-466B-8E0E-6853CD76BBDC}"/>
+              </a:ext>
+            </a:extLst>
+          </p:cNvPr>
+          <p:cNvSpPr/>
+          <p:nvPr/>
+        </p:nvSpPr>
+        <p:spPr>
+          <a:xfrm>
+            <a:off x="9907427" y="2970935"/>
+            <a:ext cx="707572" cy="45719"/>
+          </a:xfrm>
+          <a:prstGeom prst="roundRect">
+            <a:avLst/>
+          </a:prstGeom>
+          <a:noFill/>
+          <a:ln w="50800">
+            <a:solidFill>
+              <a:srgbClr val="00B0F0"/>
+            </a:solidFill>
+          </a:ln>
+        </p:spPr>
+        <p:style>
+          <a:lnRef idx="2">
+            <a:schemeClr val="accent1">
+              <a:shade val="50000"/>
+            </a:schemeClr>
+          </a:lnRef>
+          <a:fillRef idx="1">
+            <a:schemeClr val="accent1"/>
+          </a:fillRef>
+          <a:effectRef idx="0">
+            <a:schemeClr val="accent1"/>
+          </a:effectRef>
+          <a:fontRef idx="minor">
+            <a:schemeClr val="lt1"/>
+          </a:fontRef>
+        </p:style>
+        <p:txBody>
+          <a:bodyPr rot="0" spcFirstLastPara="0" vert="horz" wrap="square" lIns="91440" tIns="45720" rIns="91440" bIns="45720" numCol="1" spcCol="0" rtlCol="0" fromWordArt="0" anchor="ctr" anchorCtr="0" forceAA="0" compatLnSpc="1">
+            <a:prstTxWarp prst="textNoShape">
+              <a:avLst/>
+            </a:prstTxWarp>
+            <a:noAutofit/>
+          </a:bodyPr>
+          <a:lstStyle/>
+          <a:p>
+            <a:endParaRPr lang="fr-FR"/>
+          </a:p>
+        </p:txBody>
+      </p:sp>
+      <p:sp>
+        <p:nvSpPr>
+          <p:cNvPr id="18" name="ZoneTexte 17">
+            <a:extLst>
+              <a:ext uri="{FF2B5EF4-FFF2-40B4-BE49-F238E27FC236}">
+                <a16:creationId xmlns:a16="http://schemas.microsoft.com/office/drawing/2014/main" id="{1B85E7D9-DC72-4AE6-9300-C7C157AAF1D4}"/>
+              </a:ext>
+            </a:extLst>
+          </p:cNvPr>
+          <p:cNvSpPr txBox="1"/>
+          <p:nvPr/>
+        </p:nvSpPr>
+        <p:spPr>
+          <a:xfrm>
+            <a:off x="10614999" y="2786197"/>
+            <a:ext cx="993862" cy="369332"/>
+          </a:xfrm>
+          <a:prstGeom prst="rect">
+            <a:avLst/>
+          </a:prstGeom>
+          <a:noFill/>
+        </p:spPr>
+        <p:txBody>
+          <a:bodyPr wrap="none" rtlCol="0">
+            <a:spAutoFit/>
+          </a:bodyPr>
+          <a:lstStyle/>
+          <a:p>
+            <a:r>
+              <a:rPr lang="fr-FR" dirty="0"/>
+              <a:t>Corentin</a:t>
+            </a:r>
+          </a:p>
+        </p:txBody>
+      </p:sp>
+      <p:sp>
+        <p:nvSpPr>
+          <p:cNvPr id="19" name="Flèche : double flèche horizontale 18">
+            <a:extLst>
+              <a:ext uri="{FF2B5EF4-FFF2-40B4-BE49-F238E27FC236}">
+                <a16:creationId xmlns:a16="http://schemas.microsoft.com/office/drawing/2014/main" id="{096DB570-0746-4C92-9333-0F3669C04558}"/>
+              </a:ext>
+            </a:extLst>
+          </p:cNvPr>
+          <p:cNvSpPr/>
+          <p:nvPr/>
+        </p:nvSpPr>
+        <p:spPr>
+          <a:xfrm rot="16200000">
+            <a:off x="7428681" y="4657774"/>
+            <a:ext cx="535940" cy="234950"/>
+          </a:xfrm>
+          <a:prstGeom prst="leftRightArrow">
+            <a:avLst/>
+          </a:prstGeom>
+          <a:solidFill>
+            <a:srgbClr val="FF0000"/>
+          </a:solidFill>
+          <a:ln>
+            <a:noFill/>
+          </a:ln>
+        </p:spPr>
+        <p:style>
+          <a:lnRef idx="2">
+            <a:schemeClr val="accent1">
+              <a:shade val="50000"/>
+            </a:schemeClr>
+          </a:lnRef>
+          <a:fillRef idx="1">
+            <a:schemeClr val="accent1"/>
+          </a:fillRef>
+          <a:effectRef idx="0">
+            <a:schemeClr val="accent1"/>
+          </a:effectRef>
+          <a:fontRef idx="minor">
+            <a:schemeClr val="lt1"/>
+          </a:fontRef>
+        </p:style>
+        <p:txBody>
+          <a:bodyPr rot="0" spcFirstLastPara="0" vert="horz" wrap="square" lIns="91440" tIns="45720" rIns="91440" bIns="45720" numCol="1" spcCol="0" rtlCol="0" fromWordArt="0" anchor="ctr" anchorCtr="0" forceAA="0" compatLnSpc="1">
+            <a:prstTxWarp prst="textNoShape">
+              <a:avLst/>
+            </a:prstTxWarp>
+            <a:noAutofit/>
+          </a:bodyPr>
+          <a:lstStyle/>
+          <a:p>
+            <a:endParaRPr lang="fr-FR"/>
+          </a:p>
+        </p:txBody>
+      </p:sp>
+      <p:sp>
+        <p:nvSpPr>
+          <p:cNvPr id="20" name="Rectangle : coins arrondis 19">
+            <a:extLst>
+              <a:ext uri="{FF2B5EF4-FFF2-40B4-BE49-F238E27FC236}">
+                <a16:creationId xmlns:a16="http://schemas.microsoft.com/office/drawing/2014/main" id="{35D16060-3BD5-4384-834E-2EBCDCA60699}"/>
+              </a:ext>
+            </a:extLst>
+          </p:cNvPr>
+          <p:cNvSpPr/>
+          <p:nvPr/>
+        </p:nvSpPr>
+        <p:spPr>
+          <a:xfrm>
+            <a:off x="8149315" y="4488657"/>
+            <a:ext cx="449379" cy="164306"/>
+          </a:xfrm>
+          <a:prstGeom prst="roundRect">
+            <a:avLst/>
+          </a:prstGeom>
+          <a:noFill/>
+          <a:ln w="50800">
+            <a:solidFill>
+              <a:srgbClr val="FF0000"/>
+            </a:solidFill>
+          </a:ln>
+        </p:spPr>
+        <p:style>
+          <a:lnRef idx="2">
+            <a:schemeClr val="accent1">
+              <a:shade val="50000"/>
+            </a:schemeClr>
+          </a:lnRef>
+          <a:fillRef idx="1">
+            <a:schemeClr val="accent1"/>
+          </a:fillRef>
+          <a:effectRef idx="0">
+            <a:schemeClr val="accent1"/>
+          </a:effectRef>
+          <a:fontRef idx="minor">
+            <a:schemeClr val="lt1"/>
+          </a:fontRef>
+        </p:style>
+        <p:txBody>
+          <a:bodyPr rot="0" spcFirstLastPara="0" vert="horz" wrap="square" lIns="91440" tIns="45720" rIns="91440" bIns="45720" numCol="1" spcCol="0" rtlCol="0" fromWordArt="0" anchor="ctr" anchorCtr="0" forceAA="0" compatLnSpc="1">
+            <a:prstTxWarp prst="textNoShape">
+              <a:avLst/>
+            </a:prstTxWarp>
+            <a:noAutofit/>
+          </a:bodyPr>
+          <a:lstStyle/>
+          <a:p>
+            <a:endParaRPr lang="fr-FR"/>
+          </a:p>
+        </p:txBody>
+      </p:sp>
+      <p:sp>
+        <p:nvSpPr>
+          <p:cNvPr id="21" name="Rectangle : coins arrondis 20">
+            <a:extLst>
+              <a:ext uri="{FF2B5EF4-FFF2-40B4-BE49-F238E27FC236}">
+                <a16:creationId xmlns:a16="http://schemas.microsoft.com/office/drawing/2014/main" id="{5D361B11-4AA7-4AC6-976F-5354E0BA831E}"/>
+              </a:ext>
+            </a:extLst>
+          </p:cNvPr>
+          <p:cNvSpPr/>
+          <p:nvPr/>
+        </p:nvSpPr>
+        <p:spPr>
+          <a:xfrm>
+            <a:off x="4536622" y="3740944"/>
+            <a:ext cx="1666060" cy="801039"/>
+          </a:xfrm>
+          <a:prstGeom prst="roundRect">
+            <a:avLst/>
+          </a:prstGeom>
+          <a:noFill/>
+          <a:ln w="50800">
+            <a:solidFill>
+              <a:srgbClr val="FF0000"/>
+            </a:solidFill>
+          </a:ln>
+        </p:spPr>
+        <p:style>
+          <a:lnRef idx="2">
+            <a:schemeClr val="accent1">
+              <a:shade val="50000"/>
+            </a:schemeClr>
+          </a:lnRef>
+          <a:fillRef idx="1">
+            <a:schemeClr val="accent1"/>
+          </a:fillRef>
+          <a:effectRef idx="0">
+            <a:schemeClr val="accent1"/>
+          </a:effectRef>
+          <a:fontRef idx="minor">
+            <a:schemeClr val="lt1"/>
+          </a:fontRef>
+        </p:style>
+        <p:txBody>
+          <a:bodyPr rot="0" spcFirstLastPara="0" vert="horz" wrap="square" lIns="91440" tIns="45720" rIns="91440" bIns="45720" numCol="1" spcCol="0" rtlCol="0" fromWordArt="0" anchor="ctr" anchorCtr="0" forceAA="0" compatLnSpc="1">
+            <a:prstTxWarp prst="textNoShape">
+              <a:avLst/>
+            </a:prstTxWarp>
+            <a:noAutofit/>
+          </a:bodyPr>
+          <a:lstStyle/>
+          <a:p>
+            <a:endParaRPr lang="fr-FR"/>
+          </a:p>
+        </p:txBody>
+      </p:sp>
+      <p:sp>
+        <p:nvSpPr>
+          <p:cNvPr id="22" name="Rectangle : coins arrondis 21">
+            <a:extLst>
+              <a:ext uri="{FF2B5EF4-FFF2-40B4-BE49-F238E27FC236}">
+                <a16:creationId xmlns:a16="http://schemas.microsoft.com/office/drawing/2014/main" id="{E2933415-AEC5-44C9-AE56-64F8CE71E3F7}"/>
+              </a:ext>
+            </a:extLst>
+          </p:cNvPr>
+          <p:cNvSpPr/>
+          <p:nvPr/>
+        </p:nvSpPr>
+        <p:spPr>
+          <a:xfrm>
+            <a:off x="2802730" y="2816202"/>
+            <a:ext cx="1674019" cy="801039"/>
+          </a:xfrm>
+          <a:prstGeom prst="roundRect">
+            <a:avLst/>
+          </a:prstGeom>
+          <a:noFill/>
+          <a:ln w="50800">
+            <a:solidFill>
+              <a:srgbClr val="FF0000"/>
+            </a:solidFill>
+          </a:ln>
+        </p:spPr>
+        <p:style>
+          <a:lnRef idx="2">
+            <a:schemeClr val="accent1">
+              <a:shade val="50000"/>
+            </a:schemeClr>
+          </a:lnRef>
+          <a:fillRef idx="1">
+            <a:schemeClr val="accent1"/>
+          </a:fillRef>
+          <a:effectRef idx="0">
+            <a:schemeClr val="accent1"/>
+          </a:effectRef>
+          <a:fontRef idx="minor">
+            <a:schemeClr val="lt1"/>
+          </a:fontRef>
+        </p:style>
+        <p:txBody>
+          <a:bodyPr rot="0" spcFirstLastPara="0" vert="horz" wrap="square" lIns="91440" tIns="45720" rIns="91440" bIns="45720" numCol="1" spcCol="0" rtlCol="0" fromWordArt="0" anchor="ctr" anchorCtr="0" forceAA="0" compatLnSpc="1">
+            <a:prstTxWarp prst="textNoShape">
+              <a:avLst/>
+            </a:prstTxWarp>
+            <a:noAutofit/>
+          </a:bodyPr>
+          <a:lstStyle/>
+          <a:p>
+            <a:endParaRPr lang="fr-FR"/>
+          </a:p>
+        </p:txBody>
+      </p:sp>
+      <p:sp>
+        <p:nvSpPr>
+          <p:cNvPr id="23" name="Flèche : double flèche horizontale 22">
+            <a:extLst>
+              <a:ext uri="{FF2B5EF4-FFF2-40B4-BE49-F238E27FC236}">
+                <a16:creationId xmlns:a16="http://schemas.microsoft.com/office/drawing/2014/main" id="{1071556F-F791-4EA0-8063-D0370A498624}"/>
+              </a:ext>
+            </a:extLst>
+          </p:cNvPr>
+          <p:cNvSpPr/>
+          <p:nvPr/>
+        </p:nvSpPr>
+        <p:spPr>
+          <a:xfrm>
+            <a:off x="6865620" y="5195619"/>
+            <a:ext cx="612865" cy="317994"/>
+          </a:xfrm>
+          <a:prstGeom prst="leftRightArrow">
+            <a:avLst/>
+          </a:prstGeom>
+          <a:solidFill>
+            <a:srgbClr val="2FC9FF"/>
+          </a:solidFill>
+          <a:ln>
+            <a:solidFill>
+              <a:srgbClr val="00B0F0"/>
+            </a:solidFill>
+          </a:ln>
+        </p:spPr>
+        <p:style>
+          <a:lnRef idx="2">
+            <a:schemeClr val="accent1">
+              <a:shade val="50000"/>
+            </a:schemeClr>
+          </a:lnRef>
+          <a:fillRef idx="1">
+            <a:schemeClr val="accent1"/>
+          </a:fillRef>
+          <a:effectRef idx="0">
+            <a:schemeClr val="accent1"/>
+          </a:effectRef>
+          <a:fontRef idx="minor">
+            <a:schemeClr val="lt1"/>
+          </a:fontRef>
+        </p:style>
+        <p:txBody>
+          <a:bodyPr rot="0" spcFirstLastPara="0" vert="horz" wrap="square" lIns="91440" tIns="45720" rIns="91440" bIns="45720" numCol="1" spcCol="0" rtlCol="0" fromWordArt="0" anchor="ctr" anchorCtr="0" forceAA="0" compatLnSpc="1">
+            <a:prstTxWarp prst="textNoShape">
+              <a:avLst/>
+            </a:prstTxWarp>
+            <a:noAutofit/>
+          </a:bodyPr>
+          <a:lstStyle/>
+          <a:p>
+            <a:endParaRPr lang="fr-FR"/>
+          </a:p>
+        </p:txBody>
+      </p:sp>
+      <p:sp>
+        <p:nvSpPr>
+          <p:cNvPr id="24" name="Flèche : double flèche horizontale 23">
+            <a:extLst>
+              <a:ext uri="{FF2B5EF4-FFF2-40B4-BE49-F238E27FC236}">
+                <a16:creationId xmlns:a16="http://schemas.microsoft.com/office/drawing/2014/main" id="{9E1D88BE-4C03-4E58-BF2A-430DC0CFE2A3}"/>
+              </a:ext>
+            </a:extLst>
+          </p:cNvPr>
+          <p:cNvSpPr/>
+          <p:nvPr/>
+        </p:nvSpPr>
+        <p:spPr>
+          <a:xfrm>
+            <a:off x="4563290" y="5665171"/>
+            <a:ext cx="1666060" cy="311085"/>
+          </a:xfrm>
+          <a:prstGeom prst="leftRightArrow">
+            <a:avLst/>
+          </a:prstGeom>
+          <a:solidFill>
+            <a:srgbClr val="1EEA14"/>
+          </a:solidFill>
+          <a:ln>
+            <a:solidFill>
+              <a:srgbClr val="92D050"/>
+            </a:solidFill>
+          </a:ln>
+        </p:spPr>
+        <p:style>
+          <a:lnRef idx="2">
+            <a:schemeClr val="accent1">
+              <a:shade val="50000"/>
+            </a:schemeClr>
+          </a:lnRef>
+          <a:fillRef idx="1">
+            <a:schemeClr val="accent1"/>
+          </a:fillRef>
+          <a:effectRef idx="0">
+            <a:schemeClr val="accent1"/>
+          </a:effectRef>
+          <a:fontRef idx="minor">
+            <a:schemeClr val="lt1"/>
+          </a:fontRef>
+        </p:style>
+        <p:txBody>
+          <a:bodyPr rot="0" spcFirstLastPara="0" vert="horz" wrap="square" lIns="91440" tIns="45720" rIns="91440" bIns="45720" numCol="1" spcCol="0" rtlCol="0" fromWordArt="0" anchor="ctr" anchorCtr="0" forceAA="0" compatLnSpc="1">
+            <a:prstTxWarp prst="textNoShape">
+              <a:avLst/>
+            </a:prstTxWarp>
+            <a:noAutofit/>
+          </a:bodyPr>
+          <a:lstStyle/>
+          <a:p>
+            <a:endParaRPr lang="fr-FR"/>
+          </a:p>
+        </p:txBody>
+      </p:sp>
+      <p:sp>
+        <p:nvSpPr>
+          <p:cNvPr id="25" name="Rectangle : coins arrondis 24">
+            <a:extLst>
+              <a:ext uri="{FF2B5EF4-FFF2-40B4-BE49-F238E27FC236}">
+                <a16:creationId xmlns:a16="http://schemas.microsoft.com/office/drawing/2014/main" id="{489DFF1B-53BB-413F-A40C-14160C2DCD79}"/>
+              </a:ext>
+            </a:extLst>
+          </p:cNvPr>
+          <p:cNvSpPr/>
+          <p:nvPr/>
+        </p:nvSpPr>
+        <p:spPr>
+          <a:xfrm>
+            <a:off x="2802731" y="3747359"/>
+            <a:ext cx="1661954" cy="801039"/>
+          </a:xfrm>
+          <a:prstGeom prst="roundRect">
+            <a:avLst/>
+          </a:prstGeom>
+          <a:noFill/>
+          <a:ln w="50800">
+            <a:solidFill>
+              <a:srgbClr val="92D050"/>
+            </a:solidFill>
+          </a:ln>
+        </p:spPr>
+        <p:style>
+          <a:lnRef idx="2">
+            <a:schemeClr val="accent1">
+              <a:shade val="50000"/>
+            </a:schemeClr>
+          </a:lnRef>
+          <a:fillRef idx="1">
+            <a:schemeClr val="accent1"/>
+          </a:fillRef>
+          <a:effectRef idx="0">
+            <a:schemeClr val="accent1"/>
+          </a:effectRef>
+          <a:fontRef idx="minor">
+            <a:schemeClr val="lt1"/>
+          </a:fontRef>
+        </p:style>
+        <p:txBody>
+          <a:bodyPr rot="0" spcFirstLastPara="0" vert="horz" wrap="square" lIns="91440" tIns="45720" rIns="91440" bIns="45720" numCol="1" spcCol="0" rtlCol="0" fromWordArt="0" anchor="ctr" anchorCtr="0" forceAA="0" compatLnSpc="1">
+            <a:prstTxWarp prst="textNoShape">
+              <a:avLst/>
+            </a:prstTxWarp>
+            <a:noAutofit/>
+          </a:bodyPr>
+          <a:lstStyle/>
+          <a:p>
+            <a:endParaRPr lang="fr-FR"/>
+          </a:p>
+        </p:txBody>
+      </p:sp>
+      <p:sp>
+        <p:nvSpPr>
+          <p:cNvPr id="26" name="Rectangle : coins arrondis 25">
+            <a:extLst>
+              <a:ext uri="{FF2B5EF4-FFF2-40B4-BE49-F238E27FC236}">
+                <a16:creationId xmlns:a16="http://schemas.microsoft.com/office/drawing/2014/main" id="{182E2B6F-2034-4B2C-8B91-AF4F0257F1FA}"/>
+              </a:ext>
+            </a:extLst>
+          </p:cNvPr>
+          <p:cNvSpPr/>
+          <p:nvPr/>
+        </p:nvSpPr>
+        <p:spPr>
+          <a:xfrm>
+            <a:off x="6280150" y="2818392"/>
+            <a:ext cx="1630363" cy="801039"/>
+          </a:xfrm>
+          <a:prstGeom prst="roundRect">
+            <a:avLst/>
+          </a:prstGeom>
+          <a:noFill/>
+          <a:ln w="50800">
+            <a:solidFill>
+              <a:srgbClr val="92D050"/>
+            </a:solidFill>
+          </a:ln>
+        </p:spPr>
+        <p:style>
+          <a:lnRef idx="2">
+            <a:schemeClr val="accent1">
+              <a:shade val="50000"/>
+            </a:schemeClr>
+          </a:lnRef>
+          <a:fillRef idx="1">
+            <a:schemeClr val="accent1"/>
+          </a:fillRef>
+          <a:effectRef idx="0">
+            <a:schemeClr val="accent1"/>
+          </a:effectRef>
+          <a:fontRef idx="minor">
+            <a:schemeClr val="lt1"/>
+          </a:fontRef>
+        </p:style>
+        <p:txBody>
+          <a:bodyPr rot="0" spcFirstLastPara="0" vert="horz" wrap="square" lIns="91440" tIns="45720" rIns="91440" bIns="45720" numCol="1" spcCol="0" rtlCol="0" fromWordArt="0" anchor="ctr" anchorCtr="0" forceAA="0" compatLnSpc="1">
+            <a:prstTxWarp prst="textNoShape">
+              <a:avLst/>
+            </a:prstTxWarp>
+            <a:noAutofit/>
+          </a:bodyPr>
+          <a:lstStyle/>
+          <a:p>
+            <a:endParaRPr lang="fr-FR"/>
+          </a:p>
+        </p:txBody>
+      </p:sp>
+      <p:sp>
+        <p:nvSpPr>
+          <p:cNvPr id="27" name="Rectangle : coins arrondis 26">
+            <a:extLst>
+              <a:ext uri="{FF2B5EF4-FFF2-40B4-BE49-F238E27FC236}">
+                <a16:creationId xmlns:a16="http://schemas.microsoft.com/office/drawing/2014/main" id="{67F0BB05-9A0E-438F-99F2-3FA9E65C5937}"/>
+              </a:ext>
+            </a:extLst>
+          </p:cNvPr>
+          <p:cNvSpPr/>
+          <p:nvPr/>
+        </p:nvSpPr>
+        <p:spPr>
+          <a:xfrm>
+            <a:off x="4541997" y="2816202"/>
+            <a:ext cx="1649888" cy="801039"/>
+          </a:xfrm>
+          <a:prstGeom prst="roundRect">
+            <a:avLst/>
+          </a:prstGeom>
+          <a:noFill/>
+          <a:ln w="50800">
+            <a:solidFill>
+              <a:srgbClr val="00B0F0"/>
+            </a:solidFill>
+          </a:ln>
+        </p:spPr>
+        <p:style>
+          <a:lnRef idx="2">
+            <a:schemeClr val="accent1">
+              <a:shade val="50000"/>
+            </a:schemeClr>
+          </a:lnRef>
+          <a:fillRef idx="1">
+            <a:schemeClr val="accent1"/>
+          </a:fillRef>
+          <a:effectRef idx="0">
+            <a:schemeClr val="accent1"/>
+          </a:effectRef>
+          <a:fontRef idx="minor">
+            <a:schemeClr val="lt1"/>
+          </a:fontRef>
+        </p:style>
+        <p:txBody>
+          <a:bodyPr rot="0" spcFirstLastPara="0" vert="horz" wrap="square" lIns="91440" tIns="45720" rIns="91440" bIns="45720" numCol="1" spcCol="0" rtlCol="0" fromWordArt="0" anchor="ctr" anchorCtr="0" forceAA="0" compatLnSpc="1">
+            <a:prstTxWarp prst="textNoShape">
+              <a:avLst/>
+            </a:prstTxWarp>
+            <a:noAutofit/>
+          </a:bodyPr>
+          <a:lstStyle/>
+          <a:p>
+            <a:endParaRPr lang="fr-FR"/>
+          </a:p>
+        </p:txBody>
+      </p:sp>
+      <p:sp>
+        <p:nvSpPr>
+          <p:cNvPr id="28" name="Rectangle : coins arrondis 27">
+            <a:extLst>
+              <a:ext uri="{FF2B5EF4-FFF2-40B4-BE49-F238E27FC236}">
+                <a16:creationId xmlns:a16="http://schemas.microsoft.com/office/drawing/2014/main" id="{F606E47C-726C-4713-AAF3-C821E5344F3E}"/>
+              </a:ext>
+            </a:extLst>
+          </p:cNvPr>
+          <p:cNvSpPr/>
+          <p:nvPr/>
+        </p:nvSpPr>
+        <p:spPr>
+          <a:xfrm>
+            <a:off x="6268083" y="3749157"/>
+            <a:ext cx="1661954" cy="801039"/>
+          </a:xfrm>
+          <a:prstGeom prst="roundRect">
+            <a:avLst/>
+          </a:prstGeom>
+          <a:noFill/>
+          <a:ln w="50800">
+            <a:solidFill>
+              <a:srgbClr val="00B0F0"/>
+            </a:solidFill>
+          </a:ln>
+        </p:spPr>
+        <p:style>
+          <a:lnRef idx="2">
+            <a:schemeClr val="accent1">
+              <a:shade val="50000"/>
+            </a:schemeClr>
+          </a:lnRef>
+          <a:fillRef idx="1">
+            <a:schemeClr val="accent1"/>
+          </a:fillRef>
+          <a:effectRef idx="0">
+            <a:schemeClr val="accent1"/>
+          </a:effectRef>
+          <a:fontRef idx="minor">
+            <a:schemeClr val="lt1"/>
+          </a:fontRef>
+        </p:style>
+        <p:txBody>
+          <a:bodyPr rot="0" spcFirstLastPara="0" vert="horz" wrap="square" lIns="91440" tIns="45720" rIns="91440" bIns="45720" numCol="1" spcCol="0" rtlCol="0" fromWordArt="0" anchor="ctr" anchorCtr="0" forceAA="0" compatLnSpc="1">
+            <a:prstTxWarp prst="textNoShape">
+              <a:avLst/>
+            </a:prstTxWarp>
+            <a:noAutofit/>
+          </a:bodyPr>
+          <a:lstStyle/>
+          <a:p>
+            <a:endParaRPr lang="fr-FR"/>
+          </a:p>
+        </p:txBody>
+      </p:sp>
+      <p:cxnSp>
+        <p:nvCxnSpPr>
+          <p:cNvPr id="29" name="Connecteur droit 28">
+            <a:extLst>
+              <a:ext uri="{FF2B5EF4-FFF2-40B4-BE49-F238E27FC236}">
+                <a16:creationId xmlns:a16="http://schemas.microsoft.com/office/drawing/2014/main" id="{275F8654-B445-4228-94F2-002ED50C11F4}"/>
+              </a:ext>
+            </a:extLst>
+          </p:cNvPr>
+          <p:cNvCxnSpPr>
+            <a:cxnSpLocks/>
+          </p:cNvCxnSpPr>
+          <p:nvPr/>
+        </p:nvCxnSpPr>
+        <p:spPr>
+          <a:xfrm flipH="1" flipV="1">
+            <a:off x="2002064" y="4570810"/>
+            <a:ext cx="2878658" cy="678299"/>
+          </a:xfrm>
+          <a:prstGeom prst="line">
+            <a:avLst/>
+          </a:prstGeom>
+          <a:ln>
+            <a:solidFill>
+              <a:schemeClr val="accent1"/>
+            </a:solidFill>
+          </a:ln>
+        </p:spPr>
+        <p:style>
+          <a:lnRef idx="3">
+            <a:schemeClr val="accent1"/>
+          </a:lnRef>
+          <a:fillRef idx="0">
+            <a:schemeClr val="accent1"/>
+          </a:fillRef>
+          <a:effectRef idx="2">
+            <a:schemeClr val="accent1"/>
+          </a:effectRef>
+          <a:fontRef idx="minor">
+            <a:schemeClr val="tx1"/>
+          </a:fontRef>
+        </p:style>
+      </p:cxnSp>
+      <p:sp>
+        <p:nvSpPr>
+          <p:cNvPr id="31" name="Zone de texte 45">
+            <a:extLst>
+              <a:ext uri="{FF2B5EF4-FFF2-40B4-BE49-F238E27FC236}">
+                <a16:creationId xmlns:a16="http://schemas.microsoft.com/office/drawing/2014/main" id="{4137D27B-845D-49BA-A870-304F07D89BFE}"/>
+              </a:ext>
+            </a:extLst>
+          </p:cNvPr>
+          <p:cNvSpPr txBox="1"/>
+          <p:nvPr/>
+        </p:nvSpPr>
+        <p:spPr>
+          <a:xfrm>
+            <a:off x="905817" y="4289822"/>
+            <a:ext cx="1095375" cy="561975"/>
+          </a:xfrm>
+          <a:prstGeom prst="rect">
+            <a:avLst/>
+          </a:prstGeom>
+          <a:solidFill>
+            <a:schemeClr val="lt1"/>
+          </a:solidFill>
+          <a:ln w="6350">
+            <a:solidFill>
+              <a:schemeClr val="accent1"/>
+            </a:solidFill>
+          </a:ln>
+        </p:spPr>
+        <p:txBody>
+          <a:bodyPr rot="0" spcFirstLastPara="0" vert="horz" wrap="square" lIns="91440" tIns="45720" rIns="91440" bIns="45720" numCol="1" spcCol="0" rtlCol="0" fromWordArt="0" anchor="t" anchorCtr="0" forceAA="0" compatLnSpc="1">
+            <a:prstTxWarp prst="textNoShape">
+              <a:avLst/>
+            </a:prstTxWarp>
+            <a:noAutofit/>
+          </a:bodyPr>
+          <a:lstStyle/>
+          <a:p>
+            <a:pPr>
+              <a:lnSpc>
+                <a:spcPct val="107000"/>
+              </a:lnSpc>
+              <a:spcAft>
+                <a:spcPts val="800"/>
+              </a:spcAft>
+            </a:pPr>
+            <a:r>
+              <a:rPr lang="fr-FR" sz="1000" dirty="0">
+                <a:solidFill>
+                  <a:schemeClr val="accent1"/>
+                </a:solidFill>
+                <a:effectLst/>
+                <a:latin typeface="Calibri" panose="020F0502020204030204" pitchFamily="34" charset="0"/>
+                <a:ea typeface="Calibri" panose="020F0502020204030204" pitchFamily="34" charset="0"/>
+                <a:cs typeface="Calibri" panose="020F0502020204030204" pitchFamily="34" charset="0"/>
+              </a:rPr>
+              <a:t>Application Web sur l’affichage de l’état de la salle</a:t>
+            </a:r>
+            <a:endParaRPr lang="fr-FR" sz="1100" dirty="0">
+              <a:solidFill>
+                <a:schemeClr val="accent1"/>
+              </a:solidFill>
+              <a:effectLst/>
+              <a:latin typeface="Calibri" panose="020F0502020204030204" pitchFamily="34" charset="0"/>
+              <a:ea typeface="Calibri" panose="020F0502020204030204" pitchFamily="34" charset="0"/>
+              <a:cs typeface="Times New Roman" panose="02020603050405020304" pitchFamily="18" charset="0"/>
+            </a:endParaRPr>
+          </a:p>
+        </p:txBody>
+      </p:sp>
+      <p:cxnSp>
+        <p:nvCxnSpPr>
+          <p:cNvPr id="32" name="Connecteur droit 31">
+            <a:extLst>
+              <a:ext uri="{FF2B5EF4-FFF2-40B4-BE49-F238E27FC236}">
+                <a16:creationId xmlns:a16="http://schemas.microsoft.com/office/drawing/2014/main" id="{7A108338-C537-43B1-B6F3-044BA5E019D3}"/>
+              </a:ext>
+            </a:extLst>
+          </p:cNvPr>
+          <p:cNvCxnSpPr>
+            <a:cxnSpLocks/>
+          </p:cNvCxnSpPr>
+          <p:nvPr/>
+        </p:nvCxnSpPr>
+        <p:spPr>
+          <a:xfrm flipV="1">
+            <a:off x="7026093" y="4775248"/>
+            <a:ext cx="2781391" cy="380401"/>
+          </a:xfrm>
+          <a:prstGeom prst="line">
+            <a:avLst/>
+          </a:prstGeom>
+          <a:ln>
+            <a:solidFill>
+              <a:srgbClr val="2FC9FF"/>
+            </a:solidFill>
+          </a:ln>
+        </p:spPr>
+        <p:style>
+          <a:lnRef idx="3">
+            <a:schemeClr val="accent1"/>
+          </a:lnRef>
+          <a:fillRef idx="0">
+            <a:schemeClr val="accent1"/>
+          </a:fillRef>
+          <a:effectRef idx="2">
+            <a:schemeClr val="accent1"/>
+          </a:effectRef>
+          <a:fontRef idx="minor">
+            <a:schemeClr val="tx1"/>
+          </a:fontRef>
+        </p:style>
+      </p:cxnSp>
+      <p:sp>
+        <p:nvSpPr>
+          <p:cNvPr id="34" name="Zone de texte 44">
+            <a:extLst>
+              <a:ext uri="{FF2B5EF4-FFF2-40B4-BE49-F238E27FC236}">
+                <a16:creationId xmlns:a16="http://schemas.microsoft.com/office/drawing/2014/main" id="{4684EDED-9F12-45D2-926B-0E58883DBD1C}"/>
+              </a:ext>
+            </a:extLst>
+          </p:cNvPr>
+          <p:cNvSpPr txBox="1"/>
+          <p:nvPr/>
+        </p:nvSpPr>
+        <p:spPr>
+          <a:xfrm>
+            <a:off x="9811861" y="4481244"/>
+            <a:ext cx="1095375" cy="561975"/>
+          </a:xfrm>
+          <a:prstGeom prst="rect">
+            <a:avLst/>
+          </a:prstGeom>
+          <a:solidFill>
+            <a:schemeClr val="lt1"/>
+          </a:solidFill>
+          <a:ln w="6350">
+            <a:solidFill>
+              <a:srgbClr val="2FC9FF"/>
+            </a:solidFill>
+          </a:ln>
+        </p:spPr>
+        <p:txBody>
+          <a:bodyPr rot="0" spcFirstLastPara="0" vert="horz" wrap="square" lIns="91440" tIns="45720" rIns="91440" bIns="45720" numCol="1" spcCol="0" rtlCol="0" fromWordArt="0" anchor="t" anchorCtr="0" forceAA="0" compatLnSpc="1">
+            <a:prstTxWarp prst="textNoShape">
+              <a:avLst/>
+            </a:prstTxWarp>
+            <a:noAutofit/>
+          </a:bodyPr>
+          <a:lstStyle/>
+          <a:p>
+            <a:pPr>
+              <a:lnSpc>
+                <a:spcPct val="107000"/>
+              </a:lnSpc>
+              <a:spcAft>
+                <a:spcPts val="800"/>
+              </a:spcAft>
+            </a:pPr>
+            <a:r>
+              <a:rPr lang="fr-FR" sz="1000">
+                <a:solidFill>
+                  <a:srgbClr val="2FC9FF"/>
+                </a:solidFill>
+                <a:effectLst/>
+                <a:latin typeface="Calibri" panose="020F0502020204030204" pitchFamily="34" charset="0"/>
+                <a:ea typeface="Calibri" panose="020F0502020204030204" pitchFamily="34" charset="0"/>
+                <a:cs typeface="Calibri" panose="020F0502020204030204" pitchFamily="34" charset="0"/>
+              </a:rPr>
+              <a:t>Application Web de pilotage des actionneurs</a:t>
+            </a:r>
+            <a:endParaRPr lang="fr-FR" sz="1100">
+              <a:effectLst/>
+              <a:latin typeface="Calibri" panose="020F0502020204030204" pitchFamily="34" charset="0"/>
+              <a:ea typeface="Calibri" panose="020F0502020204030204" pitchFamily="34" charset="0"/>
+              <a:cs typeface="Times New Roman" panose="02020603050405020304" pitchFamily="18" charset="0"/>
             </a:endParaRPr>
           </a:p>
         </p:txBody>
@@ -3955,6 +5353,101 @@
     <p:extLst>
       <p:ext uri="{BB962C8B-B14F-4D97-AF65-F5344CB8AC3E}">
         <p14:creationId xmlns:p14="http://schemas.microsoft.com/office/powerpoint/2010/main" val="3816919354"/>
+      </p:ext>
+    </p:extLst>
+  </p:cSld>
+  <p:clrMapOvr>
+    <a:masterClrMapping/>
+  </p:clrMapOvr>
+</p:sld>
+</file>
+
+<file path=ppt/slides/slide3.xml><?xml version="1.0" encoding="utf-8"?>
+<p:sld xmlns:a="http://schemas.openxmlformats.org/drawingml/2006/main" xmlns:r="http://schemas.openxmlformats.org/officeDocument/2006/relationships" xmlns:p="http://schemas.openxmlformats.org/presentationml/2006/main">
+  <p:cSld>
+    <p:spTree>
+      <p:nvGrpSpPr>
+        <p:cNvPr id="1" name=""/>
+        <p:cNvGrpSpPr/>
+        <p:nvPr/>
+      </p:nvGrpSpPr>
+      <p:grpSpPr>
+        <a:xfrm>
+          <a:off x="0" y="0"/>
+          <a:ext cx="0" cy="0"/>
+          <a:chOff x="0" y="0"/>
+          <a:chExt cx="0" cy="0"/>
+        </a:xfrm>
+      </p:grpSpPr>
+      <p:sp>
+        <p:nvSpPr>
+          <p:cNvPr id="2" name="Titre 1">
+            <a:extLst>
+              <a:ext uri="{FF2B5EF4-FFF2-40B4-BE49-F238E27FC236}">
+                <a16:creationId xmlns:a16="http://schemas.microsoft.com/office/drawing/2014/main" id="{3B0C423D-65A1-40D8-8751-302A287BBB8F}"/>
+              </a:ext>
+            </a:extLst>
+          </p:cNvPr>
+          <p:cNvSpPr>
+            <a:spLocks noGrp="1"/>
+          </p:cNvSpPr>
+          <p:nvPr>
+            <p:ph type="title"/>
+          </p:nvPr>
+        </p:nvSpPr>
+        <p:spPr/>
+        <p:txBody>
+          <a:bodyPr/>
+          <a:lstStyle/>
+          <a:p>
+            <a:pPr algn="ctr"/>
+            <a:r>
+              <a:rPr lang="fr-FR" b="1" dirty="0">
+                <a:latin typeface="+mn-lt"/>
+              </a:rPr>
+              <a:t>Mes tâches</a:t>
+            </a:r>
+          </a:p>
+        </p:txBody>
+      </p:sp>
+      <p:pic>
+        <p:nvPicPr>
+          <p:cNvPr id="4" name="Image 3">
+            <a:extLst>
+              <a:ext uri="{FF2B5EF4-FFF2-40B4-BE49-F238E27FC236}">
+                <a16:creationId xmlns:a16="http://schemas.microsoft.com/office/drawing/2014/main" id="{B7441BCA-F2F3-49D7-9D50-474CE98A3A2A}"/>
+              </a:ext>
+            </a:extLst>
+          </p:cNvPr>
+          <p:cNvPicPr/>
+          <p:nvPr/>
+        </p:nvPicPr>
+        <p:blipFill>
+          <a:blip r:embed="rId2">
+            <a:extLst>
+              <a:ext uri="{28A0092B-C50C-407E-A947-70E740481C1C}">
+                <a14:useLocalDpi xmlns:a14="http://schemas.microsoft.com/office/drawing/2010/main" val="0"/>
+              </a:ext>
+            </a:extLst>
+          </a:blip>
+          <a:stretch>
+            <a:fillRect/>
+          </a:stretch>
+        </p:blipFill>
+        <p:spPr>
+          <a:xfrm>
+            <a:off x="2876550" y="1690688"/>
+            <a:ext cx="6438900" cy="4362132"/>
+          </a:xfrm>
+          <a:prstGeom prst="rect">
+            <a:avLst/>
+          </a:prstGeom>
+        </p:spPr>
+      </p:pic>
+    </p:spTree>
+    <p:extLst>
+      <p:ext uri="{BB962C8B-B14F-4D97-AF65-F5344CB8AC3E}">
+        <p14:creationId xmlns:p14="http://schemas.microsoft.com/office/powerpoint/2010/main" val="3626107938"/>
       </p:ext>
     </p:extLst>
   </p:cSld>

</xml_diff>

<commit_message>
Modification des diagrammes de séquences
</commit_message>
<xml_diff>
--- a/Etudiants/Joshua/PremièreRevueDeProjet.pptx
+++ b/Etudiants/Joshua/PremièreRevueDeProjet.pptx
@@ -8,6 +8,7 @@
     <p:sldId id="256" r:id="rId2"/>
     <p:sldId id="257" r:id="rId3"/>
     <p:sldId id="258" r:id="rId4"/>
+    <p:sldId id="259" r:id="rId5"/>
   </p:sldIdLst>
   <p:sldSz cx="12192000" cy="6858000"/>
   <p:notesSz cx="6858000" cy="9144000"/>
@@ -261,7 +262,7 @@
           <a:p>
             <a:fld id="{A5A52D65-5D23-4759-866C-BD4D7E81B3B3}" type="datetimeFigureOut">
               <a:rPr lang="fr-FR" smtClean="0"/>
-              <a:t>21/01/2020</a:t>
+              <a:t>22/01/2020</a:t>
             </a:fld>
             <a:endParaRPr lang="fr-FR"/>
           </a:p>
@@ -459,7 +460,7 @@
           <a:p>
             <a:fld id="{A5A52D65-5D23-4759-866C-BD4D7E81B3B3}" type="datetimeFigureOut">
               <a:rPr lang="fr-FR" smtClean="0"/>
-              <a:t>21/01/2020</a:t>
+              <a:t>22/01/2020</a:t>
             </a:fld>
             <a:endParaRPr lang="fr-FR"/>
           </a:p>
@@ -667,7 +668,7 @@
           <a:p>
             <a:fld id="{A5A52D65-5D23-4759-866C-BD4D7E81B3B3}" type="datetimeFigureOut">
               <a:rPr lang="fr-FR" smtClean="0"/>
-              <a:t>21/01/2020</a:t>
+              <a:t>22/01/2020</a:t>
             </a:fld>
             <a:endParaRPr lang="fr-FR"/>
           </a:p>
@@ -865,7 +866,7 @@
           <a:p>
             <a:fld id="{A5A52D65-5D23-4759-866C-BD4D7E81B3B3}" type="datetimeFigureOut">
               <a:rPr lang="fr-FR" smtClean="0"/>
-              <a:t>21/01/2020</a:t>
+              <a:t>22/01/2020</a:t>
             </a:fld>
             <a:endParaRPr lang="fr-FR"/>
           </a:p>
@@ -1140,7 +1141,7 @@
           <a:p>
             <a:fld id="{A5A52D65-5D23-4759-866C-BD4D7E81B3B3}" type="datetimeFigureOut">
               <a:rPr lang="fr-FR" smtClean="0"/>
-              <a:t>21/01/2020</a:t>
+              <a:t>22/01/2020</a:t>
             </a:fld>
             <a:endParaRPr lang="fr-FR"/>
           </a:p>
@@ -1405,7 +1406,7 @@
           <a:p>
             <a:fld id="{A5A52D65-5D23-4759-866C-BD4D7E81B3B3}" type="datetimeFigureOut">
               <a:rPr lang="fr-FR" smtClean="0"/>
-              <a:t>21/01/2020</a:t>
+              <a:t>22/01/2020</a:t>
             </a:fld>
             <a:endParaRPr lang="fr-FR"/>
           </a:p>
@@ -1817,7 +1818,7 @@
           <a:p>
             <a:fld id="{A5A52D65-5D23-4759-866C-BD4D7E81B3B3}" type="datetimeFigureOut">
               <a:rPr lang="fr-FR" smtClean="0"/>
-              <a:t>21/01/2020</a:t>
+              <a:t>22/01/2020</a:t>
             </a:fld>
             <a:endParaRPr lang="fr-FR"/>
           </a:p>
@@ -1958,7 +1959,7 @@
           <a:p>
             <a:fld id="{A5A52D65-5D23-4759-866C-BD4D7E81B3B3}" type="datetimeFigureOut">
               <a:rPr lang="fr-FR" smtClean="0"/>
-              <a:t>21/01/2020</a:t>
+              <a:t>22/01/2020</a:t>
             </a:fld>
             <a:endParaRPr lang="fr-FR"/>
           </a:p>
@@ -2071,7 +2072,7 @@
           <a:p>
             <a:fld id="{A5A52D65-5D23-4759-866C-BD4D7E81B3B3}" type="datetimeFigureOut">
               <a:rPr lang="fr-FR" smtClean="0"/>
-              <a:t>21/01/2020</a:t>
+              <a:t>22/01/2020</a:t>
             </a:fld>
             <a:endParaRPr lang="fr-FR"/>
           </a:p>
@@ -2382,7 +2383,7 @@
           <a:p>
             <a:fld id="{A5A52D65-5D23-4759-866C-BD4D7E81B3B3}" type="datetimeFigureOut">
               <a:rPr lang="fr-FR" smtClean="0"/>
-              <a:t>21/01/2020</a:t>
+              <a:t>22/01/2020</a:t>
             </a:fld>
             <a:endParaRPr lang="fr-FR"/>
           </a:p>
@@ -2670,7 +2671,7 @@
           <a:p>
             <a:fld id="{A5A52D65-5D23-4759-866C-BD4D7E81B3B3}" type="datetimeFigureOut">
               <a:rPr lang="fr-FR" smtClean="0"/>
-              <a:t>21/01/2020</a:t>
+              <a:t>22/01/2020</a:t>
             </a:fld>
             <a:endParaRPr lang="fr-FR"/>
           </a:p>
@@ -2911,7 +2912,7 @@
           <a:p>
             <a:fld id="{A5A52D65-5D23-4759-866C-BD4D7E81B3B3}" type="datetimeFigureOut">
               <a:rPr lang="fr-FR" smtClean="0"/>
-              <a:t>21/01/2020</a:t>
+              <a:t>22/01/2020</a:t>
             </a:fld>
             <a:endParaRPr lang="fr-FR"/>
           </a:p>
@@ -5457,6 +5458,67 @@
 </p:sld>
 </file>
 
+<file path=ppt/slides/slide4.xml><?xml version="1.0" encoding="utf-8"?>
+<p:sld xmlns:a="http://schemas.openxmlformats.org/drawingml/2006/main" xmlns:r="http://schemas.openxmlformats.org/officeDocument/2006/relationships" xmlns:p="http://schemas.openxmlformats.org/presentationml/2006/main">
+  <p:cSld>
+    <p:spTree>
+      <p:nvGrpSpPr>
+        <p:cNvPr id="1" name=""/>
+        <p:cNvGrpSpPr/>
+        <p:nvPr/>
+      </p:nvGrpSpPr>
+      <p:grpSpPr>
+        <a:xfrm>
+          <a:off x="0" y="0"/>
+          <a:ext cx="0" cy="0"/>
+          <a:chOff x="0" y="0"/>
+          <a:chExt cx="0" cy="0"/>
+        </a:xfrm>
+      </p:grpSpPr>
+      <p:sp>
+        <p:nvSpPr>
+          <p:cNvPr id="2" name="Titre 1">
+            <a:extLst>
+              <a:ext uri="{FF2B5EF4-FFF2-40B4-BE49-F238E27FC236}">
+                <a16:creationId xmlns:a16="http://schemas.microsoft.com/office/drawing/2014/main" id="{DF612B1D-5567-4A97-95B9-F3C81010C1DF}"/>
+              </a:ext>
+            </a:extLst>
+          </p:cNvPr>
+          <p:cNvSpPr>
+            <a:spLocks noGrp="1"/>
+          </p:cNvSpPr>
+          <p:nvPr>
+            <p:ph type="title"/>
+          </p:nvPr>
+        </p:nvSpPr>
+        <p:spPr/>
+        <p:txBody>
+          <a:bodyPr/>
+          <a:lstStyle/>
+          <a:p>
+            <a:pPr algn="ctr"/>
+            <a:r>
+              <a:rPr lang="fr-FR" b="1" dirty="0">
+                <a:latin typeface="+mn-lt"/>
+              </a:rPr>
+              <a:t>Mécanisme n°1 : </a:t>
+            </a:r>
+          </a:p>
+        </p:txBody>
+      </p:sp>
+    </p:spTree>
+    <p:extLst>
+      <p:ext uri="{BB962C8B-B14F-4D97-AF65-F5344CB8AC3E}">
+        <p14:creationId xmlns:p14="http://schemas.microsoft.com/office/powerpoint/2010/main" val="2394584400"/>
+      </p:ext>
+    </p:extLst>
+  </p:cSld>
+  <p:clrMapOvr>
+    <a:masterClrMapping/>
+  </p:clrMapOvr>
+</p:sld>
+</file>
+
 <file path=ppt/theme/theme1.xml><?xml version="1.0" encoding="utf-8"?>
 <a:theme xmlns:a="http://schemas.openxmlformats.org/drawingml/2006/main" name="Thème Office">
   <a:themeElements>

</xml_diff>

<commit_message>
Modification des diagrammes de séquence et diaporama
</commit_message>
<xml_diff>
--- a/Etudiants/Joshua/PremièreRevueDeProjet.pptx
+++ b/Etudiants/Joshua/PremièreRevueDeProjet.pptx
@@ -268,7 +268,7 @@
           <a:p>
             <a:fld id="{A5A52D65-5D23-4759-866C-BD4D7E81B3B3}" type="datetimeFigureOut">
               <a:rPr lang="fr-FR" smtClean="0"/>
-              <a:t>04/02/2020</a:t>
+              <a:t>07/02/2020</a:t>
             </a:fld>
             <a:endParaRPr lang="fr-FR"/>
           </a:p>
@@ -466,7 +466,7 @@
           <a:p>
             <a:fld id="{A5A52D65-5D23-4759-866C-BD4D7E81B3B3}" type="datetimeFigureOut">
               <a:rPr lang="fr-FR" smtClean="0"/>
-              <a:t>04/02/2020</a:t>
+              <a:t>07/02/2020</a:t>
             </a:fld>
             <a:endParaRPr lang="fr-FR"/>
           </a:p>
@@ -674,7 +674,7 @@
           <a:p>
             <a:fld id="{A5A52D65-5D23-4759-866C-BD4D7E81B3B3}" type="datetimeFigureOut">
               <a:rPr lang="fr-FR" smtClean="0"/>
-              <a:t>04/02/2020</a:t>
+              <a:t>07/02/2020</a:t>
             </a:fld>
             <a:endParaRPr lang="fr-FR"/>
           </a:p>
@@ -872,7 +872,7 @@
           <a:p>
             <a:fld id="{A5A52D65-5D23-4759-866C-BD4D7E81B3B3}" type="datetimeFigureOut">
               <a:rPr lang="fr-FR" smtClean="0"/>
-              <a:t>04/02/2020</a:t>
+              <a:t>07/02/2020</a:t>
             </a:fld>
             <a:endParaRPr lang="fr-FR"/>
           </a:p>
@@ -1147,7 +1147,7 @@
           <a:p>
             <a:fld id="{A5A52D65-5D23-4759-866C-BD4D7E81B3B3}" type="datetimeFigureOut">
               <a:rPr lang="fr-FR" smtClean="0"/>
-              <a:t>04/02/2020</a:t>
+              <a:t>07/02/2020</a:t>
             </a:fld>
             <a:endParaRPr lang="fr-FR"/>
           </a:p>
@@ -1412,7 +1412,7 @@
           <a:p>
             <a:fld id="{A5A52D65-5D23-4759-866C-BD4D7E81B3B3}" type="datetimeFigureOut">
               <a:rPr lang="fr-FR" smtClean="0"/>
-              <a:t>04/02/2020</a:t>
+              <a:t>07/02/2020</a:t>
             </a:fld>
             <a:endParaRPr lang="fr-FR"/>
           </a:p>
@@ -1824,7 +1824,7 @@
           <a:p>
             <a:fld id="{A5A52D65-5D23-4759-866C-BD4D7E81B3B3}" type="datetimeFigureOut">
               <a:rPr lang="fr-FR" smtClean="0"/>
-              <a:t>04/02/2020</a:t>
+              <a:t>07/02/2020</a:t>
             </a:fld>
             <a:endParaRPr lang="fr-FR"/>
           </a:p>
@@ -1965,7 +1965,7 @@
           <a:p>
             <a:fld id="{A5A52D65-5D23-4759-866C-BD4D7E81B3B3}" type="datetimeFigureOut">
               <a:rPr lang="fr-FR" smtClean="0"/>
-              <a:t>04/02/2020</a:t>
+              <a:t>07/02/2020</a:t>
             </a:fld>
             <a:endParaRPr lang="fr-FR"/>
           </a:p>
@@ -2078,7 +2078,7 @@
           <a:p>
             <a:fld id="{A5A52D65-5D23-4759-866C-BD4D7E81B3B3}" type="datetimeFigureOut">
               <a:rPr lang="fr-FR" smtClean="0"/>
-              <a:t>04/02/2020</a:t>
+              <a:t>07/02/2020</a:t>
             </a:fld>
             <a:endParaRPr lang="fr-FR"/>
           </a:p>
@@ -2389,7 +2389,7 @@
           <a:p>
             <a:fld id="{A5A52D65-5D23-4759-866C-BD4D7E81B3B3}" type="datetimeFigureOut">
               <a:rPr lang="fr-FR" smtClean="0"/>
-              <a:t>04/02/2020</a:t>
+              <a:t>07/02/2020</a:t>
             </a:fld>
             <a:endParaRPr lang="fr-FR"/>
           </a:p>
@@ -2677,7 +2677,7 @@
           <a:p>
             <a:fld id="{A5A52D65-5D23-4759-866C-BD4D7E81B3B3}" type="datetimeFigureOut">
               <a:rPr lang="fr-FR" smtClean="0"/>
-              <a:t>04/02/2020</a:t>
+              <a:t>07/02/2020</a:t>
             </a:fld>
             <a:endParaRPr lang="fr-FR"/>
           </a:p>
@@ -2918,7 +2918,7 @@
           <a:p>
             <a:fld id="{A5A52D65-5D23-4759-866C-BD4D7E81B3B3}" type="datetimeFigureOut">
               <a:rPr lang="fr-FR" smtClean="0"/>
-              <a:t>04/02/2020</a:t>
+              <a:t>07/02/2020</a:t>
             </a:fld>
             <a:endParaRPr lang="fr-FR"/>
           </a:p>
@@ -3990,13 +3990,13 @@
   <p:clrMapOvr>
     <a:masterClrMapping/>
   </p:clrMapOvr>
-  <mc:AlternateContent xmlns:mc="http://schemas.openxmlformats.org/markup-compatibility/2006">
-    <mc:Choice xmlns:p14="http://schemas.microsoft.com/office/powerpoint/2010/main" Requires="p14">
+  <mc:AlternateContent xmlns:mc="http://schemas.openxmlformats.org/markup-compatibility/2006" xmlns:p14="http://schemas.microsoft.com/office/powerpoint/2010/main">
+    <mc:Choice Requires="p14">
       <p:transition spd="med" p14:dur="700">
         <p:fade/>
       </p:transition>
     </mc:Choice>
-    <mc:Fallback>
+    <mc:Fallback xmlns="">
       <p:transition spd="med">
         <p:fade/>
       </p:transition>
@@ -4669,13 +4669,13 @@
   <p:clrMapOvr>
     <a:masterClrMapping/>
   </p:clrMapOvr>
-  <mc:AlternateContent xmlns:mc="http://schemas.openxmlformats.org/markup-compatibility/2006">
-    <mc:Choice xmlns:p14="http://schemas.microsoft.com/office/powerpoint/2010/main" Requires="p14">
+  <mc:AlternateContent xmlns:mc="http://schemas.openxmlformats.org/markup-compatibility/2006" xmlns:p14="http://schemas.microsoft.com/office/powerpoint/2010/main">
+    <mc:Choice Requires="p14">
       <p:transition spd="med" p14:dur="700">
         <p:fade/>
       </p:transition>
     </mc:Choice>
-    <mc:Fallback>
+    <mc:Fallback xmlns="">
       <p:transition spd="med">
         <p:fade/>
       </p:transition>
@@ -6641,7 +6641,13 @@
           <a:lstStyle/>
           <a:p>
             <a:r>
-              <a:rPr lang="fr-FR" strike="sngStrike" dirty="0"/>
+              <a:rPr lang="fr-FR" dirty="0">
+                <a:solidFill>
+                  <a:schemeClr val="bg1">
+                    <a:lumMod val="75000"/>
+                  </a:schemeClr>
+                </a:solidFill>
+              </a:rPr>
               <a:t>Diagrammes</a:t>
             </a:r>
           </a:p>
@@ -6676,7 +6682,13 @@
           <a:lstStyle/>
           <a:p>
             <a:r>
-              <a:rPr lang="fr-FR" strike="sngStrike" dirty="0"/>
+              <a:rPr lang="fr-FR" dirty="0">
+                <a:solidFill>
+                  <a:schemeClr val="bg1">
+                    <a:lumMod val="75000"/>
+                  </a:schemeClr>
+                </a:solidFill>
+              </a:rPr>
               <a:t>Mes tâches</a:t>
             </a:r>
           </a:p>
@@ -6711,7 +6723,13 @@
           <a:lstStyle/>
           <a:p>
             <a:r>
-              <a:rPr lang="fr-FR" strike="sngStrike" dirty="0"/>
+              <a:rPr lang="fr-FR" dirty="0">
+                <a:solidFill>
+                  <a:schemeClr val="bg1">
+                    <a:lumMod val="75000"/>
+                  </a:schemeClr>
+                </a:solidFill>
+              </a:rPr>
               <a:t>Mécanisme n°1</a:t>
             </a:r>
           </a:p>
@@ -6746,7 +6764,13 @@
           <a:lstStyle/>
           <a:p>
             <a:r>
-              <a:rPr lang="fr-FR" strike="sngStrike" dirty="0"/>
+              <a:rPr lang="fr-FR" dirty="0">
+                <a:solidFill>
+                  <a:schemeClr val="bg1">
+                    <a:lumMod val="75000"/>
+                  </a:schemeClr>
+                </a:solidFill>
+              </a:rPr>
               <a:t>Mécanisme n°2</a:t>
             </a:r>
           </a:p>
@@ -6781,7 +6805,13 @@
           <a:lstStyle/>
           <a:p>
             <a:r>
-              <a:rPr lang="fr-FR" strike="sngStrike" dirty="0"/>
+              <a:rPr lang="fr-FR" dirty="0">
+                <a:solidFill>
+                  <a:schemeClr val="bg1">
+                    <a:lumMod val="75000"/>
+                  </a:schemeClr>
+                </a:solidFill>
+              </a:rPr>
               <a:t>Mécanisme n°3</a:t>
             </a:r>
           </a:p>
@@ -6816,7 +6846,13 @@
           <a:lstStyle/>
           <a:p>
             <a:r>
-              <a:rPr lang="fr-FR" strike="sngStrike" dirty="0"/>
+              <a:rPr lang="fr-FR" dirty="0">
+                <a:solidFill>
+                  <a:schemeClr val="bg1">
+                    <a:lumMod val="75000"/>
+                  </a:schemeClr>
+                </a:solidFill>
+              </a:rPr>
               <a:t>Appli WEB</a:t>
             </a:r>
           </a:p>
@@ -6851,9 +6887,295 @@
           <a:lstStyle/>
           <a:p>
             <a:r>
-              <a:rPr lang="fr-FR" strike="sngStrike" dirty="0"/>
+              <a:rPr lang="fr-FR" dirty="0">
+                <a:solidFill>
+                  <a:schemeClr val="bg1">
+                    <a:lumMod val="75000"/>
+                  </a:schemeClr>
+                </a:solidFill>
+              </a:rPr>
               <a:t>Partie réseau</a:t>
             </a:r>
+          </a:p>
+        </p:txBody>
+      </p:sp>
+      <p:sp>
+        <p:nvSpPr>
+          <p:cNvPr id="57" name="Rectangle : coins arrondis 56">
+            <a:extLst>
+              <a:ext uri="{FF2B5EF4-FFF2-40B4-BE49-F238E27FC236}">
+                <a16:creationId xmlns:a16="http://schemas.microsoft.com/office/drawing/2014/main" id="{4E86D547-CDED-413C-B2CE-F17220741502}"/>
+              </a:ext>
+            </a:extLst>
+          </p:cNvPr>
+          <p:cNvSpPr/>
+          <p:nvPr/>
+        </p:nvSpPr>
+        <p:spPr>
+          <a:xfrm>
+            <a:off x="4870727" y="5233233"/>
+            <a:ext cx="1231616" cy="186386"/>
+          </a:xfrm>
+          <a:prstGeom prst="roundRect">
+            <a:avLst/>
+          </a:prstGeom>
+          <a:noFill/>
+          <a:ln w="50800">
+            <a:solidFill>
+              <a:schemeClr val="accent1"/>
+            </a:solidFill>
+          </a:ln>
+        </p:spPr>
+        <p:style>
+          <a:lnRef idx="2">
+            <a:schemeClr val="accent1">
+              <a:shade val="50000"/>
+            </a:schemeClr>
+          </a:lnRef>
+          <a:fillRef idx="1">
+            <a:schemeClr val="accent1"/>
+          </a:fillRef>
+          <a:effectRef idx="0">
+            <a:schemeClr val="accent1"/>
+          </a:effectRef>
+          <a:fontRef idx="minor">
+            <a:schemeClr val="lt1"/>
+          </a:fontRef>
+        </p:style>
+        <p:txBody>
+          <a:bodyPr rot="0" spcFirstLastPara="0" vert="horz" wrap="square" lIns="91440" tIns="45720" rIns="91440" bIns="45720" numCol="1" spcCol="0" rtlCol="0" fromWordArt="0" anchor="ctr" anchorCtr="0" forceAA="0" compatLnSpc="1">
+            <a:prstTxWarp prst="textNoShape">
+              <a:avLst/>
+            </a:prstTxWarp>
+            <a:noAutofit/>
+          </a:bodyPr>
+          <a:lstStyle/>
+          <a:p>
+            <a:endParaRPr lang="fr-FR"/>
+          </a:p>
+        </p:txBody>
+      </p:sp>
+      <p:sp>
+        <p:nvSpPr>
+          <p:cNvPr id="58" name="Rectangle : coins arrondis 57">
+            <a:extLst>
+              <a:ext uri="{FF2B5EF4-FFF2-40B4-BE49-F238E27FC236}">
+                <a16:creationId xmlns:a16="http://schemas.microsoft.com/office/drawing/2014/main" id="{FDB8A860-7E65-4ED4-9C14-C7E67E5C3E1D}"/>
+              </a:ext>
+            </a:extLst>
+          </p:cNvPr>
+          <p:cNvSpPr/>
+          <p:nvPr/>
+        </p:nvSpPr>
+        <p:spPr>
+          <a:xfrm>
+            <a:off x="4870727" y="5477808"/>
+            <a:ext cx="1225272" cy="176321"/>
+          </a:xfrm>
+          <a:prstGeom prst="roundRect">
+            <a:avLst/>
+          </a:prstGeom>
+          <a:noFill/>
+          <a:ln w="50800">
+            <a:solidFill>
+              <a:srgbClr val="00B0F0"/>
+            </a:solidFill>
+          </a:ln>
+        </p:spPr>
+        <p:style>
+          <a:lnRef idx="2">
+            <a:schemeClr val="accent1">
+              <a:shade val="50000"/>
+            </a:schemeClr>
+          </a:lnRef>
+          <a:fillRef idx="1">
+            <a:schemeClr val="accent1"/>
+          </a:fillRef>
+          <a:effectRef idx="0">
+            <a:schemeClr val="accent1"/>
+          </a:effectRef>
+          <a:fontRef idx="minor">
+            <a:schemeClr val="lt1"/>
+          </a:fontRef>
+        </p:style>
+        <p:txBody>
+          <a:bodyPr rot="0" spcFirstLastPara="0" vert="horz" wrap="square" lIns="91440" tIns="45720" rIns="91440" bIns="45720" numCol="1" spcCol="0" rtlCol="0" fromWordArt="0" anchor="ctr" anchorCtr="0" forceAA="0" compatLnSpc="1">
+            <a:prstTxWarp prst="textNoShape">
+              <a:avLst/>
+            </a:prstTxWarp>
+            <a:noAutofit/>
+          </a:bodyPr>
+          <a:lstStyle/>
+          <a:p>
+            <a:endParaRPr lang="fr-FR"/>
+          </a:p>
+        </p:txBody>
+      </p:sp>
+      <p:sp>
+        <p:nvSpPr>
+          <p:cNvPr id="59" name="Rectangle : coins arrondis 58">
+            <a:extLst>
+              <a:ext uri="{FF2B5EF4-FFF2-40B4-BE49-F238E27FC236}">
+                <a16:creationId xmlns:a16="http://schemas.microsoft.com/office/drawing/2014/main" id="{757A1A26-DD35-45CE-B13B-352F85964001}"/>
+              </a:ext>
+            </a:extLst>
+          </p:cNvPr>
+          <p:cNvSpPr/>
+          <p:nvPr/>
+        </p:nvSpPr>
+        <p:spPr>
+          <a:xfrm>
+            <a:off x="2735703" y="5742514"/>
+            <a:ext cx="693297" cy="158598"/>
+          </a:xfrm>
+          <a:prstGeom prst="roundRect">
+            <a:avLst/>
+          </a:prstGeom>
+          <a:noFill/>
+          <a:ln w="50800">
+            <a:solidFill>
+              <a:schemeClr val="accent1"/>
+            </a:solidFill>
+          </a:ln>
+        </p:spPr>
+        <p:style>
+          <a:lnRef idx="2">
+            <a:schemeClr val="accent1">
+              <a:shade val="50000"/>
+            </a:schemeClr>
+          </a:lnRef>
+          <a:fillRef idx="1">
+            <a:schemeClr val="accent1"/>
+          </a:fillRef>
+          <a:effectRef idx="0">
+            <a:schemeClr val="accent1"/>
+          </a:effectRef>
+          <a:fontRef idx="minor">
+            <a:schemeClr val="lt1"/>
+          </a:fontRef>
+        </p:style>
+        <p:txBody>
+          <a:bodyPr rot="0" spcFirstLastPara="0" vert="horz" wrap="square" lIns="91440" tIns="45720" rIns="91440" bIns="45720" numCol="1" spcCol="0" rtlCol="0" fromWordArt="0" anchor="ctr" anchorCtr="0" forceAA="0" compatLnSpc="1">
+            <a:prstTxWarp prst="textNoShape">
+              <a:avLst/>
+            </a:prstTxWarp>
+            <a:noAutofit/>
+          </a:bodyPr>
+          <a:lstStyle/>
+          <a:p>
+            <a:endParaRPr lang="fr-FR"/>
+          </a:p>
+        </p:txBody>
+      </p:sp>
+      <p:sp>
+        <p:nvSpPr>
+          <p:cNvPr id="60" name="Rectangle : coins arrondis 59">
+            <a:extLst>
+              <a:ext uri="{FF2B5EF4-FFF2-40B4-BE49-F238E27FC236}">
+                <a16:creationId xmlns:a16="http://schemas.microsoft.com/office/drawing/2014/main" id="{5E7A9175-CB2C-4FEE-9D0F-A17674E4EF5C}"/>
+              </a:ext>
+            </a:extLst>
+          </p:cNvPr>
+          <p:cNvSpPr/>
+          <p:nvPr/>
+        </p:nvSpPr>
+        <p:spPr>
+          <a:xfrm>
+            <a:off x="2724770" y="5953127"/>
+            <a:ext cx="704230" cy="158598"/>
+          </a:xfrm>
+          <a:prstGeom prst="roundRect">
+            <a:avLst/>
+          </a:prstGeom>
+          <a:noFill/>
+          <a:ln w="50800">
+            <a:solidFill>
+              <a:srgbClr val="92D050"/>
+            </a:solidFill>
+          </a:ln>
+        </p:spPr>
+        <p:style>
+          <a:lnRef idx="2">
+            <a:schemeClr val="accent1">
+              <a:shade val="50000"/>
+            </a:schemeClr>
+          </a:lnRef>
+          <a:fillRef idx="1">
+            <a:schemeClr val="accent1"/>
+          </a:fillRef>
+          <a:effectRef idx="0">
+            <a:schemeClr val="accent1"/>
+          </a:effectRef>
+          <a:fontRef idx="minor">
+            <a:schemeClr val="lt1"/>
+          </a:fontRef>
+        </p:style>
+        <p:txBody>
+          <a:bodyPr rot="0" spcFirstLastPara="0" vert="horz" wrap="square" lIns="91440" tIns="45720" rIns="91440" bIns="45720" numCol="1" spcCol="0" rtlCol="0" fromWordArt="0" anchor="ctr" anchorCtr="0" forceAA="0" compatLnSpc="1">
+            <a:prstTxWarp prst="textNoShape">
+              <a:avLst/>
+            </a:prstTxWarp>
+            <a:noAutofit/>
+          </a:bodyPr>
+          <a:lstStyle/>
+          <a:p>
+            <a:endParaRPr lang="fr-FR"/>
+          </a:p>
+        </p:txBody>
+      </p:sp>
+      <p:sp>
+        <p:nvSpPr>
+          <p:cNvPr id="61" name="Rectangle : coins arrondis 60">
+            <a:extLst>
+              <a:ext uri="{FF2B5EF4-FFF2-40B4-BE49-F238E27FC236}">
+                <a16:creationId xmlns:a16="http://schemas.microsoft.com/office/drawing/2014/main" id="{96276102-8004-4922-9D8C-69A2E5A40FF4}"/>
+              </a:ext>
+            </a:extLst>
+          </p:cNvPr>
+          <p:cNvSpPr/>
+          <p:nvPr/>
+        </p:nvSpPr>
+        <p:spPr>
+          <a:xfrm>
+            <a:off x="8244502" y="3108982"/>
+            <a:ext cx="1024004" cy="164306"/>
+          </a:xfrm>
+          <a:prstGeom prst="roundRect">
+            <a:avLst/>
+          </a:prstGeom>
+          <a:noFill/>
+          <a:ln w="50800">
+            <a:solidFill>
+              <a:srgbClr val="FF0000"/>
+            </a:solidFill>
+          </a:ln>
+        </p:spPr>
+        <p:style>
+          <a:lnRef idx="2">
+            <a:schemeClr val="accent1">
+              <a:shade val="50000"/>
+            </a:schemeClr>
+          </a:lnRef>
+          <a:fillRef idx="1">
+            <a:schemeClr val="accent1"/>
+          </a:fillRef>
+          <a:effectRef idx="0">
+            <a:schemeClr val="accent1"/>
+          </a:effectRef>
+          <a:fontRef idx="minor">
+            <a:schemeClr val="lt1"/>
+          </a:fontRef>
+        </p:style>
+        <p:txBody>
+          <a:bodyPr rot="0" spcFirstLastPara="0" vert="horz" wrap="square" lIns="91440" tIns="45720" rIns="91440" bIns="45720" numCol="1" spcCol="0" rtlCol="0" fromWordArt="0" anchor="ctr" anchorCtr="0" forceAA="0" compatLnSpc="1">
+            <a:prstTxWarp prst="textNoShape">
+              <a:avLst/>
+            </a:prstTxWarp>
+            <a:noAutofit/>
+          </a:bodyPr>
+          <a:lstStyle/>
+          <a:p>
+            <a:endParaRPr lang="fr-FR"/>
           </a:p>
         </p:txBody>
       </p:sp>
@@ -6867,13 +7189,13 @@
   <p:clrMapOvr>
     <a:masterClrMapping/>
   </p:clrMapOvr>
-  <mc:AlternateContent xmlns:mc="http://schemas.openxmlformats.org/markup-compatibility/2006">
-    <mc:Choice xmlns:p14="http://schemas.microsoft.com/office/powerpoint/2010/main" Requires="p14">
+  <mc:AlternateContent xmlns:mc="http://schemas.openxmlformats.org/markup-compatibility/2006" xmlns:p14="http://schemas.microsoft.com/office/powerpoint/2010/main">
+    <mc:Choice Requires="p14">
       <p:transition spd="med" p14:dur="700">
         <p:fade/>
       </p:transition>
     </mc:Choice>
-    <mc:Fallback>
+    <mc:Fallback xmlns="">
       <p:transition spd="med">
         <p:fade/>
       </p:transition>
@@ -7022,6 +7344,96 @@
                       </p:childTnLst>
                     </p:cTn>
                   </p:par>
+                  <p:par>
+                    <p:cTn id="15" fill="hold">
+                      <p:stCondLst>
+                        <p:cond delay="indefinite"/>
+                      </p:stCondLst>
+                      <p:childTnLst>
+                        <p:par>
+                          <p:cTn id="16" fill="hold">
+                            <p:stCondLst>
+                              <p:cond delay="0"/>
+                            </p:stCondLst>
+                            <p:childTnLst>
+                              <p:par>
+                                <p:cTn id="17" presetID="1" presetClass="entr" presetSubtype="0" fill="hold" grpId="0" nodeType="clickEffect">
+                                  <p:stCondLst>
+                                    <p:cond delay="0"/>
+                                  </p:stCondLst>
+                                  <p:childTnLst>
+                                    <p:set>
+                                      <p:cBhvr>
+                                        <p:cTn id="18" dur="1" fill="hold">
+                                          <p:stCondLst>
+                                            <p:cond delay="0"/>
+                                          </p:stCondLst>
+                                        </p:cTn>
+                                        <p:tgtEl>
+                                          <p:spTgt spid="57"/>
+                                        </p:tgtEl>
+                                        <p:attrNameLst>
+                                          <p:attrName>style.visibility</p:attrName>
+                                        </p:attrNameLst>
+                                      </p:cBhvr>
+                                      <p:to>
+                                        <p:strVal val="visible"/>
+                                      </p:to>
+                                    </p:set>
+                                  </p:childTnLst>
+                                </p:cTn>
+                              </p:par>
+                            </p:childTnLst>
+                          </p:cTn>
+                        </p:par>
+                      </p:childTnLst>
+                    </p:cTn>
+                  </p:par>
+                  <p:par>
+                    <p:cTn id="19" fill="hold">
+                      <p:stCondLst>
+                        <p:cond delay="indefinite"/>
+                      </p:stCondLst>
+                      <p:childTnLst>
+                        <p:par>
+                          <p:cTn id="20" fill="hold">
+                            <p:stCondLst>
+                              <p:cond delay="0"/>
+                            </p:stCondLst>
+                            <p:childTnLst>
+                              <p:par>
+                                <p:cTn id="21" presetID="1" presetClass="entr" presetSubtype="0" fill="hold" grpId="0" nodeType="clickEffect">
+                                  <p:stCondLst>
+                                    <p:cond delay="0"/>
+                                  </p:stCondLst>
+                                  <p:childTnLst>
+                                    <p:set>
+                                      <p:cBhvr>
+                                        <p:cTn id="22" dur="1" fill="hold">
+                                          <p:stCondLst>
+                                            <p:cond delay="0"/>
+                                          </p:stCondLst>
+                                        </p:cTn>
+                                        <p:tgtEl>
+                                          <p:spTgt spid="59"/>
+                                        </p:tgtEl>
+                                        <p:attrNameLst>
+                                          <p:attrName>style.visibility</p:attrName>
+                                        </p:attrNameLst>
+                                      </p:cBhvr>
+                                      <p:to>
+                                        <p:strVal val="visible"/>
+                                      </p:to>
+                                    </p:set>
+                                  </p:childTnLst>
+                                </p:cTn>
+                              </p:par>
+                            </p:childTnLst>
+                          </p:cTn>
+                        </p:par>
+                      </p:childTnLst>
+                    </p:cTn>
+                  </p:par>
                 </p:childTnLst>
               </p:cTn>
               <p:prevCondLst>
@@ -7047,6 +7459,8 @@
       <p:bldP spid="5" grpId="0" animBg="1"/>
       <p:bldP spid="7" grpId="0" animBg="1"/>
       <p:bldP spid="8" grpId="0" animBg="1"/>
+      <p:bldP spid="57" grpId="0" animBg="1"/>
+      <p:bldP spid="59" grpId="0" animBg="1"/>
     </p:bldLst>
   </p:timing>
 </p:sld>
@@ -7709,7 +8123,13 @@
           <a:lstStyle/>
           <a:p>
             <a:r>
-              <a:rPr lang="fr-FR" strike="sngStrike" dirty="0"/>
+              <a:rPr lang="fr-FR" dirty="0">
+                <a:solidFill>
+                  <a:schemeClr val="bg1">
+                    <a:lumMod val="75000"/>
+                  </a:schemeClr>
+                </a:solidFill>
+              </a:rPr>
               <a:t>Introduction</a:t>
             </a:r>
           </a:p>
@@ -7779,7 +8199,13 @@
           <a:lstStyle/>
           <a:p>
             <a:r>
-              <a:rPr lang="fr-FR" strike="sngStrike" dirty="0"/>
+              <a:rPr lang="fr-FR" dirty="0">
+                <a:solidFill>
+                  <a:schemeClr val="bg1">
+                    <a:lumMod val="75000"/>
+                  </a:schemeClr>
+                </a:solidFill>
+              </a:rPr>
               <a:t>Mes tâches</a:t>
             </a:r>
           </a:p>
@@ -7787,10 +8213,10 @@
       </p:sp>
       <p:sp>
         <p:nvSpPr>
-          <p:cNvPr id="18" name="ZoneTexte 17">
-            <a:extLst>
-              <a:ext uri="{FF2B5EF4-FFF2-40B4-BE49-F238E27FC236}">
-                <a16:creationId xmlns:a16="http://schemas.microsoft.com/office/drawing/2014/main" id="{AC40BAAD-E4FB-476D-88C3-2D4D26357826}"/>
+          <p:cNvPr id="24" name="ZoneTexte 23">
+            <a:extLst>
+              <a:ext uri="{FF2B5EF4-FFF2-40B4-BE49-F238E27FC236}">
+                <a16:creationId xmlns:a16="http://schemas.microsoft.com/office/drawing/2014/main" id="{B59358DB-6944-457B-8B23-35EBF188137C}"/>
               </a:ext>
             </a:extLst>
           </p:cNvPr>
@@ -7814,7 +8240,13 @@
           <a:lstStyle/>
           <a:p>
             <a:r>
-              <a:rPr lang="fr-FR" strike="sngStrike" dirty="0"/>
+              <a:rPr lang="fr-FR" dirty="0">
+                <a:solidFill>
+                  <a:schemeClr val="bg1">
+                    <a:lumMod val="75000"/>
+                  </a:schemeClr>
+                </a:solidFill>
+              </a:rPr>
               <a:t>Mécanisme n°1</a:t>
             </a:r>
           </a:p>
@@ -7822,10 +8254,10 @@
       </p:sp>
       <p:sp>
         <p:nvSpPr>
-          <p:cNvPr id="19" name="ZoneTexte 18">
-            <a:extLst>
-              <a:ext uri="{FF2B5EF4-FFF2-40B4-BE49-F238E27FC236}">
-                <a16:creationId xmlns:a16="http://schemas.microsoft.com/office/drawing/2014/main" id="{F5715609-C05E-4596-98A9-1F2B72F9FBE6}"/>
+          <p:cNvPr id="25" name="ZoneTexte 24">
+            <a:extLst>
+              <a:ext uri="{FF2B5EF4-FFF2-40B4-BE49-F238E27FC236}">
+                <a16:creationId xmlns:a16="http://schemas.microsoft.com/office/drawing/2014/main" id="{3A3AA4E4-02A6-4413-A97F-C8B7D0752AF6}"/>
               </a:ext>
             </a:extLst>
           </p:cNvPr>
@@ -7849,7 +8281,13 @@
           <a:lstStyle/>
           <a:p>
             <a:r>
-              <a:rPr lang="fr-FR" strike="sngStrike" dirty="0"/>
+              <a:rPr lang="fr-FR" dirty="0">
+                <a:solidFill>
+                  <a:schemeClr val="bg1">
+                    <a:lumMod val="75000"/>
+                  </a:schemeClr>
+                </a:solidFill>
+              </a:rPr>
               <a:t>Mécanisme n°2</a:t>
             </a:r>
           </a:p>
@@ -7857,10 +8295,10 @@
       </p:sp>
       <p:sp>
         <p:nvSpPr>
-          <p:cNvPr id="20" name="ZoneTexte 19">
-            <a:extLst>
-              <a:ext uri="{FF2B5EF4-FFF2-40B4-BE49-F238E27FC236}">
-                <a16:creationId xmlns:a16="http://schemas.microsoft.com/office/drawing/2014/main" id="{8E248D34-65CC-43C1-937C-28FB9903C298}"/>
+          <p:cNvPr id="26" name="ZoneTexte 25">
+            <a:extLst>
+              <a:ext uri="{FF2B5EF4-FFF2-40B4-BE49-F238E27FC236}">
+                <a16:creationId xmlns:a16="http://schemas.microsoft.com/office/drawing/2014/main" id="{5BC64679-859C-45BC-9166-1C2747A5D99C}"/>
               </a:ext>
             </a:extLst>
           </p:cNvPr>
@@ -7869,8 +8307,8 @@
         </p:nvSpPr>
         <p:spPr>
           <a:xfrm>
-            <a:off x="10050865" y="4640484"/>
-            <a:ext cx="1638269" cy="369332"/>
+            <a:off x="10050865" y="5470010"/>
+            <a:ext cx="1162498" cy="369332"/>
           </a:xfrm>
           <a:prstGeom prst="rect">
             <a:avLst/>
@@ -7884,18 +8322,24 @@
           <a:lstStyle/>
           <a:p>
             <a:r>
-              <a:rPr lang="fr-FR" strike="sngStrike" dirty="0"/>
-              <a:t>Mécanisme n°3</a:t>
+              <a:rPr lang="fr-FR" dirty="0">
+                <a:solidFill>
+                  <a:schemeClr val="bg1">
+                    <a:lumMod val="75000"/>
+                  </a:schemeClr>
+                </a:solidFill>
+              </a:rPr>
+              <a:t>Appli WEB</a:t>
             </a:r>
           </a:p>
         </p:txBody>
       </p:sp>
       <p:sp>
         <p:nvSpPr>
-          <p:cNvPr id="22" name="ZoneTexte 21">
-            <a:extLst>
-              <a:ext uri="{FF2B5EF4-FFF2-40B4-BE49-F238E27FC236}">
-                <a16:creationId xmlns:a16="http://schemas.microsoft.com/office/drawing/2014/main" id="{05B9E18B-D5E3-4745-942C-6F239F17571D}"/>
+          <p:cNvPr id="27" name="ZoneTexte 26">
+            <a:extLst>
+              <a:ext uri="{FF2B5EF4-FFF2-40B4-BE49-F238E27FC236}">
+                <a16:creationId xmlns:a16="http://schemas.microsoft.com/office/drawing/2014/main" id="{98BFBC1D-44EC-47C8-90A7-1F98EB8B5A34}"/>
               </a:ext>
             </a:extLst>
           </p:cNvPr>
@@ -7904,8 +8348,8 @@
         </p:nvSpPr>
         <p:spPr>
           <a:xfrm>
-            <a:off x="10050865" y="5470010"/>
-            <a:ext cx="1162498" cy="369332"/>
+            <a:off x="10050865" y="4640484"/>
+            <a:ext cx="1638269" cy="369332"/>
           </a:xfrm>
           <a:prstGeom prst="rect">
             <a:avLst/>
@@ -7919,18 +8363,24 @@
           <a:lstStyle/>
           <a:p>
             <a:r>
-              <a:rPr lang="fr-FR" strike="sngStrike" dirty="0"/>
-              <a:t>Appli WEB</a:t>
+              <a:rPr lang="fr-FR" dirty="0">
+                <a:solidFill>
+                  <a:schemeClr val="bg1">
+                    <a:lumMod val="75000"/>
+                  </a:schemeClr>
+                </a:solidFill>
+              </a:rPr>
+              <a:t>Mécanisme n°3</a:t>
             </a:r>
           </a:p>
         </p:txBody>
       </p:sp>
       <p:sp>
         <p:nvSpPr>
-          <p:cNvPr id="23" name="ZoneTexte 22">
-            <a:extLst>
-              <a:ext uri="{FF2B5EF4-FFF2-40B4-BE49-F238E27FC236}">
-                <a16:creationId xmlns:a16="http://schemas.microsoft.com/office/drawing/2014/main" id="{AEDD4C80-5C4C-492D-86FC-F0CEF694FA3D}"/>
+          <p:cNvPr id="28" name="ZoneTexte 27">
+            <a:extLst>
+              <a:ext uri="{FF2B5EF4-FFF2-40B4-BE49-F238E27FC236}">
+                <a16:creationId xmlns:a16="http://schemas.microsoft.com/office/drawing/2014/main" id="{AA61D910-2274-417F-A313-0544061BF368}"/>
               </a:ext>
             </a:extLst>
           </p:cNvPr>
@@ -7954,7 +8404,13 @@
           <a:lstStyle/>
           <a:p>
             <a:r>
-              <a:rPr lang="fr-FR" strike="sngStrike" dirty="0"/>
+              <a:rPr lang="fr-FR" dirty="0">
+                <a:solidFill>
+                  <a:schemeClr val="bg1">
+                    <a:lumMod val="75000"/>
+                  </a:schemeClr>
+                </a:solidFill>
+              </a:rPr>
               <a:t>Partie réseau</a:t>
             </a:r>
           </a:p>
@@ -7970,13 +8426,13 @@
   <p:clrMapOvr>
     <a:masterClrMapping/>
   </p:clrMapOvr>
-  <mc:AlternateContent xmlns:mc="http://schemas.openxmlformats.org/markup-compatibility/2006">
-    <mc:Choice xmlns:p14="http://schemas.microsoft.com/office/powerpoint/2010/main" Requires="p14">
+  <mc:AlternateContent xmlns:mc="http://schemas.openxmlformats.org/markup-compatibility/2006" xmlns:p14="http://schemas.microsoft.com/office/powerpoint/2010/main">
+    <mc:Choice Requires="p14">
       <p:transition spd="med" p14:dur="700">
         <p:fade/>
       </p:transition>
     </mc:Choice>
-    <mc:Fallback>
+    <mc:Fallback xmlns="">
       <p:transition spd="med">
         <p:fade/>
       </p:transition>
@@ -8598,76 +9054,6 @@
       </p:sp>
       <p:sp>
         <p:nvSpPr>
-          <p:cNvPr id="15" name="ZoneTexte 14">
-            <a:extLst>
-              <a:ext uri="{FF2B5EF4-FFF2-40B4-BE49-F238E27FC236}">
-                <a16:creationId xmlns:a16="http://schemas.microsoft.com/office/drawing/2014/main" id="{C5F9564B-F10E-43DD-8AEC-C129B86B37B4}"/>
-              </a:ext>
-            </a:extLst>
-          </p:cNvPr>
-          <p:cNvSpPr txBox="1"/>
-          <p:nvPr/>
-        </p:nvSpPr>
-        <p:spPr>
-          <a:xfrm>
-            <a:off x="10053015" y="555110"/>
-            <a:ext cx="1375569" cy="369332"/>
-          </a:xfrm>
-          <a:prstGeom prst="rect">
-            <a:avLst/>
-          </a:prstGeom>
-          <a:noFill/>
-        </p:spPr>
-        <p:txBody>
-          <a:bodyPr wrap="none" rtlCol="0">
-            <a:spAutoFit/>
-          </a:bodyPr>
-          <a:lstStyle/>
-          <a:p>
-            <a:r>
-              <a:rPr lang="fr-FR" strike="sngStrike" dirty="0"/>
-              <a:t>Introduction</a:t>
-            </a:r>
-          </a:p>
-        </p:txBody>
-      </p:sp>
-      <p:sp>
-        <p:nvSpPr>
-          <p:cNvPr id="16" name="ZoneTexte 15">
-            <a:extLst>
-              <a:ext uri="{FF2B5EF4-FFF2-40B4-BE49-F238E27FC236}">
-                <a16:creationId xmlns:a16="http://schemas.microsoft.com/office/drawing/2014/main" id="{FE3C444A-A0C1-4C90-868F-ED05A9D99E69}"/>
-              </a:ext>
-            </a:extLst>
-          </p:cNvPr>
-          <p:cNvSpPr txBox="1"/>
-          <p:nvPr/>
-        </p:nvSpPr>
-        <p:spPr>
-          <a:xfrm>
-            <a:off x="10053015" y="1379493"/>
-            <a:ext cx="1359731" cy="369332"/>
-          </a:xfrm>
-          <a:prstGeom prst="rect">
-            <a:avLst/>
-          </a:prstGeom>
-          <a:noFill/>
-        </p:spPr>
-        <p:txBody>
-          <a:bodyPr wrap="none" rtlCol="0">
-            <a:spAutoFit/>
-          </a:bodyPr>
-          <a:lstStyle/>
-          <a:p>
-            <a:r>
-              <a:rPr lang="fr-FR" strike="sngStrike" dirty="0"/>
-              <a:t>Diagrammes</a:t>
-            </a:r>
-          </a:p>
-        </p:txBody>
-      </p:sp>
-      <p:sp>
-        <p:nvSpPr>
           <p:cNvPr id="17" name="ZoneTexte 16">
             <a:extLst>
               <a:ext uri="{FF2B5EF4-FFF2-40B4-BE49-F238E27FC236}">
@@ -8703,10 +9089,10 @@
       </p:sp>
       <p:sp>
         <p:nvSpPr>
-          <p:cNvPr id="18" name="ZoneTexte 17">
-            <a:extLst>
-              <a:ext uri="{FF2B5EF4-FFF2-40B4-BE49-F238E27FC236}">
-                <a16:creationId xmlns:a16="http://schemas.microsoft.com/office/drawing/2014/main" id="{7A3CD090-0683-41AE-ADDE-D36EA381434E}"/>
+          <p:cNvPr id="23" name="ZoneTexte 22">
+            <a:extLst>
+              <a:ext uri="{FF2B5EF4-FFF2-40B4-BE49-F238E27FC236}">
+                <a16:creationId xmlns:a16="http://schemas.microsoft.com/office/drawing/2014/main" id="{4D3CFE61-BA05-4626-8B43-590C4352CA37}"/>
               </a:ext>
             </a:extLst>
           </p:cNvPr>
@@ -8715,8 +9101,8 @@
         </p:nvSpPr>
         <p:spPr>
           <a:xfrm>
-            <a:off x="10053015" y="3012560"/>
-            <a:ext cx="1638269" cy="369332"/>
+            <a:off x="10053015" y="555110"/>
+            <a:ext cx="1375569" cy="369332"/>
           </a:xfrm>
           <a:prstGeom prst="rect">
             <a:avLst/>
@@ -8730,18 +9116,24 @@
           <a:lstStyle/>
           <a:p>
             <a:r>
-              <a:rPr lang="fr-FR" strike="sngStrike" dirty="0"/>
-              <a:t>Mécanisme n°1</a:t>
+              <a:rPr lang="fr-FR" dirty="0">
+                <a:solidFill>
+                  <a:schemeClr val="bg1">
+                    <a:lumMod val="75000"/>
+                  </a:schemeClr>
+                </a:solidFill>
+              </a:rPr>
+              <a:t>Introduction</a:t>
             </a:r>
           </a:p>
         </p:txBody>
       </p:sp>
       <p:sp>
         <p:nvSpPr>
-          <p:cNvPr id="19" name="ZoneTexte 18">
-            <a:extLst>
-              <a:ext uri="{FF2B5EF4-FFF2-40B4-BE49-F238E27FC236}">
-                <a16:creationId xmlns:a16="http://schemas.microsoft.com/office/drawing/2014/main" id="{4202E5EB-8149-4988-B025-21550E75DF78}"/>
+          <p:cNvPr id="24" name="ZoneTexte 23">
+            <a:extLst>
+              <a:ext uri="{FF2B5EF4-FFF2-40B4-BE49-F238E27FC236}">
+                <a16:creationId xmlns:a16="http://schemas.microsoft.com/office/drawing/2014/main" id="{AA973B2D-1044-4A68-9891-6C6DBF919ED8}"/>
               </a:ext>
             </a:extLst>
           </p:cNvPr>
@@ -8750,8 +9142,8 @@
         </p:nvSpPr>
         <p:spPr>
           <a:xfrm>
-            <a:off x="10053015" y="3826522"/>
-            <a:ext cx="1638269" cy="369332"/>
+            <a:off x="10053015" y="1379493"/>
+            <a:ext cx="1359731" cy="369332"/>
           </a:xfrm>
           <a:prstGeom prst="rect">
             <a:avLst/>
@@ -8765,18 +9157,24 @@
           <a:lstStyle/>
           <a:p>
             <a:r>
-              <a:rPr lang="fr-FR" strike="sngStrike" dirty="0"/>
-              <a:t>Mécanisme n°2</a:t>
+              <a:rPr lang="fr-FR" dirty="0">
+                <a:solidFill>
+                  <a:schemeClr val="bg1">
+                    <a:lumMod val="75000"/>
+                  </a:schemeClr>
+                </a:solidFill>
+              </a:rPr>
+              <a:t>Diagrammes</a:t>
             </a:r>
           </a:p>
         </p:txBody>
       </p:sp>
       <p:sp>
         <p:nvSpPr>
-          <p:cNvPr id="20" name="ZoneTexte 19">
-            <a:extLst>
-              <a:ext uri="{FF2B5EF4-FFF2-40B4-BE49-F238E27FC236}">
-                <a16:creationId xmlns:a16="http://schemas.microsoft.com/office/drawing/2014/main" id="{1916274B-9AFE-4DCD-B612-CC60EE95F1BE}"/>
+          <p:cNvPr id="26" name="ZoneTexte 25">
+            <a:extLst>
+              <a:ext uri="{FF2B5EF4-FFF2-40B4-BE49-F238E27FC236}">
+                <a16:creationId xmlns:a16="http://schemas.microsoft.com/office/drawing/2014/main" id="{80A61C96-0DD3-44DC-A528-35E62239A340}"/>
               </a:ext>
             </a:extLst>
           </p:cNvPr>
@@ -8785,7 +9183,7 @@
         </p:nvSpPr>
         <p:spPr>
           <a:xfrm>
-            <a:off x="10050865" y="4640484"/>
+            <a:off x="10053015" y="3012560"/>
             <a:ext cx="1638269" cy="369332"/>
           </a:xfrm>
           <a:prstGeom prst="rect">
@@ -8800,18 +9198,24 @@
           <a:lstStyle/>
           <a:p>
             <a:r>
-              <a:rPr lang="fr-FR" strike="sngStrike" dirty="0"/>
-              <a:t>Mécanisme n°3</a:t>
+              <a:rPr lang="fr-FR" dirty="0">
+                <a:solidFill>
+                  <a:schemeClr val="bg1">
+                    <a:lumMod val="75000"/>
+                  </a:schemeClr>
+                </a:solidFill>
+              </a:rPr>
+              <a:t>Mécanisme n°1</a:t>
             </a:r>
           </a:p>
         </p:txBody>
       </p:sp>
       <p:sp>
         <p:nvSpPr>
-          <p:cNvPr id="21" name="ZoneTexte 20">
-            <a:extLst>
-              <a:ext uri="{FF2B5EF4-FFF2-40B4-BE49-F238E27FC236}">
-                <a16:creationId xmlns:a16="http://schemas.microsoft.com/office/drawing/2014/main" id="{BB33F972-198C-4E63-9E02-396C9F27198D}"/>
+          <p:cNvPr id="27" name="ZoneTexte 26">
+            <a:extLst>
+              <a:ext uri="{FF2B5EF4-FFF2-40B4-BE49-F238E27FC236}">
+                <a16:creationId xmlns:a16="http://schemas.microsoft.com/office/drawing/2014/main" id="{70917ADD-259B-453E-B7E7-3A3FB5A6DD04}"/>
               </a:ext>
             </a:extLst>
           </p:cNvPr>
@@ -8820,8 +9224,8 @@
         </p:nvSpPr>
         <p:spPr>
           <a:xfrm>
-            <a:off x="10050865" y="5470010"/>
-            <a:ext cx="1162498" cy="369332"/>
+            <a:off x="10053015" y="3826522"/>
+            <a:ext cx="1638269" cy="369332"/>
           </a:xfrm>
           <a:prstGeom prst="rect">
             <a:avLst/>
@@ -8835,18 +9239,24 @@
           <a:lstStyle/>
           <a:p>
             <a:r>
-              <a:rPr lang="fr-FR" strike="sngStrike" dirty="0"/>
-              <a:t>Appli WEB</a:t>
+              <a:rPr lang="fr-FR" dirty="0">
+                <a:solidFill>
+                  <a:schemeClr val="bg1">
+                    <a:lumMod val="75000"/>
+                  </a:schemeClr>
+                </a:solidFill>
+              </a:rPr>
+              <a:t>Mécanisme n°2</a:t>
             </a:r>
           </a:p>
         </p:txBody>
       </p:sp>
       <p:sp>
         <p:nvSpPr>
-          <p:cNvPr id="22" name="ZoneTexte 21">
-            <a:extLst>
-              <a:ext uri="{FF2B5EF4-FFF2-40B4-BE49-F238E27FC236}">
-                <a16:creationId xmlns:a16="http://schemas.microsoft.com/office/drawing/2014/main" id="{5B1CCF47-841E-483C-AB2D-53E398C86376}"/>
+          <p:cNvPr id="28" name="ZoneTexte 27">
+            <a:extLst>
+              <a:ext uri="{FF2B5EF4-FFF2-40B4-BE49-F238E27FC236}">
+                <a16:creationId xmlns:a16="http://schemas.microsoft.com/office/drawing/2014/main" id="{794BA14D-07A9-4888-A04E-7B371BC21B40}"/>
               </a:ext>
             </a:extLst>
           </p:cNvPr>
@@ -8855,8 +9265,8 @@
         </p:nvSpPr>
         <p:spPr>
           <a:xfrm>
-            <a:off x="10050865" y="6299536"/>
-            <a:ext cx="1417439" cy="369332"/>
+            <a:off x="10050865" y="4640484"/>
+            <a:ext cx="1638269" cy="369332"/>
           </a:xfrm>
           <a:prstGeom prst="rect">
             <a:avLst/>
@@ -8870,7 +9280,95 @@
           <a:lstStyle/>
           <a:p>
             <a:r>
-              <a:rPr lang="fr-FR" strike="sngStrike" dirty="0"/>
+              <a:rPr lang="fr-FR" dirty="0">
+                <a:solidFill>
+                  <a:schemeClr val="bg1">
+                    <a:lumMod val="75000"/>
+                  </a:schemeClr>
+                </a:solidFill>
+              </a:rPr>
+              <a:t>Mécanisme n°3</a:t>
+            </a:r>
+          </a:p>
+        </p:txBody>
+      </p:sp>
+      <p:sp>
+        <p:nvSpPr>
+          <p:cNvPr id="29" name="ZoneTexte 28">
+            <a:extLst>
+              <a:ext uri="{FF2B5EF4-FFF2-40B4-BE49-F238E27FC236}">
+                <a16:creationId xmlns:a16="http://schemas.microsoft.com/office/drawing/2014/main" id="{B32FB5B8-53C3-4440-8432-14AC029B317C}"/>
+              </a:ext>
+            </a:extLst>
+          </p:cNvPr>
+          <p:cNvSpPr txBox="1"/>
+          <p:nvPr/>
+        </p:nvSpPr>
+        <p:spPr>
+          <a:xfrm>
+            <a:off x="10050865" y="5470010"/>
+            <a:ext cx="1162498" cy="369332"/>
+          </a:xfrm>
+          <a:prstGeom prst="rect">
+            <a:avLst/>
+          </a:prstGeom>
+          <a:noFill/>
+        </p:spPr>
+        <p:txBody>
+          <a:bodyPr wrap="none" rtlCol="0">
+            <a:spAutoFit/>
+          </a:bodyPr>
+          <a:lstStyle/>
+          <a:p>
+            <a:r>
+              <a:rPr lang="fr-FR" dirty="0">
+                <a:solidFill>
+                  <a:schemeClr val="bg1">
+                    <a:lumMod val="75000"/>
+                  </a:schemeClr>
+                </a:solidFill>
+              </a:rPr>
+              <a:t>Appli WEB</a:t>
+            </a:r>
+          </a:p>
+        </p:txBody>
+      </p:sp>
+      <p:sp>
+        <p:nvSpPr>
+          <p:cNvPr id="30" name="ZoneTexte 29">
+            <a:extLst>
+              <a:ext uri="{FF2B5EF4-FFF2-40B4-BE49-F238E27FC236}">
+                <a16:creationId xmlns:a16="http://schemas.microsoft.com/office/drawing/2014/main" id="{F28B3DA6-E893-4425-A1D1-022D9DDA2A5C}"/>
+              </a:ext>
+            </a:extLst>
+          </p:cNvPr>
+          <p:cNvSpPr txBox="1"/>
+          <p:nvPr/>
+        </p:nvSpPr>
+        <p:spPr>
+          <a:xfrm>
+            <a:off x="10050865" y="6299536"/>
+            <a:ext cx="1417439" cy="369332"/>
+          </a:xfrm>
+          <a:prstGeom prst="rect">
+            <a:avLst/>
+          </a:prstGeom>
+          <a:noFill/>
+        </p:spPr>
+        <p:txBody>
+          <a:bodyPr wrap="none" rtlCol="0">
+            <a:spAutoFit/>
+          </a:bodyPr>
+          <a:lstStyle/>
+          <a:p>
+            <a:r>
+              <a:rPr lang="fr-FR" dirty="0">
+                <a:solidFill>
+                  <a:schemeClr val="bg1">
+                    <a:lumMod val="75000"/>
+                  </a:schemeClr>
+                </a:solidFill>
+              </a:rPr>
               <a:t>Partie réseau</a:t>
             </a:r>
           </a:p>
@@ -8886,13 +9384,13 @@
   <p:clrMapOvr>
     <a:masterClrMapping/>
   </p:clrMapOvr>
-  <mc:AlternateContent xmlns:mc="http://schemas.openxmlformats.org/markup-compatibility/2006">
-    <mc:Choice xmlns:p14="http://schemas.microsoft.com/office/powerpoint/2010/main" Requires="p14">
+  <mc:AlternateContent xmlns:mc="http://schemas.openxmlformats.org/markup-compatibility/2006" xmlns:p14="http://schemas.microsoft.com/office/powerpoint/2010/main">
+    <mc:Choice Requires="p14">
       <p:transition spd="med" p14:dur="700">
         <p:fade/>
       </p:transition>
     </mc:Choice>
-    <mc:Fallback>
+    <mc:Fallback xmlns="">
       <p:transition spd="med">
         <p:fade/>
       </p:transition>
@@ -9480,10 +9978,10 @@
       </p:sp>
       <p:sp>
         <p:nvSpPr>
-          <p:cNvPr id="15" name="ZoneTexte 14">
-            <a:extLst>
-              <a:ext uri="{FF2B5EF4-FFF2-40B4-BE49-F238E27FC236}">
-                <a16:creationId xmlns:a16="http://schemas.microsoft.com/office/drawing/2014/main" id="{85DAF84D-70C4-4235-927E-D1C4BBCE2598}"/>
+          <p:cNvPr id="18" name="ZoneTexte 17">
+            <a:extLst>
+              <a:ext uri="{FF2B5EF4-FFF2-40B4-BE49-F238E27FC236}">
+                <a16:creationId xmlns:a16="http://schemas.microsoft.com/office/drawing/2014/main" id="{E37909DC-128C-4839-890C-91AC0AD01661}"/>
               </a:ext>
             </a:extLst>
           </p:cNvPr>
@@ -9492,8 +9990,8 @@
         </p:nvSpPr>
         <p:spPr>
           <a:xfrm>
-            <a:off x="10053015" y="555110"/>
-            <a:ext cx="1375569" cy="369332"/>
+            <a:off x="10053015" y="3012560"/>
+            <a:ext cx="1656479" cy="369332"/>
           </a:xfrm>
           <a:prstGeom prst="rect">
             <a:avLst/>
@@ -9507,253 +10005,8 @@
           <a:lstStyle/>
           <a:p>
             <a:r>
-              <a:rPr lang="fr-FR" strike="sngStrike" dirty="0"/>
-              <a:t>Introduction</a:t>
-            </a:r>
-          </a:p>
-        </p:txBody>
-      </p:sp>
-      <p:sp>
-        <p:nvSpPr>
-          <p:cNvPr id="16" name="ZoneTexte 15">
-            <a:extLst>
-              <a:ext uri="{FF2B5EF4-FFF2-40B4-BE49-F238E27FC236}">
-                <a16:creationId xmlns:a16="http://schemas.microsoft.com/office/drawing/2014/main" id="{A1E2B18B-ED96-4442-A71D-7490034CED5A}"/>
-              </a:ext>
-            </a:extLst>
-          </p:cNvPr>
-          <p:cNvSpPr txBox="1"/>
-          <p:nvPr/>
-        </p:nvSpPr>
-        <p:spPr>
-          <a:xfrm>
-            <a:off x="10053015" y="1379493"/>
-            <a:ext cx="1359731" cy="369332"/>
-          </a:xfrm>
-          <a:prstGeom prst="rect">
-            <a:avLst/>
-          </a:prstGeom>
-          <a:noFill/>
-        </p:spPr>
-        <p:txBody>
-          <a:bodyPr wrap="none" rtlCol="0">
-            <a:spAutoFit/>
-          </a:bodyPr>
-          <a:lstStyle/>
-          <a:p>
-            <a:r>
-              <a:rPr lang="fr-FR" strike="sngStrike" dirty="0"/>
-              <a:t>Diagrammes</a:t>
-            </a:r>
-          </a:p>
-        </p:txBody>
-      </p:sp>
-      <p:sp>
-        <p:nvSpPr>
-          <p:cNvPr id="17" name="ZoneTexte 16">
-            <a:extLst>
-              <a:ext uri="{FF2B5EF4-FFF2-40B4-BE49-F238E27FC236}">
-                <a16:creationId xmlns:a16="http://schemas.microsoft.com/office/drawing/2014/main" id="{3823058C-8858-4010-910A-F5BFEE2BC346}"/>
-              </a:ext>
-            </a:extLst>
-          </p:cNvPr>
-          <p:cNvSpPr txBox="1"/>
-          <p:nvPr/>
-        </p:nvSpPr>
-        <p:spPr>
-          <a:xfrm>
-            <a:off x="10053015" y="2189074"/>
-            <a:ext cx="1249445" cy="369332"/>
-          </a:xfrm>
-          <a:prstGeom prst="rect">
-            <a:avLst/>
-          </a:prstGeom>
-          <a:noFill/>
-        </p:spPr>
-        <p:txBody>
-          <a:bodyPr wrap="none" rtlCol="0">
-            <a:spAutoFit/>
-          </a:bodyPr>
-          <a:lstStyle/>
-          <a:p>
-            <a:r>
-              <a:rPr lang="fr-FR" strike="sngStrike" dirty="0"/>
-              <a:t>Mes tâches</a:t>
-            </a:r>
-          </a:p>
-        </p:txBody>
-      </p:sp>
-      <p:sp>
-        <p:nvSpPr>
-          <p:cNvPr id="18" name="ZoneTexte 17">
-            <a:extLst>
-              <a:ext uri="{FF2B5EF4-FFF2-40B4-BE49-F238E27FC236}">
-                <a16:creationId xmlns:a16="http://schemas.microsoft.com/office/drawing/2014/main" id="{E37909DC-128C-4839-890C-91AC0AD01661}"/>
-              </a:ext>
-            </a:extLst>
-          </p:cNvPr>
-          <p:cNvSpPr txBox="1"/>
-          <p:nvPr/>
-        </p:nvSpPr>
-        <p:spPr>
-          <a:xfrm>
-            <a:off x="10053015" y="3012560"/>
-            <a:ext cx="1656479" cy="369332"/>
-          </a:xfrm>
-          <a:prstGeom prst="rect">
-            <a:avLst/>
-          </a:prstGeom>
-          <a:noFill/>
-        </p:spPr>
-        <p:txBody>
-          <a:bodyPr wrap="none" rtlCol="0">
-            <a:spAutoFit/>
-          </a:bodyPr>
-          <a:lstStyle/>
-          <a:p>
-            <a:r>
               <a:rPr lang="fr-FR" b="1" dirty="0"/>
               <a:t>Mécanisme n°1</a:t>
-            </a:r>
-          </a:p>
-        </p:txBody>
-      </p:sp>
-      <p:sp>
-        <p:nvSpPr>
-          <p:cNvPr id="19" name="ZoneTexte 18">
-            <a:extLst>
-              <a:ext uri="{FF2B5EF4-FFF2-40B4-BE49-F238E27FC236}">
-                <a16:creationId xmlns:a16="http://schemas.microsoft.com/office/drawing/2014/main" id="{E3D1534B-5754-4537-BE8F-8B8836EA6883}"/>
-              </a:ext>
-            </a:extLst>
-          </p:cNvPr>
-          <p:cNvSpPr txBox="1"/>
-          <p:nvPr/>
-        </p:nvSpPr>
-        <p:spPr>
-          <a:xfrm>
-            <a:off x="10053015" y="3826522"/>
-            <a:ext cx="1638269" cy="369332"/>
-          </a:xfrm>
-          <a:prstGeom prst="rect">
-            <a:avLst/>
-          </a:prstGeom>
-          <a:noFill/>
-        </p:spPr>
-        <p:txBody>
-          <a:bodyPr wrap="none" rtlCol="0">
-            <a:spAutoFit/>
-          </a:bodyPr>
-          <a:lstStyle/>
-          <a:p>
-            <a:r>
-              <a:rPr lang="fr-FR" strike="sngStrike" dirty="0"/>
-              <a:t>Mécanisme n°2</a:t>
-            </a:r>
-          </a:p>
-        </p:txBody>
-      </p:sp>
-      <p:sp>
-        <p:nvSpPr>
-          <p:cNvPr id="20" name="ZoneTexte 19">
-            <a:extLst>
-              <a:ext uri="{FF2B5EF4-FFF2-40B4-BE49-F238E27FC236}">
-                <a16:creationId xmlns:a16="http://schemas.microsoft.com/office/drawing/2014/main" id="{2932188B-645B-40F3-991A-E57F2FEEC1E6}"/>
-              </a:ext>
-            </a:extLst>
-          </p:cNvPr>
-          <p:cNvSpPr txBox="1"/>
-          <p:nvPr/>
-        </p:nvSpPr>
-        <p:spPr>
-          <a:xfrm>
-            <a:off x="10050865" y="4640484"/>
-            <a:ext cx="1638269" cy="369332"/>
-          </a:xfrm>
-          <a:prstGeom prst="rect">
-            <a:avLst/>
-          </a:prstGeom>
-          <a:noFill/>
-        </p:spPr>
-        <p:txBody>
-          <a:bodyPr wrap="none" rtlCol="0">
-            <a:spAutoFit/>
-          </a:bodyPr>
-          <a:lstStyle/>
-          <a:p>
-            <a:r>
-              <a:rPr lang="fr-FR" strike="sngStrike" dirty="0"/>
-              <a:t>Mécanisme n°3</a:t>
-            </a:r>
-          </a:p>
-        </p:txBody>
-      </p:sp>
-      <p:sp>
-        <p:nvSpPr>
-          <p:cNvPr id="21" name="ZoneTexte 20">
-            <a:extLst>
-              <a:ext uri="{FF2B5EF4-FFF2-40B4-BE49-F238E27FC236}">
-                <a16:creationId xmlns:a16="http://schemas.microsoft.com/office/drawing/2014/main" id="{7F1BDAFF-6372-4EB8-8DA0-608FD6369FC9}"/>
-              </a:ext>
-            </a:extLst>
-          </p:cNvPr>
-          <p:cNvSpPr txBox="1"/>
-          <p:nvPr/>
-        </p:nvSpPr>
-        <p:spPr>
-          <a:xfrm>
-            <a:off x="10050865" y="5470010"/>
-            <a:ext cx="1162498" cy="369332"/>
-          </a:xfrm>
-          <a:prstGeom prst="rect">
-            <a:avLst/>
-          </a:prstGeom>
-          <a:noFill/>
-        </p:spPr>
-        <p:txBody>
-          <a:bodyPr wrap="none" rtlCol="0">
-            <a:spAutoFit/>
-          </a:bodyPr>
-          <a:lstStyle/>
-          <a:p>
-            <a:r>
-              <a:rPr lang="fr-FR" strike="sngStrike" dirty="0"/>
-              <a:t>Appli WEB</a:t>
-            </a:r>
-          </a:p>
-        </p:txBody>
-      </p:sp>
-      <p:sp>
-        <p:nvSpPr>
-          <p:cNvPr id="22" name="ZoneTexte 21">
-            <a:extLst>
-              <a:ext uri="{FF2B5EF4-FFF2-40B4-BE49-F238E27FC236}">
-                <a16:creationId xmlns:a16="http://schemas.microsoft.com/office/drawing/2014/main" id="{A0A0DCE1-5E99-4965-8214-3070B71AA460}"/>
-              </a:ext>
-            </a:extLst>
-          </p:cNvPr>
-          <p:cNvSpPr txBox="1"/>
-          <p:nvPr/>
-        </p:nvSpPr>
-        <p:spPr>
-          <a:xfrm>
-            <a:off x="10050865" y="6299536"/>
-            <a:ext cx="1417439" cy="369332"/>
-          </a:xfrm>
-          <a:prstGeom prst="rect">
-            <a:avLst/>
-          </a:prstGeom>
-          <a:noFill/>
-        </p:spPr>
-        <p:txBody>
-          <a:bodyPr wrap="none" rtlCol="0">
-            <a:spAutoFit/>
-          </a:bodyPr>
-          <a:lstStyle/>
-          <a:p>
-            <a:r>
-              <a:rPr lang="fr-FR" strike="sngStrike" dirty="0"/>
-              <a:t>Partie réseau</a:t>
             </a:r>
           </a:p>
         </p:txBody>
@@ -9949,6 +10202,293 @@
             <a:r>
               <a:rPr lang="fr-FR" sz="2000" b="1" dirty="0"/>
               <a:t>Verrou magnétique</a:t>
+            </a:r>
+          </a:p>
+        </p:txBody>
+      </p:sp>
+      <p:sp>
+        <p:nvSpPr>
+          <p:cNvPr id="29" name="ZoneTexte 28">
+            <a:extLst>
+              <a:ext uri="{FF2B5EF4-FFF2-40B4-BE49-F238E27FC236}">
+                <a16:creationId xmlns:a16="http://schemas.microsoft.com/office/drawing/2014/main" id="{180EC874-DE92-4A06-812B-787E3F0F807A}"/>
+              </a:ext>
+            </a:extLst>
+          </p:cNvPr>
+          <p:cNvSpPr txBox="1"/>
+          <p:nvPr/>
+        </p:nvSpPr>
+        <p:spPr>
+          <a:xfrm>
+            <a:off x="10053015" y="555110"/>
+            <a:ext cx="1375569" cy="369332"/>
+          </a:xfrm>
+          <a:prstGeom prst="rect">
+            <a:avLst/>
+          </a:prstGeom>
+          <a:noFill/>
+        </p:spPr>
+        <p:txBody>
+          <a:bodyPr wrap="none" rtlCol="0">
+            <a:spAutoFit/>
+          </a:bodyPr>
+          <a:lstStyle/>
+          <a:p>
+            <a:r>
+              <a:rPr lang="fr-FR" dirty="0">
+                <a:solidFill>
+                  <a:schemeClr val="bg1">
+                    <a:lumMod val="75000"/>
+                  </a:schemeClr>
+                </a:solidFill>
+              </a:rPr>
+              <a:t>Introduction</a:t>
+            </a:r>
+          </a:p>
+        </p:txBody>
+      </p:sp>
+      <p:sp>
+        <p:nvSpPr>
+          <p:cNvPr id="30" name="ZoneTexte 29">
+            <a:extLst>
+              <a:ext uri="{FF2B5EF4-FFF2-40B4-BE49-F238E27FC236}">
+                <a16:creationId xmlns:a16="http://schemas.microsoft.com/office/drawing/2014/main" id="{D80DBF28-1F6B-4777-BF3C-184719595611}"/>
+              </a:ext>
+            </a:extLst>
+          </p:cNvPr>
+          <p:cNvSpPr txBox="1"/>
+          <p:nvPr/>
+        </p:nvSpPr>
+        <p:spPr>
+          <a:xfrm>
+            <a:off x="10053015" y="1379493"/>
+            <a:ext cx="1359731" cy="369332"/>
+          </a:xfrm>
+          <a:prstGeom prst="rect">
+            <a:avLst/>
+          </a:prstGeom>
+          <a:noFill/>
+        </p:spPr>
+        <p:txBody>
+          <a:bodyPr wrap="none" rtlCol="0">
+            <a:spAutoFit/>
+          </a:bodyPr>
+          <a:lstStyle/>
+          <a:p>
+            <a:r>
+              <a:rPr lang="fr-FR" dirty="0">
+                <a:solidFill>
+                  <a:schemeClr val="bg1">
+                    <a:lumMod val="75000"/>
+                  </a:schemeClr>
+                </a:solidFill>
+              </a:rPr>
+              <a:t>Diagrammes</a:t>
+            </a:r>
+          </a:p>
+        </p:txBody>
+      </p:sp>
+      <p:sp>
+        <p:nvSpPr>
+          <p:cNvPr id="31" name="ZoneTexte 30">
+            <a:extLst>
+              <a:ext uri="{FF2B5EF4-FFF2-40B4-BE49-F238E27FC236}">
+                <a16:creationId xmlns:a16="http://schemas.microsoft.com/office/drawing/2014/main" id="{B4E395DF-B027-414D-B71E-5592C5A5344D}"/>
+              </a:ext>
+            </a:extLst>
+          </p:cNvPr>
+          <p:cNvSpPr txBox="1"/>
+          <p:nvPr/>
+        </p:nvSpPr>
+        <p:spPr>
+          <a:xfrm>
+            <a:off x="10053015" y="2189074"/>
+            <a:ext cx="1249445" cy="369332"/>
+          </a:xfrm>
+          <a:prstGeom prst="rect">
+            <a:avLst/>
+          </a:prstGeom>
+          <a:noFill/>
+        </p:spPr>
+        <p:txBody>
+          <a:bodyPr wrap="none" rtlCol="0">
+            <a:spAutoFit/>
+          </a:bodyPr>
+          <a:lstStyle/>
+          <a:p>
+            <a:r>
+              <a:rPr lang="fr-FR" dirty="0">
+                <a:solidFill>
+                  <a:schemeClr val="bg1">
+                    <a:lumMod val="75000"/>
+                  </a:schemeClr>
+                </a:solidFill>
+              </a:rPr>
+              <a:t>Mes tâches</a:t>
+            </a:r>
+          </a:p>
+        </p:txBody>
+      </p:sp>
+      <p:sp>
+        <p:nvSpPr>
+          <p:cNvPr id="32" name="ZoneTexte 31">
+            <a:extLst>
+              <a:ext uri="{FF2B5EF4-FFF2-40B4-BE49-F238E27FC236}">
+                <a16:creationId xmlns:a16="http://schemas.microsoft.com/office/drawing/2014/main" id="{60E5AF33-8268-4CA4-86E1-3610ACD35D4E}"/>
+              </a:ext>
+            </a:extLst>
+          </p:cNvPr>
+          <p:cNvSpPr txBox="1"/>
+          <p:nvPr/>
+        </p:nvSpPr>
+        <p:spPr>
+          <a:xfrm>
+            <a:off x="10053015" y="3826522"/>
+            <a:ext cx="1638269" cy="369332"/>
+          </a:xfrm>
+          <a:prstGeom prst="rect">
+            <a:avLst/>
+          </a:prstGeom>
+          <a:noFill/>
+        </p:spPr>
+        <p:txBody>
+          <a:bodyPr wrap="none" rtlCol="0">
+            <a:spAutoFit/>
+          </a:bodyPr>
+          <a:lstStyle/>
+          <a:p>
+            <a:r>
+              <a:rPr lang="fr-FR" dirty="0">
+                <a:solidFill>
+                  <a:schemeClr val="bg1">
+                    <a:lumMod val="75000"/>
+                  </a:schemeClr>
+                </a:solidFill>
+              </a:rPr>
+              <a:t>Mécanisme n°2</a:t>
+            </a:r>
+          </a:p>
+        </p:txBody>
+      </p:sp>
+      <p:sp>
+        <p:nvSpPr>
+          <p:cNvPr id="33" name="ZoneTexte 32">
+            <a:extLst>
+              <a:ext uri="{FF2B5EF4-FFF2-40B4-BE49-F238E27FC236}">
+                <a16:creationId xmlns:a16="http://schemas.microsoft.com/office/drawing/2014/main" id="{59DA397F-BE2A-4B02-928E-66611114F624}"/>
+              </a:ext>
+            </a:extLst>
+          </p:cNvPr>
+          <p:cNvSpPr txBox="1"/>
+          <p:nvPr/>
+        </p:nvSpPr>
+        <p:spPr>
+          <a:xfrm>
+            <a:off x="10050865" y="4640484"/>
+            <a:ext cx="1638269" cy="369332"/>
+          </a:xfrm>
+          <a:prstGeom prst="rect">
+            <a:avLst/>
+          </a:prstGeom>
+          <a:noFill/>
+        </p:spPr>
+        <p:txBody>
+          <a:bodyPr wrap="none" rtlCol="0">
+            <a:spAutoFit/>
+          </a:bodyPr>
+          <a:lstStyle/>
+          <a:p>
+            <a:r>
+              <a:rPr lang="fr-FR" dirty="0">
+                <a:solidFill>
+                  <a:schemeClr val="bg1">
+                    <a:lumMod val="75000"/>
+                  </a:schemeClr>
+                </a:solidFill>
+              </a:rPr>
+              <a:t>Mécanisme n°3</a:t>
+            </a:r>
+          </a:p>
+        </p:txBody>
+      </p:sp>
+      <p:sp>
+        <p:nvSpPr>
+          <p:cNvPr id="34" name="ZoneTexte 33">
+            <a:extLst>
+              <a:ext uri="{FF2B5EF4-FFF2-40B4-BE49-F238E27FC236}">
+                <a16:creationId xmlns:a16="http://schemas.microsoft.com/office/drawing/2014/main" id="{ED6C487C-50CF-4808-823C-6E9C221A5FF4}"/>
+              </a:ext>
+            </a:extLst>
+          </p:cNvPr>
+          <p:cNvSpPr txBox="1"/>
+          <p:nvPr/>
+        </p:nvSpPr>
+        <p:spPr>
+          <a:xfrm>
+            <a:off x="10050865" y="5470010"/>
+            <a:ext cx="1162498" cy="369332"/>
+          </a:xfrm>
+          <a:prstGeom prst="rect">
+            <a:avLst/>
+          </a:prstGeom>
+          <a:noFill/>
+        </p:spPr>
+        <p:txBody>
+          <a:bodyPr wrap="none" rtlCol="0">
+            <a:spAutoFit/>
+          </a:bodyPr>
+          <a:lstStyle/>
+          <a:p>
+            <a:r>
+              <a:rPr lang="fr-FR" dirty="0">
+                <a:solidFill>
+                  <a:schemeClr val="bg1">
+                    <a:lumMod val="75000"/>
+                  </a:schemeClr>
+                </a:solidFill>
+              </a:rPr>
+              <a:t>Appli WEB</a:t>
+            </a:r>
+          </a:p>
+        </p:txBody>
+      </p:sp>
+      <p:sp>
+        <p:nvSpPr>
+          <p:cNvPr id="35" name="ZoneTexte 34">
+            <a:extLst>
+              <a:ext uri="{FF2B5EF4-FFF2-40B4-BE49-F238E27FC236}">
+                <a16:creationId xmlns:a16="http://schemas.microsoft.com/office/drawing/2014/main" id="{0BA1E048-F82E-410C-9933-CD87DFCF72AF}"/>
+              </a:ext>
+            </a:extLst>
+          </p:cNvPr>
+          <p:cNvSpPr txBox="1"/>
+          <p:nvPr/>
+        </p:nvSpPr>
+        <p:spPr>
+          <a:xfrm>
+            <a:off x="10050865" y="6299536"/>
+            <a:ext cx="1417439" cy="369332"/>
+          </a:xfrm>
+          <a:prstGeom prst="rect">
+            <a:avLst/>
+          </a:prstGeom>
+          <a:noFill/>
+        </p:spPr>
+        <p:txBody>
+          <a:bodyPr wrap="none" rtlCol="0">
+            <a:spAutoFit/>
+          </a:bodyPr>
+          <a:lstStyle/>
+          <a:p>
+            <a:r>
+              <a:rPr lang="fr-FR" dirty="0">
+                <a:solidFill>
+                  <a:schemeClr val="bg1">
+                    <a:lumMod val="75000"/>
+                  </a:schemeClr>
+                </a:solidFill>
+              </a:rPr>
+              <a:t>Partie réseau</a:t>
             </a:r>
           </a:p>
         </p:txBody>
@@ -9963,13 +10503,13 @@
   <p:clrMapOvr>
     <a:masterClrMapping/>
   </p:clrMapOvr>
-  <mc:AlternateContent xmlns:mc="http://schemas.openxmlformats.org/markup-compatibility/2006">
-    <mc:Choice xmlns:p14="http://schemas.microsoft.com/office/powerpoint/2010/main" Requires="p14">
+  <mc:AlternateContent xmlns:mc="http://schemas.openxmlformats.org/markup-compatibility/2006" xmlns:p14="http://schemas.microsoft.com/office/powerpoint/2010/main">
+    <mc:Choice Requires="p14">
       <p:transition spd="med" p14:dur="700">
         <p:fade/>
       </p:transition>
     </mc:Choice>
-    <mc:Fallback>
+    <mc:Fallback xmlns="">
       <p:transition spd="med">
         <p:fade/>
       </p:transition>
@@ -10557,10 +11097,10 @@
       </p:sp>
       <p:sp>
         <p:nvSpPr>
-          <p:cNvPr id="15" name="ZoneTexte 14">
-            <a:extLst>
-              <a:ext uri="{FF2B5EF4-FFF2-40B4-BE49-F238E27FC236}">
-                <a16:creationId xmlns:a16="http://schemas.microsoft.com/office/drawing/2014/main" id="{0CCF4C3E-E1D6-4190-9ADA-4D67CCCE5509}"/>
+          <p:cNvPr id="19" name="ZoneTexte 18">
+            <a:extLst>
+              <a:ext uri="{FF2B5EF4-FFF2-40B4-BE49-F238E27FC236}">
+                <a16:creationId xmlns:a16="http://schemas.microsoft.com/office/drawing/2014/main" id="{6EAAC40F-BB05-40B6-AEEF-5A08C13C9819}"/>
               </a:ext>
             </a:extLst>
           </p:cNvPr>
@@ -10569,8 +11109,8 @@
         </p:nvSpPr>
         <p:spPr>
           <a:xfrm>
-            <a:off x="10053015" y="555110"/>
-            <a:ext cx="1375569" cy="369332"/>
+            <a:off x="10053015" y="3826522"/>
+            <a:ext cx="1656479" cy="369332"/>
           </a:xfrm>
           <a:prstGeom prst="rect">
             <a:avLst/>
@@ -10584,253 +11124,8 @@
           <a:lstStyle/>
           <a:p>
             <a:r>
-              <a:rPr lang="fr-FR" strike="sngStrike" dirty="0"/>
-              <a:t>Introduction</a:t>
-            </a:r>
-          </a:p>
-        </p:txBody>
-      </p:sp>
-      <p:sp>
-        <p:nvSpPr>
-          <p:cNvPr id="16" name="ZoneTexte 15">
-            <a:extLst>
-              <a:ext uri="{FF2B5EF4-FFF2-40B4-BE49-F238E27FC236}">
-                <a16:creationId xmlns:a16="http://schemas.microsoft.com/office/drawing/2014/main" id="{9112EA84-8664-403D-B048-DB7D6601ACB7}"/>
-              </a:ext>
-            </a:extLst>
-          </p:cNvPr>
-          <p:cNvSpPr txBox="1"/>
-          <p:nvPr/>
-        </p:nvSpPr>
-        <p:spPr>
-          <a:xfrm>
-            <a:off x="10053015" y="1379493"/>
-            <a:ext cx="1359731" cy="369332"/>
-          </a:xfrm>
-          <a:prstGeom prst="rect">
-            <a:avLst/>
-          </a:prstGeom>
-          <a:noFill/>
-        </p:spPr>
-        <p:txBody>
-          <a:bodyPr wrap="none" rtlCol="0">
-            <a:spAutoFit/>
-          </a:bodyPr>
-          <a:lstStyle/>
-          <a:p>
-            <a:r>
-              <a:rPr lang="fr-FR" strike="sngStrike" dirty="0"/>
-              <a:t>Diagrammes</a:t>
-            </a:r>
-          </a:p>
-        </p:txBody>
-      </p:sp>
-      <p:sp>
-        <p:nvSpPr>
-          <p:cNvPr id="17" name="ZoneTexte 16">
-            <a:extLst>
-              <a:ext uri="{FF2B5EF4-FFF2-40B4-BE49-F238E27FC236}">
-                <a16:creationId xmlns:a16="http://schemas.microsoft.com/office/drawing/2014/main" id="{5DAEB368-E70E-4FA5-8C9B-329332CA325C}"/>
-              </a:ext>
-            </a:extLst>
-          </p:cNvPr>
-          <p:cNvSpPr txBox="1"/>
-          <p:nvPr/>
-        </p:nvSpPr>
-        <p:spPr>
-          <a:xfrm>
-            <a:off x="10053015" y="2189074"/>
-            <a:ext cx="1249445" cy="369332"/>
-          </a:xfrm>
-          <a:prstGeom prst="rect">
-            <a:avLst/>
-          </a:prstGeom>
-          <a:noFill/>
-        </p:spPr>
-        <p:txBody>
-          <a:bodyPr wrap="none" rtlCol="0">
-            <a:spAutoFit/>
-          </a:bodyPr>
-          <a:lstStyle/>
-          <a:p>
-            <a:r>
-              <a:rPr lang="fr-FR" strike="sngStrike" dirty="0"/>
-              <a:t>Mes tâches</a:t>
-            </a:r>
-          </a:p>
-        </p:txBody>
-      </p:sp>
-      <p:sp>
-        <p:nvSpPr>
-          <p:cNvPr id="18" name="ZoneTexte 17">
-            <a:extLst>
-              <a:ext uri="{FF2B5EF4-FFF2-40B4-BE49-F238E27FC236}">
-                <a16:creationId xmlns:a16="http://schemas.microsoft.com/office/drawing/2014/main" id="{B5CD3D3F-9B85-4027-B813-45747EF4130B}"/>
-              </a:ext>
-            </a:extLst>
-          </p:cNvPr>
-          <p:cNvSpPr txBox="1"/>
-          <p:nvPr/>
-        </p:nvSpPr>
-        <p:spPr>
-          <a:xfrm>
-            <a:off x="10053015" y="3012560"/>
-            <a:ext cx="1638269" cy="369332"/>
-          </a:xfrm>
-          <a:prstGeom prst="rect">
-            <a:avLst/>
-          </a:prstGeom>
-          <a:noFill/>
-        </p:spPr>
-        <p:txBody>
-          <a:bodyPr wrap="none" rtlCol="0">
-            <a:spAutoFit/>
-          </a:bodyPr>
-          <a:lstStyle/>
-          <a:p>
-            <a:r>
-              <a:rPr lang="fr-FR" strike="sngStrike" dirty="0"/>
-              <a:t>Mécanisme n°1</a:t>
-            </a:r>
-          </a:p>
-        </p:txBody>
-      </p:sp>
-      <p:sp>
-        <p:nvSpPr>
-          <p:cNvPr id="19" name="ZoneTexte 18">
-            <a:extLst>
-              <a:ext uri="{FF2B5EF4-FFF2-40B4-BE49-F238E27FC236}">
-                <a16:creationId xmlns:a16="http://schemas.microsoft.com/office/drawing/2014/main" id="{6EAAC40F-BB05-40B6-AEEF-5A08C13C9819}"/>
-              </a:ext>
-            </a:extLst>
-          </p:cNvPr>
-          <p:cNvSpPr txBox="1"/>
-          <p:nvPr/>
-        </p:nvSpPr>
-        <p:spPr>
-          <a:xfrm>
-            <a:off x="10053015" y="3826522"/>
-            <a:ext cx="1656479" cy="369332"/>
-          </a:xfrm>
-          <a:prstGeom prst="rect">
-            <a:avLst/>
-          </a:prstGeom>
-          <a:noFill/>
-        </p:spPr>
-        <p:txBody>
-          <a:bodyPr wrap="none" rtlCol="0">
-            <a:spAutoFit/>
-          </a:bodyPr>
-          <a:lstStyle/>
-          <a:p>
-            <a:r>
               <a:rPr lang="fr-FR" b="1" dirty="0"/>
               <a:t>Mécanisme n°2</a:t>
-            </a:r>
-          </a:p>
-        </p:txBody>
-      </p:sp>
-      <p:sp>
-        <p:nvSpPr>
-          <p:cNvPr id="20" name="ZoneTexte 19">
-            <a:extLst>
-              <a:ext uri="{FF2B5EF4-FFF2-40B4-BE49-F238E27FC236}">
-                <a16:creationId xmlns:a16="http://schemas.microsoft.com/office/drawing/2014/main" id="{50779DFC-53AC-453E-A512-49A9EBFA5FDE}"/>
-              </a:ext>
-            </a:extLst>
-          </p:cNvPr>
-          <p:cNvSpPr txBox="1"/>
-          <p:nvPr/>
-        </p:nvSpPr>
-        <p:spPr>
-          <a:xfrm>
-            <a:off x="10050865" y="4640484"/>
-            <a:ext cx="1638269" cy="369332"/>
-          </a:xfrm>
-          <a:prstGeom prst="rect">
-            <a:avLst/>
-          </a:prstGeom>
-          <a:noFill/>
-        </p:spPr>
-        <p:txBody>
-          <a:bodyPr wrap="none" rtlCol="0">
-            <a:spAutoFit/>
-          </a:bodyPr>
-          <a:lstStyle/>
-          <a:p>
-            <a:r>
-              <a:rPr lang="fr-FR" strike="sngStrike" dirty="0"/>
-              <a:t>Mécanisme n°3</a:t>
-            </a:r>
-          </a:p>
-        </p:txBody>
-      </p:sp>
-      <p:sp>
-        <p:nvSpPr>
-          <p:cNvPr id="21" name="ZoneTexte 20">
-            <a:extLst>
-              <a:ext uri="{FF2B5EF4-FFF2-40B4-BE49-F238E27FC236}">
-                <a16:creationId xmlns:a16="http://schemas.microsoft.com/office/drawing/2014/main" id="{658CC75F-EBBF-44E3-959A-DB67B8AF6341}"/>
-              </a:ext>
-            </a:extLst>
-          </p:cNvPr>
-          <p:cNvSpPr txBox="1"/>
-          <p:nvPr/>
-        </p:nvSpPr>
-        <p:spPr>
-          <a:xfrm>
-            <a:off x="10050865" y="5470010"/>
-            <a:ext cx="1162498" cy="369332"/>
-          </a:xfrm>
-          <a:prstGeom prst="rect">
-            <a:avLst/>
-          </a:prstGeom>
-          <a:noFill/>
-        </p:spPr>
-        <p:txBody>
-          <a:bodyPr wrap="none" rtlCol="0">
-            <a:spAutoFit/>
-          </a:bodyPr>
-          <a:lstStyle/>
-          <a:p>
-            <a:r>
-              <a:rPr lang="fr-FR" strike="sngStrike" dirty="0"/>
-              <a:t>Appli WEB</a:t>
-            </a:r>
-          </a:p>
-        </p:txBody>
-      </p:sp>
-      <p:sp>
-        <p:nvSpPr>
-          <p:cNvPr id="22" name="ZoneTexte 21">
-            <a:extLst>
-              <a:ext uri="{FF2B5EF4-FFF2-40B4-BE49-F238E27FC236}">
-                <a16:creationId xmlns:a16="http://schemas.microsoft.com/office/drawing/2014/main" id="{AF573A7D-3079-41C0-8683-76FB3243A66B}"/>
-              </a:ext>
-            </a:extLst>
-          </p:cNvPr>
-          <p:cNvSpPr txBox="1"/>
-          <p:nvPr/>
-        </p:nvSpPr>
-        <p:spPr>
-          <a:xfrm>
-            <a:off x="10050865" y="6299536"/>
-            <a:ext cx="1417439" cy="369332"/>
-          </a:xfrm>
-          <a:prstGeom prst="rect">
-            <a:avLst/>
-          </a:prstGeom>
-          <a:noFill/>
-        </p:spPr>
-        <p:txBody>
-          <a:bodyPr wrap="none" rtlCol="0">
-            <a:spAutoFit/>
-          </a:bodyPr>
-          <a:lstStyle/>
-          <a:p>
-            <a:r>
-              <a:rPr lang="fr-FR" strike="sngStrike" dirty="0"/>
-              <a:t>Partie réseau</a:t>
             </a:r>
           </a:p>
         </p:txBody>
@@ -11026,6 +11321,293 @@
             <a:r>
               <a:rPr lang="fr-FR" sz="2000" b="1" dirty="0"/>
               <a:t>Gâche électrique</a:t>
+            </a:r>
+          </a:p>
+        </p:txBody>
+      </p:sp>
+      <p:sp>
+        <p:nvSpPr>
+          <p:cNvPr id="29" name="ZoneTexte 28">
+            <a:extLst>
+              <a:ext uri="{FF2B5EF4-FFF2-40B4-BE49-F238E27FC236}">
+                <a16:creationId xmlns:a16="http://schemas.microsoft.com/office/drawing/2014/main" id="{3DA93E5E-7CAA-4845-BAEA-2E96969F22CC}"/>
+              </a:ext>
+            </a:extLst>
+          </p:cNvPr>
+          <p:cNvSpPr txBox="1"/>
+          <p:nvPr/>
+        </p:nvSpPr>
+        <p:spPr>
+          <a:xfrm>
+            <a:off x="10053015" y="555110"/>
+            <a:ext cx="1375569" cy="369332"/>
+          </a:xfrm>
+          <a:prstGeom prst="rect">
+            <a:avLst/>
+          </a:prstGeom>
+          <a:noFill/>
+        </p:spPr>
+        <p:txBody>
+          <a:bodyPr wrap="none" rtlCol="0">
+            <a:spAutoFit/>
+          </a:bodyPr>
+          <a:lstStyle/>
+          <a:p>
+            <a:r>
+              <a:rPr lang="fr-FR" dirty="0">
+                <a:solidFill>
+                  <a:schemeClr val="bg1">
+                    <a:lumMod val="75000"/>
+                  </a:schemeClr>
+                </a:solidFill>
+              </a:rPr>
+              <a:t>Introduction</a:t>
+            </a:r>
+          </a:p>
+        </p:txBody>
+      </p:sp>
+      <p:sp>
+        <p:nvSpPr>
+          <p:cNvPr id="30" name="ZoneTexte 29">
+            <a:extLst>
+              <a:ext uri="{FF2B5EF4-FFF2-40B4-BE49-F238E27FC236}">
+                <a16:creationId xmlns:a16="http://schemas.microsoft.com/office/drawing/2014/main" id="{C08E8F16-866D-4E97-8D56-7EA23C301197}"/>
+              </a:ext>
+            </a:extLst>
+          </p:cNvPr>
+          <p:cNvSpPr txBox="1"/>
+          <p:nvPr/>
+        </p:nvSpPr>
+        <p:spPr>
+          <a:xfrm>
+            <a:off x="10053015" y="1379493"/>
+            <a:ext cx="1359731" cy="369332"/>
+          </a:xfrm>
+          <a:prstGeom prst="rect">
+            <a:avLst/>
+          </a:prstGeom>
+          <a:noFill/>
+        </p:spPr>
+        <p:txBody>
+          <a:bodyPr wrap="none" rtlCol="0">
+            <a:spAutoFit/>
+          </a:bodyPr>
+          <a:lstStyle/>
+          <a:p>
+            <a:r>
+              <a:rPr lang="fr-FR" dirty="0">
+                <a:solidFill>
+                  <a:schemeClr val="bg1">
+                    <a:lumMod val="75000"/>
+                  </a:schemeClr>
+                </a:solidFill>
+              </a:rPr>
+              <a:t>Diagrammes</a:t>
+            </a:r>
+          </a:p>
+        </p:txBody>
+      </p:sp>
+      <p:sp>
+        <p:nvSpPr>
+          <p:cNvPr id="31" name="ZoneTexte 30">
+            <a:extLst>
+              <a:ext uri="{FF2B5EF4-FFF2-40B4-BE49-F238E27FC236}">
+                <a16:creationId xmlns:a16="http://schemas.microsoft.com/office/drawing/2014/main" id="{14517A12-D195-4A1A-AC16-FAB2DD447872}"/>
+              </a:ext>
+            </a:extLst>
+          </p:cNvPr>
+          <p:cNvSpPr txBox="1"/>
+          <p:nvPr/>
+        </p:nvSpPr>
+        <p:spPr>
+          <a:xfrm>
+            <a:off x="10053015" y="2189074"/>
+            <a:ext cx="1249445" cy="369332"/>
+          </a:xfrm>
+          <a:prstGeom prst="rect">
+            <a:avLst/>
+          </a:prstGeom>
+          <a:noFill/>
+        </p:spPr>
+        <p:txBody>
+          <a:bodyPr wrap="none" rtlCol="0">
+            <a:spAutoFit/>
+          </a:bodyPr>
+          <a:lstStyle/>
+          <a:p>
+            <a:r>
+              <a:rPr lang="fr-FR" dirty="0">
+                <a:solidFill>
+                  <a:schemeClr val="bg1">
+                    <a:lumMod val="75000"/>
+                  </a:schemeClr>
+                </a:solidFill>
+              </a:rPr>
+              <a:t>Mes tâches</a:t>
+            </a:r>
+          </a:p>
+        </p:txBody>
+      </p:sp>
+      <p:sp>
+        <p:nvSpPr>
+          <p:cNvPr id="32" name="ZoneTexte 31">
+            <a:extLst>
+              <a:ext uri="{FF2B5EF4-FFF2-40B4-BE49-F238E27FC236}">
+                <a16:creationId xmlns:a16="http://schemas.microsoft.com/office/drawing/2014/main" id="{B7579120-6204-43C0-95F1-3D25045E81BB}"/>
+              </a:ext>
+            </a:extLst>
+          </p:cNvPr>
+          <p:cNvSpPr txBox="1"/>
+          <p:nvPr/>
+        </p:nvSpPr>
+        <p:spPr>
+          <a:xfrm>
+            <a:off x="10053015" y="3012560"/>
+            <a:ext cx="1638269" cy="369332"/>
+          </a:xfrm>
+          <a:prstGeom prst="rect">
+            <a:avLst/>
+          </a:prstGeom>
+          <a:noFill/>
+        </p:spPr>
+        <p:txBody>
+          <a:bodyPr wrap="none" rtlCol="0">
+            <a:spAutoFit/>
+          </a:bodyPr>
+          <a:lstStyle/>
+          <a:p>
+            <a:r>
+              <a:rPr lang="fr-FR" dirty="0">
+                <a:solidFill>
+                  <a:schemeClr val="bg1">
+                    <a:lumMod val="75000"/>
+                  </a:schemeClr>
+                </a:solidFill>
+              </a:rPr>
+              <a:t>Mécanisme n°1</a:t>
+            </a:r>
+          </a:p>
+        </p:txBody>
+      </p:sp>
+      <p:sp>
+        <p:nvSpPr>
+          <p:cNvPr id="33" name="ZoneTexte 32">
+            <a:extLst>
+              <a:ext uri="{FF2B5EF4-FFF2-40B4-BE49-F238E27FC236}">
+                <a16:creationId xmlns:a16="http://schemas.microsoft.com/office/drawing/2014/main" id="{1C26D99C-528E-43E0-B56D-2B00A35F2F89}"/>
+              </a:ext>
+            </a:extLst>
+          </p:cNvPr>
+          <p:cNvSpPr txBox="1"/>
+          <p:nvPr/>
+        </p:nvSpPr>
+        <p:spPr>
+          <a:xfrm>
+            <a:off x="10050865" y="4640484"/>
+            <a:ext cx="1638269" cy="369332"/>
+          </a:xfrm>
+          <a:prstGeom prst="rect">
+            <a:avLst/>
+          </a:prstGeom>
+          <a:noFill/>
+        </p:spPr>
+        <p:txBody>
+          <a:bodyPr wrap="none" rtlCol="0">
+            <a:spAutoFit/>
+          </a:bodyPr>
+          <a:lstStyle/>
+          <a:p>
+            <a:r>
+              <a:rPr lang="fr-FR" dirty="0">
+                <a:solidFill>
+                  <a:schemeClr val="bg1">
+                    <a:lumMod val="75000"/>
+                  </a:schemeClr>
+                </a:solidFill>
+              </a:rPr>
+              <a:t>Mécanisme n°3</a:t>
+            </a:r>
+          </a:p>
+        </p:txBody>
+      </p:sp>
+      <p:sp>
+        <p:nvSpPr>
+          <p:cNvPr id="34" name="ZoneTexte 33">
+            <a:extLst>
+              <a:ext uri="{FF2B5EF4-FFF2-40B4-BE49-F238E27FC236}">
+                <a16:creationId xmlns:a16="http://schemas.microsoft.com/office/drawing/2014/main" id="{A60614CE-F344-4381-90DB-F39246CE5C0E}"/>
+              </a:ext>
+            </a:extLst>
+          </p:cNvPr>
+          <p:cNvSpPr txBox="1"/>
+          <p:nvPr/>
+        </p:nvSpPr>
+        <p:spPr>
+          <a:xfrm>
+            <a:off x="10050865" y="5470010"/>
+            <a:ext cx="1162498" cy="369332"/>
+          </a:xfrm>
+          <a:prstGeom prst="rect">
+            <a:avLst/>
+          </a:prstGeom>
+          <a:noFill/>
+        </p:spPr>
+        <p:txBody>
+          <a:bodyPr wrap="none" rtlCol="0">
+            <a:spAutoFit/>
+          </a:bodyPr>
+          <a:lstStyle/>
+          <a:p>
+            <a:r>
+              <a:rPr lang="fr-FR" dirty="0">
+                <a:solidFill>
+                  <a:schemeClr val="bg1">
+                    <a:lumMod val="75000"/>
+                  </a:schemeClr>
+                </a:solidFill>
+              </a:rPr>
+              <a:t>Appli WEB</a:t>
+            </a:r>
+          </a:p>
+        </p:txBody>
+      </p:sp>
+      <p:sp>
+        <p:nvSpPr>
+          <p:cNvPr id="35" name="ZoneTexte 34">
+            <a:extLst>
+              <a:ext uri="{FF2B5EF4-FFF2-40B4-BE49-F238E27FC236}">
+                <a16:creationId xmlns:a16="http://schemas.microsoft.com/office/drawing/2014/main" id="{AA028133-58C9-42C9-8843-EEA6C93320CB}"/>
+              </a:ext>
+            </a:extLst>
+          </p:cNvPr>
+          <p:cNvSpPr txBox="1"/>
+          <p:nvPr/>
+        </p:nvSpPr>
+        <p:spPr>
+          <a:xfrm>
+            <a:off x="10050865" y="6299536"/>
+            <a:ext cx="1417439" cy="369332"/>
+          </a:xfrm>
+          <a:prstGeom prst="rect">
+            <a:avLst/>
+          </a:prstGeom>
+          <a:noFill/>
+        </p:spPr>
+        <p:txBody>
+          <a:bodyPr wrap="none" rtlCol="0">
+            <a:spAutoFit/>
+          </a:bodyPr>
+          <a:lstStyle/>
+          <a:p>
+            <a:r>
+              <a:rPr lang="fr-FR" dirty="0">
+                <a:solidFill>
+                  <a:schemeClr val="bg1">
+                    <a:lumMod val="75000"/>
+                  </a:schemeClr>
+                </a:solidFill>
+              </a:rPr>
+              <a:t>Partie réseau</a:t>
             </a:r>
           </a:p>
         </p:txBody>
@@ -11040,13 +11622,13 @@
   <p:clrMapOvr>
     <a:masterClrMapping/>
   </p:clrMapOvr>
-  <mc:AlternateContent xmlns:mc="http://schemas.openxmlformats.org/markup-compatibility/2006">
-    <mc:Choice xmlns:p14="http://schemas.microsoft.com/office/powerpoint/2010/main" Requires="p14">
+  <mc:AlternateContent xmlns:mc="http://schemas.openxmlformats.org/markup-compatibility/2006" xmlns:p14="http://schemas.microsoft.com/office/powerpoint/2010/main">
+    <mc:Choice Requires="p14">
       <p:transition spd="med" p14:dur="700">
         <p:fade/>
       </p:transition>
     </mc:Choice>
-    <mc:Fallback>
+    <mc:Fallback xmlns="">
       <p:transition spd="med">
         <p:fade/>
       </p:transition>
@@ -11634,10 +12216,10 @@
       </p:sp>
       <p:sp>
         <p:nvSpPr>
-          <p:cNvPr id="15" name="ZoneTexte 14">
-            <a:extLst>
-              <a:ext uri="{FF2B5EF4-FFF2-40B4-BE49-F238E27FC236}">
-                <a16:creationId xmlns:a16="http://schemas.microsoft.com/office/drawing/2014/main" id="{FAB4BFE0-24EF-4295-9C96-4C46915FC5B9}"/>
+          <p:cNvPr id="20" name="ZoneTexte 19">
+            <a:extLst>
+              <a:ext uri="{FF2B5EF4-FFF2-40B4-BE49-F238E27FC236}">
+                <a16:creationId xmlns:a16="http://schemas.microsoft.com/office/drawing/2014/main" id="{F4437090-444A-497F-A19C-EEFA2A54226C}"/>
               </a:ext>
             </a:extLst>
           </p:cNvPr>
@@ -11646,8 +12228,8 @@
         </p:nvSpPr>
         <p:spPr>
           <a:xfrm>
-            <a:off x="10053015" y="555110"/>
-            <a:ext cx="1375569" cy="369332"/>
+            <a:off x="10050865" y="4640484"/>
+            <a:ext cx="1656479" cy="369332"/>
           </a:xfrm>
           <a:prstGeom prst="rect">
             <a:avLst/>
@@ -11661,253 +12243,8 @@
           <a:lstStyle/>
           <a:p>
             <a:r>
-              <a:rPr lang="fr-FR" strike="sngStrike" dirty="0"/>
-              <a:t>Introduction</a:t>
-            </a:r>
-          </a:p>
-        </p:txBody>
-      </p:sp>
-      <p:sp>
-        <p:nvSpPr>
-          <p:cNvPr id="16" name="ZoneTexte 15">
-            <a:extLst>
-              <a:ext uri="{FF2B5EF4-FFF2-40B4-BE49-F238E27FC236}">
-                <a16:creationId xmlns:a16="http://schemas.microsoft.com/office/drawing/2014/main" id="{14015828-23C4-41F5-B4D7-878950885677}"/>
-              </a:ext>
-            </a:extLst>
-          </p:cNvPr>
-          <p:cNvSpPr txBox="1"/>
-          <p:nvPr/>
-        </p:nvSpPr>
-        <p:spPr>
-          <a:xfrm>
-            <a:off x="10053015" y="1379493"/>
-            <a:ext cx="1359731" cy="369332"/>
-          </a:xfrm>
-          <a:prstGeom prst="rect">
-            <a:avLst/>
-          </a:prstGeom>
-          <a:noFill/>
-        </p:spPr>
-        <p:txBody>
-          <a:bodyPr wrap="none" rtlCol="0">
-            <a:spAutoFit/>
-          </a:bodyPr>
-          <a:lstStyle/>
-          <a:p>
-            <a:r>
-              <a:rPr lang="fr-FR" strike="sngStrike" dirty="0"/>
-              <a:t>Diagrammes</a:t>
-            </a:r>
-          </a:p>
-        </p:txBody>
-      </p:sp>
-      <p:sp>
-        <p:nvSpPr>
-          <p:cNvPr id="17" name="ZoneTexte 16">
-            <a:extLst>
-              <a:ext uri="{FF2B5EF4-FFF2-40B4-BE49-F238E27FC236}">
-                <a16:creationId xmlns:a16="http://schemas.microsoft.com/office/drawing/2014/main" id="{DC1B6A08-2908-4DF4-A71A-D58ACA9E845F}"/>
-              </a:ext>
-            </a:extLst>
-          </p:cNvPr>
-          <p:cNvSpPr txBox="1"/>
-          <p:nvPr/>
-        </p:nvSpPr>
-        <p:spPr>
-          <a:xfrm>
-            <a:off x="10053015" y="2189074"/>
-            <a:ext cx="1249445" cy="369332"/>
-          </a:xfrm>
-          <a:prstGeom prst="rect">
-            <a:avLst/>
-          </a:prstGeom>
-          <a:noFill/>
-        </p:spPr>
-        <p:txBody>
-          <a:bodyPr wrap="none" rtlCol="0">
-            <a:spAutoFit/>
-          </a:bodyPr>
-          <a:lstStyle/>
-          <a:p>
-            <a:r>
-              <a:rPr lang="fr-FR" strike="sngStrike" dirty="0"/>
-              <a:t>Mes tâches</a:t>
-            </a:r>
-          </a:p>
-        </p:txBody>
-      </p:sp>
-      <p:sp>
-        <p:nvSpPr>
-          <p:cNvPr id="18" name="ZoneTexte 17">
-            <a:extLst>
-              <a:ext uri="{FF2B5EF4-FFF2-40B4-BE49-F238E27FC236}">
-                <a16:creationId xmlns:a16="http://schemas.microsoft.com/office/drawing/2014/main" id="{DD185CDB-2147-4ACD-AE6E-9021945C57CD}"/>
-              </a:ext>
-            </a:extLst>
-          </p:cNvPr>
-          <p:cNvSpPr txBox="1"/>
-          <p:nvPr/>
-        </p:nvSpPr>
-        <p:spPr>
-          <a:xfrm>
-            <a:off x="10053015" y="3012560"/>
-            <a:ext cx="1638269" cy="369332"/>
-          </a:xfrm>
-          <a:prstGeom prst="rect">
-            <a:avLst/>
-          </a:prstGeom>
-          <a:noFill/>
-        </p:spPr>
-        <p:txBody>
-          <a:bodyPr wrap="none" rtlCol="0">
-            <a:spAutoFit/>
-          </a:bodyPr>
-          <a:lstStyle/>
-          <a:p>
-            <a:r>
-              <a:rPr lang="fr-FR" strike="sngStrike" dirty="0"/>
-              <a:t>Mécanisme n°1</a:t>
-            </a:r>
-          </a:p>
-        </p:txBody>
-      </p:sp>
-      <p:sp>
-        <p:nvSpPr>
-          <p:cNvPr id="19" name="ZoneTexte 18">
-            <a:extLst>
-              <a:ext uri="{FF2B5EF4-FFF2-40B4-BE49-F238E27FC236}">
-                <a16:creationId xmlns:a16="http://schemas.microsoft.com/office/drawing/2014/main" id="{71238C55-F7BD-415C-8C7A-C9D539089044}"/>
-              </a:ext>
-            </a:extLst>
-          </p:cNvPr>
-          <p:cNvSpPr txBox="1"/>
-          <p:nvPr/>
-        </p:nvSpPr>
-        <p:spPr>
-          <a:xfrm>
-            <a:off x="10053015" y="3826522"/>
-            <a:ext cx="1638269" cy="369332"/>
-          </a:xfrm>
-          <a:prstGeom prst="rect">
-            <a:avLst/>
-          </a:prstGeom>
-          <a:noFill/>
-        </p:spPr>
-        <p:txBody>
-          <a:bodyPr wrap="none" rtlCol="0">
-            <a:spAutoFit/>
-          </a:bodyPr>
-          <a:lstStyle/>
-          <a:p>
-            <a:r>
-              <a:rPr lang="fr-FR" strike="sngStrike" dirty="0"/>
-              <a:t>Mécanisme n°2</a:t>
-            </a:r>
-          </a:p>
-        </p:txBody>
-      </p:sp>
-      <p:sp>
-        <p:nvSpPr>
-          <p:cNvPr id="20" name="ZoneTexte 19">
-            <a:extLst>
-              <a:ext uri="{FF2B5EF4-FFF2-40B4-BE49-F238E27FC236}">
-                <a16:creationId xmlns:a16="http://schemas.microsoft.com/office/drawing/2014/main" id="{F4437090-444A-497F-A19C-EEFA2A54226C}"/>
-              </a:ext>
-            </a:extLst>
-          </p:cNvPr>
-          <p:cNvSpPr txBox="1"/>
-          <p:nvPr/>
-        </p:nvSpPr>
-        <p:spPr>
-          <a:xfrm>
-            <a:off x="10050865" y="4640484"/>
-            <a:ext cx="1656479" cy="369332"/>
-          </a:xfrm>
-          <a:prstGeom prst="rect">
-            <a:avLst/>
-          </a:prstGeom>
-          <a:noFill/>
-        </p:spPr>
-        <p:txBody>
-          <a:bodyPr wrap="none" rtlCol="0">
-            <a:spAutoFit/>
-          </a:bodyPr>
-          <a:lstStyle/>
-          <a:p>
-            <a:r>
               <a:rPr lang="fr-FR" b="1" dirty="0"/>
               <a:t>Mécanisme n°3</a:t>
-            </a:r>
-          </a:p>
-        </p:txBody>
-      </p:sp>
-      <p:sp>
-        <p:nvSpPr>
-          <p:cNvPr id="21" name="ZoneTexte 20">
-            <a:extLst>
-              <a:ext uri="{FF2B5EF4-FFF2-40B4-BE49-F238E27FC236}">
-                <a16:creationId xmlns:a16="http://schemas.microsoft.com/office/drawing/2014/main" id="{D9318AE3-3F3C-45F0-8F12-DF9A8CC6F8BF}"/>
-              </a:ext>
-            </a:extLst>
-          </p:cNvPr>
-          <p:cNvSpPr txBox="1"/>
-          <p:nvPr/>
-        </p:nvSpPr>
-        <p:spPr>
-          <a:xfrm>
-            <a:off x="10050865" y="5470010"/>
-            <a:ext cx="1162498" cy="369332"/>
-          </a:xfrm>
-          <a:prstGeom prst="rect">
-            <a:avLst/>
-          </a:prstGeom>
-          <a:noFill/>
-        </p:spPr>
-        <p:txBody>
-          <a:bodyPr wrap="none" rtlCol="0">
-            <a:spAutoFit/>
-          </a:bodyPr>
-          <a:lstStyle/>
-          <a:p>
-            <a:r>
-              <a:rPr lang="fr-FR" strike="sngStrike" dirty="0"/>
-              <a:t>Appli WEB</a:t>
-            </a:r>
-          </a:p>
-        </p:txBody>
-      </p:sp>
-      <p:sp>
-        <p:nvSpPr>
-          <p:cNvPr id="22" name="ZoneTexte 21">
-            <a:extLst>
-              <a:ext uri="{FF2B5EF4-FFF2-40B4-BE49-F238E27FC236}">
-                <a16:creationId xmlns:a16="http://schemas.microsoft.com/office/drawing/2014/main" id="{967E9711-9092-4961-953F-63B597F49274}"/>
-              </a:ext>
-            </a:extLst>
-          </p:cNvPr>
-          <p:cNvSpPr txBox="1"/>
-          <p:nvPr/>
-        </p:nvSpPr>
-        <p:spPr>
-          <a:xfrm>
-            <a:off x="10050865" y="6299536"/>
-            <a:ext cx="1417439" cy="369332"/>
-          </a:xfrm>
-          <a:prstGeom prst="rect">
-            <a:avLst/>
-          </a:prstGeom>
-          <a:noFill/>
-        </p:spPr>
-        <p:txBody>
-          <a:bodyPr wrap="none" rtlCol="0">
-            <a:spAutoFit/>
-          </a:bodyPr>
-          <a:lstStyle/>
-          <a:p>
-            <a:r>
-              <a:rPr lang="fr-FR" strike="sngStrike" dirty="0"/>
-              <a:t>Partie réseau</a:t>
             </a:r>
           </a:p>
         </p:txBody>
@@ -12107,6 +12444,293 @@
           </a:prstGeom>
         </p:spPr>
       </p:pic>
+      <p:sp>
+        <p:nvSpPr>
+          <p:cNvPr id="27" name="ZoneTexte 26">
+            <a:extLst>
+              <a:ext uri="{FF2B5EF4-FFF2-40B4-BE49-F238E27FC236}">
+                <a16:creationId xmlns:a16="http://schemas.microsoft.com/office/drawing/2014/main" id="{C9F7E15A-E667-4195-B9AA-D85D04DE5A9C}"/>
+              </a:ext>
+            </a:extLst>
+          </p:cNvPr>
+          <p:cNvSpPr txBox="1"/>
+          <p:nvPr/>
+        </p:nvSpPr>
+        <p:spPr>
+          <a:xfrm>
+            <a:off x="10053015" y="555110"/>
+            <a:ext cx="1375569" cy="369332"/>
+          </a:xfrm>
+          <a:prstGeom prst="rect">
+            <a:avLst/>
+          </a:prstGeom>
+          <a:noFill/>
+        </p:spPr>
+        <p:txBody>
+          <a:bodyPr wrap="none" rtlCol="0">
+            <a:spAutoFit/>
+          </a:bodyPr>
+          <a:lstStyle/>
+          <a:p>
+            <a:r>
+              <a:rPr lang="fr-FR" dirty="0">
+                <a:solidFill>
+                  <a:schemeClr val="bg1">
+                    <a:lumMod val="75000"/>
+                  </a:schemeClr>
+                </a:solidFill>
+              </a:rPr>
+              <a:t>Introduction</a:t>
+            </a:r>
+          </a:p>
+        </p:txBody>
+      </p:sp>
+      <p:sp>
+        <p:nvSpPr>
+          <p:cNvPr id="28" name="ZoneTexte 27">
+            <a:extLst>
+              <a:ext uri="{FF2B5EF4-FFF2-40B4-BE49-F238E27FC236}">
+                <a16:creationId xmlns:a16="http://schemas.microsoft.com/office/drawing/2014/main" id="{EA65688A-C501-460A-98C1-0F9F1759A7F8}"/>
+              </a:ext>
+            </a:extLst>
+          </p:cNvPr>
+          <p:cNvSpPr txBox="1"/>
+          <p:nvPr/>
+        </p:nvSpPr>
+        <p:spPr>
+          <a:xfrm>
+            <a:off x="10053015" y="1379493"/>
+            <a:ext cx="1359731" cy="369332"/>
+          </a:xfrm>
+          <a:prstGeom prst="rect">
+            <a:avLst/>
+          </a:prstGeom>
+          <a:noFill/>
+        </p:spPr>
+        <p:txBody>
+          <a:bodyPr wrap="none" rtlCol="0">
+            <a:spAutoFit/>
+          </a:bodyPr>
+          <a:lstStyle/>
+          <a:p>
+            <a:r>
+              <a:rPr lang="fr-FR" dirty="0">
+                <a:solidFill>
+                  <a:schemeClr val="bg1">
+                    <a:lumMod val="75000"/>
+                  </a:schemeClr>
+                </a:solidFill>
+              </a:rPr>
+              <a:t>Diagrammes</a:t>
+            </a:r>
+          </a:p>
+        </p:txBody>
+      </p:sp>
+      <p:sp>
+        <p:nvSpPr>
+          <p:cNvPr id="29" name="ZoneTexte 28">
+            <a:extLst>
+              <a:ext uri="{FF2B5EF4-FFF2-40B4-BE49-F238E27FC236}">
+                <a16:creationId xmlns:a16="http://schemas.microsoft.com/office/drawing/2014/main" id="{C9F8CDB9-28F8-4A71-87EB-9064075F406B}"/>
+              </a:ext>
+            </a:extLst>
+          </p:cNvPr>
+          <p:cNvSpPr txBox="1"/>
+          <p:nvPr/>
+        </p:nvSpPr>
+        <p:spPr>
+          <a:xfrm>
+            <a:off x="10053015" y="2189074"/>
+            <a:ext cx="1249445" cy="369332"/>
+          </a:xfrm>
+          <a:prstGeom prst="rect">
+            <a:avLst/>
+          </a:prstGeom>
+          <a:noFill/>
+        </p:spPr>
+        <p:txBody>
+          <a:bodyPr wrap="none" rtlCol="0">
+            <a:spAutoFit/>
+          </a:bodyPr>
+          <a:lstStyle/>
+          <a:p>
+            <a:r>
+              <a:rPr lang="fr-FR" dirty="0">
+                <a:solidFill>
+                  <a:schemeClr val="bg1">
+                    <a:lumMod val="75000"/>
+                  </a:schemeClr>
+                </a:solidFill>
+              </a:rPr>
+              <a:t>Mes tâches</a:t>
+            </a:r>
+          </a:p>
+        </p:txBody>
+      </p:sp>
+      <p:sp>
+        <p:nvSpPr>
+          <p:cNvPr id="30" name="ZoneTexte 29">
+            <a:extLst>
+              <a:ext uri="{FF2B5EF4-FFF2-40B4-BE49-F238E27FC236}">
+                <a16:creationId xmlns:a16="http://schemas.microsoft.com/office/drawing/2014/main" id="{40C67297-9CDB-4A84-A594-F188714A60C7}"/>
+              </a:ext>
+            </a:extLst>
+          </p:cNvPr>
+          <p:cNvSpPr txBox="1"/>
+          <p:nvPr/>
+        </p:nvSpPr>
+        <p:spPr>
+          <a:xfrm>
+            <a:off x="10053015" y="3012560"/>
+            <a:ext cx="1638269" cy="369332"/>
+          </a:xfrm>
+          <a:prstGeom prst="rect">
+            <a:avLst/>
+          </a:prstGeom>
+          <a:noFill/>
+        </p:spPr>
+        <p:txBody>
+          <a:bodyPr wrap="none" rtlCol="0">
+            <a:spAutoFit/>
+          </a:bodyPr>
+          <a:lstStyle/>
+          <a:p>
+            <a:r>
+              <a:rPr lang="fr-FR" dirty="0">
+                <a:solidFill>
+                  <a:schemeClr val="bg1">
+                    <a:lumMod val="75000"/>
+                  </a:schemeClr>
+                </a:solidFill>
+              </a:rPr>
+              <a:t>Mécanisme n°1</a:t>
+            </a:r>
+          </a:p>
+        </p:txBody>
+      </p:sp>
+      <p:sp>
+        <p:nvSpPr>
+          <p:cNvPr id="37" name="ZoneTexte 36">
+            <a:extLst>
+              <a:ext uri="{FF2B5EF4-FFF2-40B4-BE49-F238E27FC236}">
+                <a16:creationId xmlns:a16="http://schemas.microsoft.com/office/drawing/2014/main" id="{9439E50A-9E2B-4F10-9C97-A9F78863E06F}"/>
+              </a:ext>
+            </a:extLst>
+          </p:cNvPr>
+          <p:cNvSpPr txBox="1"/>
+          <p:nvPr/>
+        </p:nvSpPr>
+        <p:spPr>
+          <a:xfrm>
+            <a:off x="10053015" y="3826522"/>
+            <a:ext cx="1638269" cy="369332"/>
+          </a:xfrm>
+          <a:prstGeom prst="rect">
+            <a:avLst/>
+          </a:prstGeom>
+          <a:noFill/>
+        </p:spPr>
+        <p:txBody>
+          <a:bodyPr wrap="none" rtlCol="0">
+            <a:spAutoFit/>
+          </a:bodyPr>
+          <a:lstStyle/>
+          <a:p>
+            <a:r>
+              <a:rPr lang="fr-FR" dirty="0">
+                <a:solidFill>
+                  <a:schemeClr val="bg1">
+                    <a:lumMod val="75000"/>
+                  </a:schemeClr>
+                </a:solidFill>
+              </a:rPr>
+              <a:t>Mécanisme n°2</a:t>
+            </a:r>
+          </a:p>
+        </p:txBody>
+      </p:sp>
+      <p:sp>
+        <p:nvSpPr>
+          <p:cNvPr id="38" name="ZoneTexte 37">
+            <a:extLst>
+              <a:ext uri="{FF2B5EF4-FFF2-40B4-BE49-F238E27FC236}">
+                <a16:creationId xmlns:a16="http://schemas.microsoft.com/office/drawing/2014/main" id="{3D67EE72-62DB-49EC-88CE-7090707F0848}"/>
+              </a:ext>
+            </a:extLst>
+          </p:cNvPr>
+          <p:cNvSpPr txBox="1"/>
+          <p:nvPr/>
+        </p:nvSpPr>
+        <p:spPr>
+          <a:xfrm>
+            <a:off x="10050865" y="5470010"/>
+            <a:ext cx="1162498" cy="369332"/>
+          </a:xfrm>
+          <a:prstGeom prst="rect">
+            <a:avLst/>
+          </a:prstGeom>
+          <a:noFill/>
+        </p:spPr>
+        <p:txBody>
+          <a:bodyPr wrap="none" rtlCol="0">
+            <a:spAutoFit/>
+          </a:bodyPr>
+          <a:lstStyle/>
+          <a:p>
+            <a:r>
+              <a:rPr lang="fr-FR" dirty="0">
+                <a:solidFill>
+                  <a:schemeClr val="bg1">
+                    <a:lumMod val="75000"/>
+                  </a:schemeClr>
+                </a:solidFill>
+              </a:rPr>
+              <a:t>Appli WEB</a:t>
+            </a:r>
+          </a:p>
+        </p:txBody>
+      </p:sp>
+      <p:sp>
+        <p:nvSpPr>
+          <p:cNvPr id="39" name="ZoneTexte 38">
+            <a:extLst>
+              <a:ext uri="{FF2B5EF4-FFF2-40B4-BE49-F238E27FC236}">
+                <a16:creationId xmlns:a16="http://schemas.microsoft.com/office/drawing/2014/main" id="{F2824C13-C76E-469F-8408-D863BB2B8AD6}"/>
+              </a:ext>
+            </a:extLst>
+          </p:cNvPr>
+          <p:cNvSpPr txBox="1"/>
+          <p:nvPr/>
+        </p:nvSpPr>
+        <p:spPr>
+          <a:xfrm>
+            <a:off x="10050865" y="6299536"/>
+            <a:ext cx="1417439" cy="369332"/>
+          </a:xfrm>
+          <a:prstGeom prst="rect">
+            <a:avLst/>
+          </a:prstGeom>
+          <a:noFill/>
+        </p:spPr>
+        <p:txBody>
+          <a:bodyPr wrap="none" rtlCol="0">
+            <a:spAutoFit/>
+          </a:bodyPr>
+          <a:lstStyle/>
+          <a:p>
+            <a:r>
+              <a:rPr lang="fr-FR" dirty="0">
+                <a:solidFill>
+                  <a:schemeClr val="bg1">
+                    <a:lumMod val="75000"/>
+                  </a:schemeClr>
+                </a:solidFill>
+              </a:rPr>
+              <a:t>Partie réseau</a:t>
+            </a:r>
+          </a:p>
+        </p:txBody>
+      </p:sp>
     </p:spTree>
     <p:extLst>
       <p:ext uri="{BB962C8B-B14F-4D97-AF65-F5344CB8AC3E}">
@@ -12117,13 +12741,13 @@
   <p:clrMapOvr>
     <a:masterClrMapping/>
   </p:clrMapOvr>
-  <mc:AlternateContent xmlns:mc="http://schemas.openxmlformats.org/markup-compatibility/2006">
-    <mc:Choice xmlns:p14="http://schemas.microsoft.com/office/powerpoint/2010/main" Requires="p14">
+  <mc:AlternateContent xmlns:mc="http://schemas.openxmlformats.org/markup-compatibility/2006" xmlns:p14="http://schemas.microsoft.com/office/powerpoint/2010/main">
+    <mc:Choice Requires="p14">
       <p:transition spd="med" p14:dur="700">
         <p:fade/>
       </p:transition>
     </mc:Choice>
-    <mc:Fallback>
+    <mc:Fallback xmlns="">
       <p:transition spd="med">
         <p:fade/>
       </p:transition>
@@ -13012,10 +13636,10 @@
       </p:sp>
       <p:sp>
         <p:nvSpPr>
-          <p:cNvPr id="28" name="ZoneTexte 27">
-            <a:extLst>
-              <a:ext uri="{FF2B5EF4-FFF2-40B4-BE49-F238E27FC236}">
-                <a16:creationId xmlns:a16="http://schemas.microsoft.com/office/drawing/2014/main" id="{2866A3B6-CDE4-4BA2-B1AB-5E1080F295FA}"/>
+          <p:cNvPr id="36" name="ZoneTexte 35">
+            <a:extLst>
+              <a:ext uri="{FF2B5EF4-FFF2-40B4-BE49-F238E27FC236}">
+                <a16:creationId xmlns:a16="http://schemas.microsoft.com/office/drawing/2014/main" id="{8B4D61D7-F238-43AE-B19D-EFE455343488}"/>
               </a:ext>
             </a:extLst>
           </p:cNvPr>
@@ -13039,7 +13663,13 @@
           <a:lstStyle/>
           <a:p>
             <a:r>
-              <a:rPr lang="fr-FR" strike="sngStrike" dirty="0"/>
+              <a:rPr lang="fr-FR" dirty="0">
+                <a:solidFill>
+                  <a:schemeClr val="bg1">
+                    <a:lumMod val="75000"/>
+                  </a:schemeClr>
+                </a:solidFill>
+              </a:rPr>
               <a:t>Introduction</a:t>
             </a:r>
           </a:p>
@@ -13047,10 +13677,10 @@
       </p:sp>
       <p:sp>
         <p:nvSpPr>
-          <p:cNvPr id="29" name="ZoneTexte 28">
-            <a:extLst>
-              <a:ext uri="{FF2B5EF4-FFF2-40B4-BE49-F238E27FC236}">
-                <a16:creationId xmlns:a16="http://schemas.microsoft.com/office/drawing/2014/main" id="{CFEAAF36-74C6-490E-A019-C239D7CE650C}"/>
+          <p:cNvPr id="37" name="ZoneTexte 36">
+            <a:extLst>
+              <a:ext uri="{FF2B5EF4-FFF2-40B4-BE49-F238E27FC236}">
+                <a16:creationId xmlns:a16="http://schemas.microsoft.com/office/drawing/2014/main" id="{095BA30D-F217-489C-AFB6-BAD6BAB2456F}"/>
               </a:ext>
             </a:extLst>
           </p:cNvPr>
@@ -13074,7 +13704,13 @@
           <a:lstStyle/>
           <a:p>
             <a:r>
-              <a:rPr lang="fr-FR" strike="sngStrike" dirty="0"/>
+              <a:rPr lang="fr-FR" dirty="0">
+                <a:solidFill>
+                  <a:schemeClr val="bg1">
+                    <a:lumMod val="75000"/>
+                  </a:schemeClr>
+                </a:solidFill>
+              </a:rPr>
               <a:t>Diagrammes</a:t>
             </a:r>
           </a:p>
@@ -13082,10 +13718,10 @@
       </p:sp>
       <p:sp>
         <p:nvSpPr>
-          <p:cNvPr id="30" name="ZoneTexte 29">
-            <a:extLst>
-              <a:ext uri="{FF2B5EF4-FFF2-40B4-BE49-F238E27FC236}">
-                <a16:creationId xmlns:a16="http://schemas.microsoft.com/office/drawing/2014/main" id="{A538670A-67AF-4B81-B6A2-9F6B9C989D67}"/>
+          <p:cNvPr id="38" name="ZoneTexte 37">
+            <a:extLst>
+              <a:ext uri="{FF2B5EF4-FFF2-40B4-BE49-F238E27FC236}">
+                <a16:creationId xmlns:a16="http://schemas.microsoft.com/office/drawing/2014/main" id="{369AABAC-E8F4-421C-AE91-2F02DCCEF6EB}"/>
               </a:ext>
             </a:extLst>
           </p:cNvPr>
@@ -13109,7 +13745,13 @@
           <a:lstStyle/>
           <a:p>
             <a:r>
-              <a:rPr lang="fr-FR" strike="sngStrike" dirty="0"/>
+              <a:rPr lang="fr-FR" dirty="0">
+                <a:solidFill>
+                  <a:schemeClr val="bg1">
+                    <a:lumMod val="75000"/>
+                  </a:schemeClr>
+                </a:solidFill>
+              </a:rPr>
               <a:t>Mes tâches</a:t>
             </a:r>
           </a:p>
@@ -13117,10 +13759,10 @@
       </p:sp>
       <p:sp>
         <p:nvSpPr>
-          <p:cNvPr id="31" name="ZoneTexte 30">
-            <a:extLst>
-              <a:ext uri="{FF2B5EF4-FFF2-40B4-BE49-F238E27FC236}">
-                <a16:creationId xmlns:a16="http://schemas.microsoft.com/office/drawing/2014/main" id="{1A77ED40-3CD9-42B5-8ECB-82138E800B8D}"/>
+          <p:cNvPr id="39" name="ZoneTexte 38">
+            <a:extLst>
+              <a:ext uri="{FF2B5EF4-FFF2-40B4-BE49-F238E27FC236}">
+                <a16:creationId xmlns:a16="http://schemas.microsoft.com/office/drawing/2014/main" id="{96CE0C09-E7D1-4ADA-8AB8-3793C89CB5C9}"/>
               </a:ext>
             </a:extLst>
           </p:cNvPr>
@@ -13144,7 +13786,13 @@
           <a:lstStyle/>
           <a:p>
             <a:r>
-              <a:rPr lang="fr-FR" strike="sngStrike" dirty="0"/>
+              <a:rPr lang="fr-FR" dirty="0">
+                <a:solidFill>
+                  <a:schemeClr val="bg1">
+                    <a:lumMod val="75000"/>
+                  </a:schemeClr>
+                </a:solidFill>
+              </a:rPr>
               <a:t>Mécanisme n°1</a:t>
             </a:r>
           </a:p>
@@ -13152,10 +13800,10 @@
       </p:sp>
       <p:sp>
         <p:nvSpPr>
-          <p:cNvPr id="32" name="ZoneTexte 31">
-            <a:extLst>
-              <a:ext uri="{FF2B5EF4-FFF2-40B4-BE49-F238E27FC236}">
-                <a16:creationId xmlns:a16="http://schemas.microsoft.com/office/drawing/2014/main" id="{9F8EB306-5293-4ADD-A5AB-16B7BB7E847E}"/>
+          <p:cNvPr id="40" name="ZoneTexte 39">
+            <a:extLst>
+              <a:ext uri="{FF2B5EF4-FFF2-40B4-BE49-F238E27FC236}">
+                <a16:creationId xmlns:a16="http://schemas.microsoft.com/office/drawing/2014/main" id="{40A2831C-4B8D-48C9-A2B0-C69DB87A65CD}"/>
               </a:ext>
             </a:extLst>
           </p:cNvPr>
@@ -13179,7 +13827,13 @@
           <a:lstStyle/>
           <a:p>
             <a:r>
-              <a:rPr lang="fr-FR" strike="sngStrike" dirty="0"/>
+              <a:rPr lang="fr-FR" dirty="0">
+                <a:solidFill>
+                  <a:schemeClr val="bg1">
+                    <a:lumMod val="75000"/>
+                  </a:schemeClr>
+                </a:solidFill>
+              </a:rPr>
               <a:t>Mécanisme n°2</a:t>
             </a:r>
           </a:p>
@@ -13187,10 +13841,10 @@
       </p:sp>
       <p:sp>
         <p:nvSpPr>
-          <p:cNvPr id="33" name="ZoneTexte 32">
-            <a:extLst>
-              <a:ext uri="{FF2B5EF4-FFF2-40B4-BE49-F238E27FC236}">
-                <a16:creationId xmlns:a16="http://schemas.microsoft.com/office/drawing/2014/main" id="{418273F2-3441-4159-9890-7DD0FA5753E6}"/>
+          <p:cNvPr id="41" name="ZoneTexte 40">
+            <a:extLst>
+              <a:ext uri="{FF2B5EF4-FFF2-40B4-BE49-F238E27FC236}">
+                <a16:creationId xmlns:a16="http://schemas.microsoft.com/office/drawing/2014/main" id="{F21009C4-8128-4479-A8FD-7968B57722D2}"/>
               </a:ext>
             </a:extLst>
           </p:cNvPr>
@@ -13214,7 +13868,13 @@
           <a:lstStyle/>
           <a:p>
             <a:r>
-              <a:rPr lang="fr-FR" strike="sngStrike" dirty="0"/>
+              <a:rPr lang="fr-FR" dirty="0">
+                <a:solidFill>
+                  <a:schemeClr val="bg1">
+                    <a:lumMod val="75000"/>
+                  </a:schemeClr>
+                </a:solidFill>
+              </a:rPr>
               <a:t>Mécanisme n°3</a:t>
             </a:r>
           </a:p>
@@ -13222,10 +13882,10 @@
       </p:sp>
       <p:sp>
         <p:nvSpPr>
-          <p:cNvPr id="34" name="ZoneTexte 33">
-            <a:extLst>
-              <a:ext uri="{FF2B5EF4-FFF2-40B4-BE49-F238E27FC236}">
-                <a16:creationId xmlns:a16="http://schemas.microsoft.com/office/drawing/2014/main" id="{4C8535ED-9D3C-47BA-AA3A-268A50AAA673}"/>
+          <p:cNvPr id="42" name="ZoneTexte 41">
+            <a:extLst>
+              <a:ext uri="{FF2B5EF4-FFF2-40B4-BE49-F238E27FC236}">
+                <a16:creationId xmlns:a16="http://schemas.microsoft.com/office/drawing/2014/main" id="{6163CE01-F92E-483D-BB31-11443F4B49CF}"/>
               </a:ext>
             </a:extLst>
           </p:cNvPr>
@@ -13257,10 +13917,10 @@
       </p:sp>
       <p:sp>
         <p:nvSpPr>
-          <p:cNvPr id="35" name="ZoneTexte 34">
-            <a:extLst>
-              <a:ext uri="{FF2B5EF4-FFF2-40B4-BE49-F238E27FC236}">
-                <a16:creationId xmlns:a16="http://schemas.microsoft.com/office/drawing/2014/main" id="{632D9B24-F4D0-4933-85DD-5BA371B5A94A}"/>
+          <p:cNvPr id="43" name="ZoneTexte 42">
+            <a:extLst>
+              <a:ext uri="{FF2B5EF4-FFF2-40B4-BE49-F238E27FC236}">
+                <a16:creationId xmlns:a16="http://schemas.microsoft.com/office/drawing/2014/main" id="{0032E3F3-06AF-41D3-AF32-6766D16FA686}"/>
               </a:ext>
             </a:extLst>
           </p:cNvPr>
@@ -13284,7 +13944,13 @@
           <a:lstStyle/>
           <a:p>
             <a:r>
-              <a:rPr lang="fr-FR" strike="sngStrike" dirty="0"/>
+              <a:rPr lang="fr-FR" dirty="0">
+                <a:solidFill>
+                  <a:schemeClr val="bg1">
+                    <a:lumMod val="75000"/>
+                  </a:schemeClr>
+                </a:solidFill>
+              </a:rPr>
               <a:t>Partie réseau</a:t>
             </a:r>
           </a:p>
@@ -13300,13 +13966,13 @@
   <p:clrMapOvr>
     <a:masterClrMapping/>
   </p:clrMapOvr>
-  <mc:AlternateContent xmlns:mc="http://schemas.openxmlformats.org/markup-compatibility/2006">
-    <mc:Choice xmlns:p14="http://schemas.microsoft.com/office/powerpoint/2010/main" Requires="p14">
+  <mc:AlternateContent xmlns:mc="http://schemas.openxmlformats.org/markup-compatibility/2006" xmlns:p14="http://schemas.microsoft.com/office/powerpoint/2010/main">
+    <mc:Choice Requires="p14">
       <p:transition spd="med" p14:dur="700">
         <p:fade/>
       </p:transition>
     </mc:Choice>
-    <mc:Fallback>
+    <mc:Fallback xmlns="">
       <p:transition spd="med">
         <p:fade/>
       </p:transition>
@@ -14704,10 +15370,10 @@
       </p:sp>
       <p:sp>
         <p:nvSpPr>
-          <p:cNvPr id="17" name="ZoneTexte 16">
-            <a:extLst>
-              <a:ext uri="{FF2B5EF4-FFF2-40B4-BE49-F238E27FC236}">
-                <a16:creationId xmlns:a16="http://schemas.microsoft.com/office/drawing/2014/main" id="{47CD2330-4B0B-4A55-9E11-C0933BEF4845}"/>
+          <p:cNvPr id="24" name="ZoneTexte 23">
+            <a:extLst>
+              <a:ext uri="{FF2B5EF4-FFF2-40B4-BE49-F238E27FC236}">
+                <a16:creationId xmlns:a16="http://schemas.microsoft.com/office/drawing/2014/main" id="{DF0F96B2-0EE8-49DD-A299-3ABD0C220145}"/>
               </a:ext>
             </a:extLst>
           </p:cNvPr>
@@ -14716,8 +15382,8 @@
         </p:nvSpPr>
         <p:spPr>
           <a:xfrm>
-            <a:off x="10053015" y="555110"/>
-            <a:ext cx="1375569" cy="369332"/>
+            <a:off x="10050865" y="6299536"/>
+            <a:ext cx="1442383" cy="369332"/>
           </a:xfrm>
           <a:prstGeom prst="rect">
             <a:avLst/>
@@ -14731,18 +15397,18 @@
           <a:lstStyle/>
           <a:p>
             <a:r>
-              <a:rPr lang="fr-FR" strike="sngStrike" dirty="0"/>
-              <a:t>Introduction</a:t>
+              <a:rPr lang="fr-FR" b="1" dirty="0"/>
+              <a:t>Partie réseau</a:t>
             </a:r>
           </a:p>
         </p:txBody>
       </p:sp>
       <p:sp>
         <p:nvSpPr>
-          <p:cNvPr id="18" name="ZoneTexte 17">
-            <a:extLst>
-              <a:ext uri="{FF2B5EF4-FFF2-40B4-BE49-F238E27FC236}">
-                <a16:creationId xmlns:a16="http://schemas.microsoft.com/office/drawing/2014/main" id="{A0641E94-9A8B-4DCF-B979-463E7DA522AC}"/>
+          <p:cNvPr id="25" name="ZoneTexte 24">
+            <a:extLst>
+              <a:ext uri="{FF2B5EF4-FFF2-40B4-BE49-F238E27FC236}">
+                <a16:creationId xmlns:a16="http://schemas.microsoft.com/office/drawing/2014/main" id="{60502665-8D8E-4940-8D64-593433E51BA4}"/>
               </a:ext>
             </a:extLst>
           </p:cNvPr>
@@ -14751,8 +15417,8 @@
         </p:nvSpPr>
         <p:spPr>
           <a:xfrm>
-            <a:off x="10053015" y="1379493"/>
-            <a:ext cx="1359731" cy="369332"/>
+            <a:off x="10053015" y="555110"/>
+            <a:ext cx="1375569" cy="369332"/>
           </a:xfrm>
           <a:prstGeom prst="rect">
             <a:avLst/>
@@ -14766,18 +15432,24 @@
           <a:lstStyle/>
           <a:p>
             <a:r>
-              <a:rPr lang="fr-FR" strike="sngStrike" dirty="0"/>
-              <a:t>Diagrammes</a:t>
+              <a:rPr lang="fr-FR" dirty="0">
+                <a:solidFill>
+                  <a:schemeClr val="bg1">
+                    <a:lumMod val="75000"/>
+                  </a:schemeClr>
+                </a:solidFill>
+              </a:rPr>
+              <a:t>Introduction</a:t>
             </a:r>
           </a:p>
         </p:txBody>
       </p:sp>
       <p:sp>
         <p:nvSpPr>
-          <p:cNvPr id="19" name="ZoneTexte 18">
-            <a:extLst>
-              <a:ext uri="{FF2B5EF4-FFF2-40B4-BE49-F238E27FC236}">
-                <a16:creationId xmlns:a16="http://schemas.microsoft.com/office/drawing/2014/main" id="{AFAAF9F6-F3BF-4C39-A59A-9A4AF7349559}"/>
+          <p:cNvPr id="27" name="ZoneTexte 26">
+            <a:extLst>
+              <a:ext uri="{FF2B5EF4-FFF2-40B4-BE49-F238E27FC236}">
+                <a16:creationId xmlns:a16="http://schemas.microsoft.com/office/drawing/2014/main" id="{882A56D1-FCD3-457D-A17A-0BA92B8DDB81}"/>
               </a:ext>
             </a:extLst>
           </p:cNvPr>
@@ -14786,8 +15458,8 @@
         </p:nvSpPr>
         <p:spPr>
           <a:xfrm>
-            <a:off x="10053015" y="2189074"/>
-            <a:ext cx="1249445" cy="369332"/>
+            <a:off x="10053015" y="1379493"/>
+            <a:ext cx="1359731" cy="369332"/>
           </a:xfrm>
           <a:prstGeom prst="rect">
             <a:avLst/>
@@ -14801,18 +15473,24 @@
           <a:lstStyle/>
           <a:p>
             <a:r>
-              <a:rPr lang="fr-FR" strike="sngStrike" dirty="0"/>
-              <a:t>Mes tâches</a:t>
+              <a:rPr lang="fr-FR" dirty="0">
+                <a:solidFill>
+                  <a:schemeClr val="bg1">
+                    <a:lumMod val="75000"/>
+                  </a:schemeClr>
+                </a:solidFill>
+              </a:rPr>
+              <a:t>Diagrammes</a:t>
             </a:r>
           </a:p>
         </p:txBody>
       </p:sp>
       <p:sp>
         <p:nvSpPr>
-          <p:cNvPr id="20" name="ZoneTexte 19">
-            <a:extLst>
-              <a:ext uri="{FF2B5EF4-FFF2-40B4-BE49-F238E27FC236}">
-                <a16:creationId xmlns:a16="http://schemas.microsoft.com/office/drawing/2014/main" id="{3D9F2288-82F1-47E3-A82E-A191877D9B71}"/>
+          <p:cNvPr id="28" name="ZoneTexte 27">
+            <a:extLst>
+              <a:ext uri="{FF2B5EF4-FFF2-40B4-BE49-F238E27FC236}">
+                <a16:creationId xmlns:a16="http://schemas.microsoft.com/office/drawing/2014/main" id="{4D673B22-C77B-4FE7-A4C4-89EC49CEC974}"/>
               </a:ext>
             </a:extLst>
           </p:cNvPr>
@@ -14821,8 +15499,8 @@
         </p:nvSpPr>
         <p:spPr>
           <a:xfrm>
-            <a:off x="10053015" y="3012560"/>
-            <a:ext cx="1638269" cy="369332"/>
+            <a:off x="10053015" y="2189074"/>
+            <a:ext cx="1249445" cy="369332"/>
           </a:xfrm>
           <a:prstGeom prst="rect">
             <a:avLst/>
@@ -14836,18 +15514,24 @@
           <a:lstStyle/>
           <a:p>
             <a:r>
-              <a:rPr lang="fr-FR" strike="sngStrike" dirty="0"/>
-              <a:t>Mécanisme n°1</a:t>
+              <a:rPr lang="fr-FR" dirty="0">
+                <a:solidFill>
+                  <a:schemeClr val="bg1">
+                    <a:lumMod val="75000"/>
+                  </a:schemeClr>
+                </a:solidFill>
+              </a:rPr>
+              <a:t>Mes tâches</a:t>
             </a:r>
           </a:p>
         </p:txBody>
       </p:sp>
       <p:sp>
         <p:nvSpPr>
-          <p:cNvPr id="21" name="ZoneTexte 20">
-            <a:extLst>
-              <a:ext uri="{FF2B5EF4-FFF2-40B4-BE49-F238E27FC236}">
-                <a16:creationId xmlns:a16="http://schemas.microsoft.com/office/drawing/2014/main" id="{47B84AD6-B400-4C59-8079-77EE3DF7DFD9}"/>
+          <p:cNvPr id="29" name="ZoneTexte 28">
+            <a:extLst>
+              <a:ext uri="{FF2B5EF4-FFF2-40B4-BE49-F238E27FC236}">
+                <a16:creationId xmlns:a16="http://schemas.microsoft.com/office/drawing/2014/main" id="{22C45E1F-645E-4325-8D16-1E7C6A80CA34}"/>
               </a:ext>
             </a:extLst>
           </p:cNvPr>
@@ -14856,7 +15540,7 @@
         </p:nvSpPr>
         <p:spPr>
           <a:xfrm>
-            <a:off x="10053015" y="3826522"/>
+            <a:off x="10053015" y="3012560"/>
             <a:ext cx="1638269" cy="369332"/>
           </a:xfrm>
           <a:prstGeom prst="rect">
@@ -14871,18 +15555,24 @@
           <a:lstStyle/>
           <a:p>
             <a:r>
-              <a:rPr lang="fr-FR" strike="sngStrike" dirty="0"/>
-              <a:t>Mécanisme n°2</a:t>
+              <a:rPr lang="fr-FR" dirty="0">
+                <a:solidFill>
+                  <a:schemeClr val="bg1">
+                    <a:lumMod val="75000"/>
+                  </a:schemeClr>
+                </a:solidFill>
+              </a:rPr>
+              <a:t>Mécanisme n°1</a:t>
             </a:r>
           </a:p>
         </p:txBody>
       </p:sp>
       <p:sp>
         <p:nvSpPr>
-          <p:cNvPr id="22" name="ZoneTexte 21">
-            <a:extLst>
-              <a:ext uri="{FF2B5EF4-FFF2-40B4-BE49-F238E27FC236}">
-                <a16:creationId xmlns:a16="http://schemas.microsoft.com/office/drawing/2014/main" id="{891A0D2D-89B7-4053-BB3A-9A3058E090F0}"/>
+          <p:cNvPr id="30" name="ZoneTexte 29">
+            <a:extLst>
+              <a:ext uri="{FF2B5EF4-FFF2-40B4-BE49-F238E27FC236}">
+                <a16:creationId xmlns:a16="http://schemas.microsoft.com/office/drawing/2014/main" id="{CC4AEF1A-21ED-433E-9754-4D7AE305F902}"/>
               </a:ext>
             </a:extLst>
           </p:cNvPr>
@@ -14891,7 +15581,7 @@
         </p:nvSpPr>
         <p:spPr>
           <a:xfrm>
-            <a:off x="10050865" y="4640484"/>
+            <a:off x="10053015" y="3826522"/>
             <a:ext cx="1638269" cy="369332"/>
           </a:xfrm>
           <a:prstGeom prst="rect">
@@ -14906,18 +15596,24 @@
           <a:lstStyle/>
           <a:p>
             <a:r>
-              <a:rPr lang="fr-FR" strike="sngStrike" dirty="0"/>
-              <a:t>Mécanisme n°3</a:t>
+              <a:rPr lang="fr-FR" dirty="0">
+                <a:solidFill>
+                  <a:schemeClr val="bg1">
+                    <a:lumMod val="75000"/>
+                  </a:schemeClr>
+                </a:solidFill>
+              </a:rPr>
+              <a:t>Mécanisme n°2</a:t>
             </a:r>
           </a:p>
         </p:txBody>
       </p:sp>
       <p:sp>
         <p:nvSpPr>
-          <p:cNvPr id="23" name="ZoneTexte 22">
-            <a:extLst>
-              <a:ext uri="{FF2B5EF4-FFF2-40B4-BE49-F238E27FC236}">
-                <a16:creationId xmlns:a16="http://schemas.microsoft.com/office/drawing/2014/main" id="{1CCDBF17-1DB2-4C7E-9789-A317D2458973}"/>
+          <p:cNvPr id="31" name="ZoneTexte 30">
+            <a:extLst>
+              <a:ext uri="{FF2B5EF4-FFF2-40B4-BE49-F238E27FC236}">
+                <a16:creationId xmlns:a16="http://schemas.microsoft.com/office/drawing/2014/main" id="{FC747FAD-A3DE-498D-8D89-0C188642D2F0}"/>
               </a:ext>
             </a:extLst>
           </p:cNvPr>
@@ -14926,8 +15622,8 @@
         </p:nvSpPr>
         <p:spPr>
           <a:xfrm>
-            <a:off x="10050865" y="5470010"/>
-            <a:ext cx="1162498" cy="369332"/>
+            <a:off x="10050865" y="4640484"/>
+            <a:ext cx="1638269" cy="369332"/>
           </a:xfrm>
           <a:prstGeom prst="rect">
             <a:avLst/>
@@ -14941,18 +15637,24 @@
           <a:lstStyle/>
           <a:p>
             <a:r>
-              <a:rPr lang="fr-FR" strike="sngStrike" dirty="0"/>
-              <a:t>Appli WEB</a:t>
+              <a:rPr lang="fr-FR" dirty="0">
+                <a:solidFill>
+                  <a:schemeClr val="bg1">
+                    <a:lumMod val="75000"/>
+                  </a:schemeClr>
+                </a:solidFill>
+              </a:rPr>
+              <a:t>Mécanisme n°3</a:t>
             </a:r>
           </a:p>
         </p:txBody>
       </p:sp>
       <p:sp>
         <p:nvSpPr>
-          <p:cNvPr id="24" name="ZoneTexte 23">
-            <a:extLst>
-              <a:ext uri="{FF2B5EF4-FFF2-40B4-BE49-F238E27FC236}">
-                <a16:creationId xmlns:a16="http://schemas.microsoft.com/office/drawing/2014/main" id="{DF0F96B2-0EE8-49DD-A299-3ABD0C220145}"/>
+          <p:cNvPr id="32" name="ZoneTexte 31">
+            <a:extLst>
+              <a:ext uri="{FF2B5EF4-FFF2-40B4-BE49-F238E27FC236}">
+                <a16:creationId xmlns:a16="http://schemas.microsoft.com/office/drawing/2014/main" id="{0E4FDB6B-CF10-458B-8BA8-489EDB9ABA58}"/>
               </a:ext>
             </a:extLst>
           </p:cNvPr>
@@ -14961,8 +15663,8 @@
         </p:nvSpPr>
         <p:spPr>
           <a:xfrm>
-            <a:off x="10050865" y="6299536"/>
-            <a:ext cx="1442383" cy="369332"/>
+            <a:off x="10050865" y="5470010"/>
+            <a:ext cx="1162498" cy="369332"/>
           </a:xfrm>
           <a:prstGeom prst="rect">
             <a:avLst/>
@@ -14976,8 +15678,14 @@
           <a:lstStyle/>
           <a:p>
             <a:r>
-              <a:rPr lang="fr-FR" b="1" dirty="0"/>
-              <a:t>Partie réseau</a:t>
+              <a:rPr lang="fr-FR" dirty="0">
+                <a:solidFill>
+                  <a:schemeClr val="bg1">
+                    <a:lumMod val="75000"/>
+                  </a:schemeClr>
+                </a:solidFill>
+              </a:rPr>
+              <a:t>Appli WEB</a:t>
             </a:r>
           </a:p>
         </p:txBody>
@@ -14992,13 +15700,13 @@
   <p:clrMapOvr>
     <a:masterClrMapping/>
   </p:clrMapOvr>
-  <mc:AlternateContent xmlns:mc="http://schemas.openxmlformats.org/markup-compatibility/2006">
-    <mc:Choice xmlns:p14="http://schemas.microsoft.com/office/powerpoint/2010/main" Requires="p14">
+  <mc:AlternateContent xmlns:mc="http://schemas.openxmlformats.org/markup-compatibility/2006" xmlns:p14="http://schemas.microsoft.com/office/powerpoint/2010/main">
+    <mc:Choice Requires="p14">
       <p:transition spd="med" p14:dur="700">
         <p:fade/>
       </p:transition>
     </mc:Choice>
-    <mc:Fallback>
+    <mc:Fallback xmlns="">
       <p:transition spd="med">
         <p:fade/>
       </p:transition>

</xml_diff>